<commit_message>
update fxml, pp, tests
</commit_message>
<xml_diff>
--- a/powerpoint/stayfit.pptx
+++ b/powerpoint/stayfit.pptx
@@ -7,11 +7,15 @@
   <p:sldIdLst>
     <p:sldId id="256" r:id="rId2"/>
     <p:sldId id="257" r:id="rId3"/>
-    <p:sldId id="260" r:id="rId4"/>
-    <p:sldId id="261" r:id="rId5"/>
-    <p:sldId id="262" r:id="rId6"/>
-    <p:sldId id="259" r:id="rId7"/>
-    <p:sldId id="258" r:id="rId8"/>
+    <p:sldId id="263" r:id="rId4"/>
+    <p:sldId id="260" r:id="rId5"/>
+    <p:sldId id="261" r:id="rId6"/>
+    <p:sldId id="264" r:id="rId7"/>
+    <p:sldId id="265" r:id="rId8"/>
+    <p:sldId id="262" r:id="rId9"/>
+    <p:sldId id="266" r:id="rId10"/>
+    <p:sldId id="259" r:id="rId11"/>
+    <p:sldId id="258" r:id="rId12"/>
   </p:sldIdLst>
   <p:sldSz cx="12192000" cy="6858000"/>
   <p:notesSz cx="6858000" cy="9144000"/>
@@ -119,15 +123,15 @@
 </file>
 
 <file path=ppt/diagrams/colors1.xml><?xml version="1.0" encoding="utf-8"?>
-<dgm:colorsDef xmlns:dgm="http://schemas.openxmlformats.org/drawingml/2006/diagram" xmlns:a="http://schemas.openxmlformats.org/drawingml/2006/main" uniqueId="urn:microsoft.com/office/officeart/2018/5/colors/Iconchunking_neutralbg_accent2_2">
+<dgm:colorsDef xmlns:dgm="http://schemas.openxmlformats.org/drawingml/2006/diagram" xmlns:a="http://schemas.openxmlformats.org/drawingml/2006/main" uniqueId="urn:microsoft.com/office/officeart/2005/8/colors/accent1_2">
   <dgm:title val=""/>
   <dgm:desc val=""/>
   <dgm:catLst>
-    <dgm:cat type="accent2" pri="11200"/>
+    <dgm:cat type="accent1" pri="11200"/>
   </dgm:catLst>
   <dgm:styleLbl name="node0">
     <dgm:fillClrLst meth="repeat">
-      <a:schemeClr val="accent2"/>
+      <a:schemeClr val="accent1"/>
     </dgm:fillClrLst>
     <dgm:linClrLst meth="repeat">
       <a:schemeClr val="lt1"/>
@@ -137,26 +141,24 @@
     <dgm:txFillClrLst/>
     <dgm:txEffectClrLst/>
   </dgm:styleLbl>
-  <dgm:styleLbl name="node1">
+  <dgm:styleLbl name="alignNode1">
     <dgm:fillClrLst meth="repeat">
-      <a:schemeClr val="accent2"/>
+      <a:schemeClr val="accent1"/>
     </dgm:fillClrLst>
     <dgm:linClrLst meth="repeat">
-      <a:schemeClr val="lt1">
-        <a:alpha val="0"/>
-      </a:schemeClr>
+      <a:schemeClr val="accent1"/>
     </dgm:linClrLst>
     <dgm:effectClrLst/>
     <dgm:txLinClrLst/>
     <dgm:txFillClrLst/>
     <dgm:txEffectClrLst/>
   </dgm:styleLbl>
-  <dgm:styleLbl name="alignNode1">
+  <dgm:styleLbl name="node1">
     <dgm:fillClrLst meth="repeat">
-      <a:schemeClr val="accent2"/>
+      <a:schemeClr val="accent1"/>
     </dgm:fillClrLst>
     <dgm:linClrLst meth="repeat">
-      <a:schemeClr val="accent2"/>
+      <a:schemeClr val="lt1"/>
     </dgm:linClrLst>
     <dgm:effectClrLst/>
     <dgm:txLinClrLst/>
@@ -165,7 +167,7 @@
   </dgm:styleLbl>
   <dgm:styleLbl name="lnNode1">
     <dgm:fillClrLst meth="repeat">
-      <a:schemeClr val="accent2"/>
+      <a:schemeClr val="accent1"/>
     </dgm:fillClrLst>
     <dgm:linClrLst meth="repeat">
       <a:schemeClr val="lt1"/>
@@ -177,7 +179,7 @@
   </dgm:styleLbl>
   <dgm:styleLbl name="vennNode1">
     <dgm:fillClrLst meth="repeat">
-      <a:schemeClr val="accent2">
+      <a:schemeClr val="accent1">
         <a:alpha val="50000"/>
       </a:schemeClr>
     </dgm:fillClrLst>
@@ -191,7 +193,7 @@
   </dgm:styleLbl>
   <dgm:styleLbl name="node2">
     <dgm:fillClrLst meth="repeat">
-      <a:schemeClr val="accent2"/>
+      <a:schemeClr val="accent1"/>
     </dgm:fillClrLst>
     <dgm:linClrLst meth="repeat">
       <a:schemeClr val="lt1"/>
@@ -203,7 +205,7 @@
   </dgm:styleLbl>
   <dgm:styleLbl name="node3">
     <dgm:fillClrLst meth="repeat">
-      <a:schemeClr val="accent2"/>
+      <a:schemeClr val="accent1"/>
     </dgm:fillClrLst>
     <dgm:linClrLst meth="repeat">
       <a:schemeClr val="lt1"/>
@@ -215,7 +217,7 @@
   </dgm:styleLbl>
   <dgm:styleLbl name="node4">
     <dgm:fillClrLst meth="repeat">
-      <a:schemeClr val="accent2"/>
+      <a:schemeClr val="accent1"/>
     </dgm:fillClrLst>
     <dgm:linClrLst meth="repeat">
       <a:schemeClr val="lt1"/>
@@ -227,7 +229,7 @@
   </dgm:styleLbl>
   <dgm:styleLbl name="fgImgPlace1">
     <dgm:fillClrLst meth="repeat">
-      <a:schemeClr val="accent2">
+      <a:schemeClr val="accent1">
         <a:tint val="50000"/>
       </a:schemeClr>
     </dgm:fillClrLst>
@@ -243,7 +245,7 @@
   </dgm:styleLbl>
   <dgm:styleLbl name="alignImgPlace1">
     <dgm:fillClrLst meth="repeat">
-      <a:schemeClr val="accent2">
+      <a:schemeClr val="accent1">
         <a:tint val="50000"/>
       </a:schemeClr>
     </dgm:fillClrLst>
@@ -259,7 +261,7 @@
   </dgm:styleLbl>
   <dgm:styleLbl name="bgImgPlace1">
     <dgm:fillClrLst meth="repeat">
-      <a:schemeClr val="accent2">
+      <a:schemeClr val="accent1">
         <a:tint val="50000"/>
       </a:schemeClr>
     </dgm:fillClrLst>
@@ -275,12 +277,12 @@
   </dgm:styleLbl>
   <dgm:styleLbl name="sibTrans2D1">
     <dgm:fillClrLst meth="repeat">
-      <a:schemeClr val="accent2">
+      <a:schemeClr val="accent1">
         <a:tint val="60000"/>
       </a:schemeClr>
     </dgm:fillClrLst>
     <dgm:linClrLst meth="repeat">
-      <a:schemeClr val="accent2">
+      <a:schemeClr val="accent1">
         <a:tint val="60000"/>
       </a:schemeClr>
     </dgm:linClrLst>
@@ -291,12 +293,12 @@
   </dgm:styleLbl>
   <dgm:styleLbl name="fgSibTrans2D1">
     <dgm:fillClrLst meth="repeat">
-      <a:schemeClr val="accent2">
+      <a:schemeClr val="accent1">
         <a:tint val="60000"/>
       </a:schemeClr>
     </dgm:fillClrLst>
     <dgm:linClrLst meth="repeat">
-      <a:schemeClr val="accent2">
+      <a:schemeClr val="accent1">
         <a:tint val="60000"/>
       </a:schemeClr>
     </dgm:linClrLst>
@@ -307,12 +309,12 @@
   </dgm:styleLbl>
   <dgm:styleLbl name="bgSibTrans2D1">
     <dgm:fillClrLst meth="repeat">
-      <a:schemeClr val="accent2">
+      <a:schemeClr val="accent1">
         <a:tint val="60000"/>
       </a:schemeClr>
     </dgm:fillClrLst>
     <dgm:linClrLst meth="repeat">
-      <a:schemeClr val="accent2">
+      <a:schemeClr val="accent1">
         <a:tint val="60000"/>
       </a:schemeClr>
     </dgm:linClrLst>
@@ -323,10 +325,10 @@
   </dgm:styleLbl>
   <dgm:styleLbl name="sibTrans1D1">
     <dgm:fillClrLst meth="repeat">
-      <a:schemeClr val="accent2"/>
+      <a:schemeClr val="accent1"/>
     </dgm:fillClrLst>
     <dgm:linClrLst meth="repeat">
-      <a:schemeClr val="accent2"/>
+      <a:schemeClr val="accent1"/>
     </dgm:linClrLst>
     <dgm:effectClrLst/>
     <dgm:txLinClrLst/>
@@ -337,10 +339,10 @@
   </dgm:styleLbl>
   <dgm:styleLbl name="callout">
     <dgm:fillClrLst meth="repeat">
-      <a:schemeClr val="accent2"/>
+      <a:schemeClr val="accent1"/>
     </dgm:fillClrLst>
     <dgm:linClrLst meth="repeat">
-      <a:schemeClr val="accent2">
+      <a:schemeClr val="accent1">
         <a:tint val="50000"/>
       </a:schemeClr>
     </dgm:linClrLst>
@@ -353,7 +355,7 @@
   </dgm:styleLbl>
   <dgm:styleLbl name="asst0">
     <dgm:fillClrLst meth="repeat">
-      <a:schemeClr val="accent2"/>
+      <a:schemeClr val="accent1"/>
     </dgm:fillClrLst>
     <dgm:linClrLst meth="repeat">
       <a:schemeClr val="lt1"/>
@@ -365,7 +367,7 @@
   </dgm:styleLbl>
   <dgm:styleLbl name="asst1">
     <dgm:fillClrLst meth="repeat">
-      <a:schemeClr val="accent2"/>
+      <a:schemeClr val="accent1"/>
     </dgm:fillClrLst>
     <dgm:linClrLst meth="repeat">
       <a:schemeClr val="lt1"/>
@@ -377,7 +379,7 @@
   </dgm:styleLbl>
   <dgm:styleLbl name="asst2">
     <dgm:fillClrLst meth="repeat">
-      <a:schemeClr val="accent2"/>
+      <a:schemeClr val="accent1"/>
     </dgm:fillClrLst>
     <dgm:linClrLst meth="repeat">
       <a:schemeClr val="lt1"/>
@@ -389,7 +391,7 @@
   </dgm:styleLbl>
   <dgm:styleLbl name="asst3">
     <dgm:fillClrLst meth="repeat">
-      <a:schemeClr val="accent2"/>
+      <a:schemeClr val="accent1"/>
     </dgm:fillClrLst>
     <dgm:linClrLst meth="repeat">
       <a:schemeClr val="lt1"/>
@@ -401,7 +403,7 @@
   </dgm:styleLbl>
   <dgm:styleLbl name="asst4">
     <dgm:fillClrLst meth="repeat">
-      <a:schemeClr val="accent2"/>
+      <a:schemeClr val="accent1"/>
     </dgm:fillClrLst>
     <dgm:linClrLst meth="repeat">
       <a:schemeClr val="lt1"/>
@@ -413,12 +415,12 @@
   </dgm:styleLbl>
   <dgm:styleLbl name="parChTrans2D1">
     <dgm:fillClrLst meth="repeat">
-      <a:schemeClr val="accent2">
+      <a:schemeClr val="accent1">
         <a:tint val="60000"/>
       </a:schemeClr>
     </dgm:fillClrLst>
     <dgm:linClrLst meth="repeat">
-      <a:schemeClr val="accent2">
+      <a:schemeClr val="accent1">
         <a:tint val="60000"/>
       </a:schemeClr>
     </dgm:linClrLst>
@@ -431,10 +433,10 @@
   </dgm:styleLbl>
   <dgm:styleLbl name="parChTrans2D2">
     <dgm:fillClrLst meth="repeat">
-      <a:schemeClr val="accent2"/>
+      <a:schemeClr val="accent1"/>
     </dgm:fillClrLst>
     <dgm:linClrLst meth="repeat">
-      <a:schemeClr val="accent2"/>
+      <a:schemeClr val="accent1"/>
     </dgm:linClrLst>
     <dgm:effectClrLst/>
     <dgm:txLinClrLst/>
@@ -445,10 +447,10 @@
   </dgm:styleLbl>
   <dgm:styleLbl name="parChTrans2D3">
     <dgm:fillClrLst meth="repeat">
-      <a:schemeClr val="accent2"/>
+      <a:schemeClr val="accent1"/>
     </dgm:fillClrLst>
     <dgm:linClrLst meth="repeat">
-      <a:schemeClr val="accent2"/>
+      <a:schemeClr val="accent1"/>
     </dgm:linClrLst>
     <dgm:effectClrLst/>
     <dgm:txLinClrLst/>
@@ -459,10 +461,10 @@
   </dgm:styleLbl>
   <dgm:styleLbl name="parChTrans2D4">
     <dgm:fillClrLst meth="repeat">
-      <a:schemeClr val="accent2"/>
+      <a:schemeClr val="accent1"/>
     </dgm:fillClrLst>
     <dgm:linClrLst meth="repeat">
-      <a:schemeClr val="accent2"/>
+      <a:schemeClr val="accent1"/>
     </dgm:linClrLst>
     <dgm:effectClrLst/>
     <dgm:txLinClrLst/>
@@ -473,10 +475,10 @@
   </dgm:styleLbl>
   <dgm:styleLbl name="parChTrans1D1">
     <dgm:fillClrLst meth="repeat">
-      <a:schemeClr val="accent2"/>
+      <a:schemeClr val="accent1"/>
     </dgm:fillClrLst>
     <dgm:linClrLst meth="repeat">
-      <a:schemeClr val="accent2">
+      <a:schemeClr val="accent1">
         <a:shade val="60000"/>
       </a:schemeClr>
     </dgm:linClrLst>
@@ -489,10 +491,10 @@
   </dgm:styleLbl>
   <dgm:styleLbl name="parChTrans1D2">
     <dgm:fillClrLst meth="repeat">
-      <a:schemeClr val="accent2"/>
+      <a:schemeClr val="accent1"/>
     </dgm:fillClrLst>
     <dgm:linClrLst meth="repeat">
-      <a:schemeClr val="accent2">
+      <a:schemeClr val="accent1">
         <a:shade val="60000"/>
       </a:schemeClr>
     </dgm:linClrLst>
@@ -505,10 +507,10 @@
   </dgm:styleLbl>
   <dgm:styleLbl name="parChTrans1D3">
     <dgm:fillClrLst meth="repeat">
-      <a:schemeClr val="accent2"/>
+      <a:schemeClr val="accent1"/>
     </dgm:fillClrLst>
     <dgm:linClrLst meth="repeat">
-      <a:schemeClr val="accent2">
+      <a:schemeClr val="accent1">
         <a:shade val="80000"/>
       </a:schemeClr>
     </dgm:linClrLst>
@@ -521,10 +523,10 @@
   </dgm:styleLbl>
   <dgm:styleLbl name="parChTrans1D4">
     <dgm:fillClrLst meth="repeat">
-      <a:schemeClr val="accent2"/>
+      <a:schemeClr val="accent1"/>
     </dgm:fillClrLst>
     <dgm:linClrLst meth="repeat">
-      <a:schemeClr val="accent2">
+      <a:schemeClr val="accent1">
         <a:shade val="80000"/>
       </a:schemeClr>
     </dgm:linClrLst>
@@ -542,7 +544,7 @@
       </a:schemeClr>
     </dgm:fillClrLst>
     <dgm:linClrLst meth="repeat">
-      <a:schemeClr val="accent2"/>
+      <a:schemeClr val="accent1"/>
     </dgm:linClrLst>
     <dgm:effectClrLst/>
     <dgm:txLinClrLst/>
@@ -558,7 +560,7 @@
       </a:schemeClr>
     </dgm:fillClrLst>
     <dgm:linClrLst meth="repeat">
-      <a:schemeClr val="accent2"/>
+      <a:schemeClr val="accent1"/>
     </dgm:linClrLst>
     <dgm:effectClrLst/>
     <dgm:txLinClrLst/>
@@ -574,7 +576,7 @@
       </a:schemeClr>
     </dgm:fillClrLst>
     <dgm:linClrLst meth="repeat">
-      <a:schemeClr val="accent2"/>
+      <a:schemeClr val="accent1"/>
     </dgm:linClrLst>
     <dgm:effectClrLst/>
     <dgm:txLinClrLst/>
@@ -590,7 +592,7 @@
       </a:schemeClr>
     </dgm:fillClrLst>
     <dgm:linClrLst meth="repeat">
-      <a:schemeClr val="accent2"/>
+      <a:schemeClr val="accent1"/>
     </dgm:linClrLst>
     <dgm:effectClrLst/>
     <dgm:txLinClrLst/>
@@ -606,7 +608,7 @@
       </a:schemeClr>
     </dgm:fillClrLst>
     <dgm:linClrLst meth="repeat">
-      <a:schemeClr val="accent2"/>
+      <a:schemeClr val="accent1"/>
     </dgm:linClrLst>
     <dgm:effectClrLst/>
     <dgm:txLinClrLst/>
@@ -620,7 +622,7 @@
       <a:schemeClr val="lt1"/>
     </dgm:fillClrLst>
     <dgm:linClrLst meth="repeat">
-      <a:schemeClr val="accent2"/>
+      <a:schemeClr val="accent1"/>
     </dgm:linClrLst>
     <dgm:effectClrLst/>
     <dgm:txLinClrLst/>
@@ -634,7 +636,7 @@
       <a:schemeClr val="lt1"/>
     </dgm:fillClrLst>
     <dgm:linClrLst meth="repeat">
-      <a:schemeClr val="accent2"/>
+      <a:schemeClr val="accent1"/>
     </dgm:linClrLst>
     <dgm:effectClrLst/>
     <dgm:txLinClrLst/>
@@ -648,7 +650,7 @@
       <a:schemeClr val="lt1"/>
     </dgm:fillClrLst>
     <dgm:linClrLst meth="repeat">
-      <a:schemeClr val="accent2"/>
+      <a:schemeClr val="accent1"/>
     </dgm:linClrLst>
     <dgm:effectClrLst/>
     <dgm:txLinClrLst/>
@@ -659,13 +661,13 @@
   </dgm:styleLbl>
   <dgm:styleLbl name="fgAccFollowNode1">
     <dgm:fillClrLst meth="repeat">
-      <a:schemeClr val="accent2">
+      <a:schemeClr val="accent1">
         <a:alpha val="90000"/>
         <a:tint val="40000"/>
       </a:schemeClr>
     </dgm:fillClrLst>
     <dgm:linClrLst meth="repeat">
-      <a:schemeClr val="accent2">
+      <a:schemeClr val="accent1">
         <a:alpha val="90000"/>
         <a:tint val="40000"/>
       </a:schemeClr>
@@ -679,13 +681,13 @@
   </dgm:styleLbl>
   <dgm:styleLbl name="alignAccFollowNode1">
     <dgm:fillClrLst meth="repeat">
-      <a:schemeClr val="accent2">
+      <a:schemeClr val="accent1">
         <a:alpha val="90000"/>
         <a:tint val="40000"/>
       </a:schemeClr>
     </dgm:fillClrLst>
     <dgm:linClrLst meth="repeat">
-      <a:schemeClr val="accent2">
+      <a:schemeClr val="accent1">
         <a:alpha val="90000"/>
         <a:tint val="40000"/>
       </a:schemeClr>
@@ -699,13 +701,13 @@
   </dgm:styleLbl>
   <dgm:styleLbl name="bgAccFollowNode1">
     <dgm:fillClrLst meth="repeat">
-      <a:schemeClr val="accent2">
+      <a:schemeClr val="accent1">
         <a:alpha val="90000"/>
         <a:tint val="40000"/>
       </a:schemeClr>
     </dgm:fillClrLst>
     <dgm:linClrLst meth="repeat">
-      <a:schemeClr val="accent2">
+      <a:schemeClr val="accent1">
         <a:alpha val="90000"/>
         <a:tint val="40000"/>
       </a:schemeClr>
@@ -724,7 +726,7 @@
       </a:schemeClr>
     </dgm:fillClrLst>
     <dgm:linClrLst meth="repeat">
-      <a:schemeClr val="accent2"/>
+      <a:schemeClr val="accent1"/>
     </dgm:linClrLst>
     <dgm:effectClrLst/>
     <dgm:txLinClrLst/>
@@ -740,7 +742,7 @@
       </a:schemeClr>
     </dgm:fillClrLst>
     <dgm:linClrLst meth="repeat">
-      <a:schemeClr val="accent2"/>
+      <a:schemeClr val="accent1"/>
     </dgm:linClrLst>
     <dgm:effectClrLst/>
     <dgm:txLinClrLst/>
@@ -756,7 +758,7 @@
       </a:schemeClr>
     </dgm:fillClrLst>
     <dgm:linClrLst meth="repeat">
-      <a:schemeClr val="accent2"/>
+      <a:schemeClr val="accent1"/>
     </dgm:linClrLst>
     <dgm:effectClrLst/>
     <dgm:txLinClrLst/>
@@ -772,7 +774,7 @@
       </a:schemeClr>
     </dgm:fillClrLst>
     <dgm:linClrLst meth="repeat">
-      <a:schemeClr val="accent2"/>
+      <a:schemeClr val="accent1"/>
     </dgm:linClrLst>
     <dgm:effectClrLst/>
     <dgm:txLinClrLst/>
@@ -783,12 +785,12 @@
   </dgm:styleLbl>
   <dgm:styleLbl name="bgShp">
     <dgm:fillClrLst meth="repeat">
-      <a:schemeClr val="bg1">
-        <a:lumMod val="95000"/>
+      <a:schemeClr val="accent1">
+        <a:tint val="40000"/>
       </a:schemeClr>
     </dgm:fillClrLst>
     <dgm:linClrLst meth="repeat">
-      <a:schemeClr val="accent2"/>
+      <a:schemeClr val="accent1"/>
     </dgm:linClrLst>
     <dgm:effectClrLst/>
     <dgm:txLinClrLst/>
@@ -799,12 +801,12 @@
   </dgm:styleLbl>
   <dgm:styleLbl name="dkBgShp">
     <dgm:fillClrLst meth="repeat">
-      <a:schemeClr val="accent2">
+      <a:schemeClr val="accent1">
         <a:shade val="80000"/>
       </a:schemeClr>
     </dgm:fillClrLst>
     <dgm:linClrLst meth="repeat">
-      <a:schemeClr val="accent2"/>
+      <a:schemeClr val="accent1"/>
     </dgm:linClrLst>
     <dgm:effectClrLst/>
     <dgm:txLinClrLst/>
@@ -815,13 +817,13 @@
   </dgm:styleLbl>
   <dgm:styleLbl name="trBgShp">
     <dgm:fillClrLst meth="repeat">
-      <a:schemeClr val="accent2">
+      <a:schemeClr val="accent1">
         <a:tint val="50000"/>
         <a:alpha val="40000"/>
       </a:schemeClr>
     </dgm:fillClrLst>
     <dgm:linClrLst meth="repeat">
-      <a:schemeClr val="accent2"/>
+      <a:schemeClr val="accent1"/>
     </dgm:linClrLst>
     <dgm:effectClrLst/>
     <dgm:txLinClrLst/>
@@ -832,7 +834,7 @@
   </dgm:styleLbl>
   <dgm:styleLbl name="fgShp">
     <dgm:fillClrLst meth="repeat">
-      <a:schemeClr val="accent2">
+      <a:schemeClr val="accent1">
         <a:tint val="60000"/>
       </a:schemeClr>
     </dgm:fillClrLst>
@@ -870,8 +872,8 @@
 <file path=ppt/diagrams/data1.xml><?xml version="1.0" encoding="utf-8"?>
 <dgm:dataModel xmlns:dgm="http://schemas.openxmlformats.org/drawingml/2006/diagram" xmlns:a="http://schemas.openxmlformats.org/drawingml/2006/main">
   <dgm:ptLst>
-    <dgm:pt modelId="{559FD288-FB9B-448A-806D-1CD8E2576BFB}" type="doc">
-      <dgm:prSet loTypeId="urn:microsoft.com/office/officeart/2018/5/layout/IconLeafLabelList" loCatId="icon" qsTypeId="urn:microsoft.com/office/officeart/2005/8/quickstyle/simple1" qsCatId="simple" csTypeId="urn:microsoft.com/office/officeart/2018/5/colors/Iconchunking_neutralbg_accent2_2" csCatId="accent2" phldr="1"/>
+    <dgm:pt modelId="{3DD52CC2-A763-45F0-989D-66B72F9BB5A7}" type="doc">
+      <dgm:prSet loTypeId="urn:microsoft.com/office/officeart/2018/2/layout/IconLabelList" loCatId="icon" qsTypeId="urn:microsoft.com/office/officeart/2005/8/quickstyle/simple1" qsCatId="simple" csTypeId="urn:microsoft.com/office/officeart/2005/8/colors/accent1_2" csCatId="accent1" phldr="1"/>
       <dgm:spPr/>
       <dgm:t>
         <a:bodyPr/>
@@ -881,7 +883,7 @@
         </a:p>
       </dgm:t>
     </dgm:pt>
-    <dgm:pt modelId="{6897197B-3FAB-4F80-9FAF-5B919A499483}">
+    <dgm:pt modelId="{6179FA6B-6E22-457E-AA9F-A88BDF6FDCF7}">
       <dgm:prSet/>
       <dgm:spPr/>
       <dgm:t>
@@ -889,7 +891,9 @@
         <a:lstStyle/>
         <a:p>
           <a:pPr>
-            <a:defRPr cap="all"/>
+            <a:lnSpc>
+              <a:spcPct val="100000"/>
+            </a:lnSpc>
           </a:pPr>
           <a:r>
             <a:rPr lang="de-DE"/>
@@ -899,7 +903,7 @@
         </a:p>
       </dgm:t>
     </dgm:pt>
-    <dgm:pt modelId="{3139994E-3040-402C-9053-3C804F718D0E}" type="parTrans" cxnId="{7F6D6221-A8F4-4027-9F44-7AE5F99800AD}">
+    <dgm:pt modelId="{44F4A118-09DC-4B65-92CA-4EBC7AE321DE}" type="parTrans" cxnId="{EDECD0C5-F74B-42A5-90A0-373D50338EDB}">
       <dgm:prSet/>
       <dgm:spPr/>
       <dgm:t>
@@ -910,7 +914,7 @@
         </a:p>
       </dgm:t>
     </dgm:pt>
-    <dgm:pt modelId="{9C73A0E1-367E-439F-9A34-CE5022FDA8F9}" type="sibTrans" cxnId="{7F6D6221-A8F4-4027-9F44-7AE5F99800AD}">
+    <dgm:pt modelId="{9654F6CC-66F4-4C84-85AA-7E62934979C9}" type="sibTrans" cxnId="{EDECD0C5-F74B-42A5-90A0-373D50338EDB}">
       <dgm:prSet/>
       <dgm:spPr/>
       <dgm:t>
@@ -921,7 +925,7 @@
         </a:p>
       </dgm:t>
     </dgm:pt>
-    <dgm:pt modelId="{15637258-B2B1-47FF-8CA4-709222999456}">
+    <dgm:pt modelId="{579D3A54-D7B1-4584-AC59-339C4879DC57}">
       <dgm:prSet/>
       <dgm:spPr/>
       <dgm:t>
@@ -929,7 +933,9 @@
         <a:lstStyle/>
         <a:p>
           <a:pPr>
-            <a:defRPr cap="all"/>
+            <a:lnSpc>
+              <a:spcPct val="100000"/>
+            </a:lnSpc>
           </a:pPr>
           <a:r>
             <a:rPr lang="de-DE"/>
@@ -939,7 +945,7 @@
         </a:p>
       </dgm:t>
     </dgm:pt>
-    <dgm:pt modelId="{A4E1A641-B5D7-4FFF-B658-669ABFAD8F47}" type="parTrans" cxnId="{FDD94D22-B1CB-47EA-B37F-35BA8D845071}">
+    <dgm:pt modelId="{9E2897AE-2615-442A-92D2-E98BAEFF3866}" type="parTrans" cxnId="{665A87B4-C7E8-43D3-AA1D-7866E6EED3F7}">
       <dgm:prSet/>
       <dgm:spPr/>
       <dgm:t>
@@ -950,7 +956,7 @@
         </a:p>
       </dgm:t>
     </dgm:pt>
-    <dgm:pt modelId="{F3A18858-8DB1-4B47-BC4E-009894BA46F9}" type="sibTrans" cxnId="{FDD94D22-B1CB-47EA-B37F-35BA8D845071}">
+    <dgm:pt modelId="{CE319F30-83DD-4780-94AB-464B8B631524}" type="sibTrans" cxnId="{665A87B4-C7E8-43D3-AA1D-7866E6EED3F7}">
       <dgm:prSet/>
       <dgm:spPr/>
       <dgm:t>
@@ -961,7 +967,7 @@
         </a:p>
       </dgm:t>
     </dgm:pt>
-    <dgm:pt modelId="{6E74844A-2DC5-4E46-893C-B8EBC57A18DA}">
+    <dgm:pt modelId="{5FF9BDC9-E0D6-4F67-B9F6-DBD93E945A8F}">
       <dgm:prSet/>
       <dgm:spPr/>
       <dgm:t>
@@ -969,17 +975,19 @@
         <a:lstStyle/>
         <a:p>
           <a:pPr>
-            <a:defRPr cap="all"/>
+            <a:lnSpc>
+              <a:spcPct val="100000"/>
+            </a:lnSpc>
           </a:pPr>
           <a:r>
-            <a:rPr lang="de-DE"/>
-            <a:t>Live Demo</a:t>
+            <a:rPr lang="de-AT"/>
+            <a:t>Was wir gemacht haben</a:t>
           </a:r>
           <a:endParaRPr lang="en-US"/>
         </a:p>
       </dgm:t>
     </dgm:pt>
-    <dgm:pt modelId="{8B18B01B-3F58-42A0-B1DD-4296D8B29FB0}" type="parTrans" cxnId="{730E0BB3-A8F5-4B33-A6D7-BBA6E089A143}">
+    <dgm:pt modelId="{32BE930B-D782-47A2-AEBD-6314028057FF}" type="parTrans" cxnId="{EB1C4CA1-FBE2-4EB1-85D3-A272AAC7E5F2}">
       <dgm:prSet/>
       <dgm:spPr/>
       <dgm:t>
@@ -990,7 +998,7 @@
         </a:p>
       </dgm:t>
     </dgm:pt>
-    <dgm:pt modelId="{02A3F3D9-E0BB-46A9-BED8-5FDA9BFDDA14}" type="sibTrans" cxnId="{730E0BB3-A8F5-4B33-A6D7-BBA6E089A143}">
+    <dgm:pt modelId="{BE1367A1-19B9-4B99-8E38-DDFDDB3C8790}" type="sibTrans" cxnId="{EB1C4CA1-FBE2-4EB1-85D3-A272AAC7E5F2}">
       <dgm:prSet/>
       <dgm:spPr/>
       <dgm:t>
@@ -1001,8 +1009,50 @@
         </a:p>
       </dgm:t>
     </dgm:pt>
-    <dgm:pt modelId="{1A05A2EB-B956-47F8-9799-A24CA3DEFB81}" type="pres">
-      <dgm:prSet presAssocID="{559FD288-FB9B-448A-806D-1CD8E2576BFB}" presName="root" presStyleCnt="0">
+    <dgm:pt modelId="{56FFF146-0B7B-4BF4-B20C-24F4777921CA}">
+      <dgm:prSet/>
+      <dgm:spPr/>
+      <dgm:t>
+        <a:bodyPr/>
+        <a:lstStyle/>
+        <a:p>
+          <a:pPr>
+            <a:lnSpc>
+              <a:spcPct val="100000"/>
+            </a:lnSpc>
+          </a:pPr>
+          <a:r>
+            <a:rPr lang="de-DE"/>
+            <a:t>Live Demo</a:t>
+          </a:r>
+          <a:endParaRPr lang="en-US"/>
+        </a:p>
+      </dgm:t>
+    </dgm:pt>
+    <dgm:pt modelId="{10196441-531F-40E8-ADFE-13EE683D66CB}" type="parTrans" cxnId="{12EA36B5-D8FD-4CD5-8212-19FA2C58A211}">
+      <dgm:prSet/>
+      <dgm:spPr/>
+      <dgm:t>
+        <a:bodyPr/>
+        <a:lstStyle/>
+        <a:p>
+          <a:endParaRPr lang="en-US"/>
+        </a:p>
+      </dgm:t>
+    </dgm:pt>
+    <dgm:pt modelId="{8B5F6EC8-F137-46CA-AF95-07270C298A02}" type="sibTrans" cxnId="{12EA36B5-D8FD-4CD5-8212-19FA2C58A211}">
+      <dgm:prSet/>
+      <dgm:spPr/>
+      <dgm:t>
+        <a:bodyPr/>
+        <a:lstStyle/>
+        <a:p>
+          <a:endParaRPr lang="en-US"/>
+        </a:p>
+      </dgm:t>
+    </dgm:pt>
+    <dgm:pt modelId="{ACE56B43-2A4A-4E70-9E87-64710A5DF97E}" type="pres">
+      <dgm:prSet presAssocID="{3DD52CC2-A763-45F0-989D-66B72F9BB5A7}" presName="root" presStyleCnt="0">
         <dgm:presLayoutVars>
           <dgm:dir/>
           <dgm:resizeHandles val="exact"/>
@@ -1010,23 +1060,12 @@
       </dgm:prSet>
       <dgm:spPr/>
     </dgm:pt>
-    <dgm:pt modelId="{8DC61ECE-DEF8-4797-BA10-92393BF3EA3D}" type="pres">
-      <dgm:prSet presAssocID="{6897197B-3FAB-4F80-9FAF-5B919A499483}" presName="compNode" presStyleCnt="0"/>
+    <dgm:pt modelId="{0214DC26-4A22-402B-A1BB-0A39D3C30678}" type="pres">
+      <dgm:prSet presAssocID="{6179FA6B-6E22-457E-AA9F-A88BDF6FDCF7}" presName="compNode" presStyleCnt="0"/>
       <dgm:spPr/>
     </dgm:pt>
-    <dgm:pt modelId="{1BF1F8C0-8021-46D2-896C-12AD938DB647}" type="pres">
-      <dgm:prSet presAssocID="{6897197B-3FAB-4F80-9FAF-5B919A499483}" presName="iconBgRect" presStyleLbl="bgShp" presStyleIdx="0" presStyleCnt="3"/>
-      <dgm:spPr>
-        <a:prstGeom prst="round2DiagRect">
-          <a:avLst>
-            <a:gd name="adj1" fmla="val 29727"/>
-            <a:gd name="adj2" fmla="val 0"/>
-          </a:avLst>
-        </a:prstGeom>
-      </dgm:spPr>
-    </dgm:pt>
-    <dgm:pt modelId="{CDEC2682-C9EA-49B7-B630-B5A19E5BB08A}" type="pres">
-      <dgm:prSet presAssocID="{6897197B-3FAB-4F80-9FAF-5B919A499483}" presName="iconRect" presStyleLbl="node1" presStyleIdx="0" presStyleCnt="3"/>
+    <dgm:pt modelId="{35746FF6-595E-4D6C-9EEA-9897AECBE2C6}" type="pres">
+      <dgm:prSet presAssocID="{6179FA6B-6E22-457E-AA9F-A88BDF6FDCF7}" presName="iconRect" presStyleLbl="node1" presStyleIdx="0" presStyleCnt="4"/>
       <dgm:spPr>
         <a:blipFill>
           <a:blip xmlns:r="http://schemas.openxmlformats.org/officeDocument/2006/relationships" r:embed="rId1">
@@ -1043,9 +1082,6 @@
             <a:fillRect/>
           </a:stretch>
         </a:blipFill>
-        <a:ln>
-          <a:noFill/>
-        </a:ln>
       </dgm:spPr>
       <dgm:extLst>
         <a:ext uri="{E40237B7-FDA0-4F09-8148-C483321AD2D9}">
@@ -1053,12 +1089,12 @@
         </a:ext>
       </dgm:extLst>
     </dgm:pt>
-    <dgm:pt modelId="{313BADA7-5BFC-40C2-830F-439019993F88}" type="pres">
-      <dgm:prSet presAssocID="{6897197B-3FAB-4F80-9FAF-5B919A499483}" presName="spaceRect" presStyleCnt="0"/>
+    <dgm:pt modelId="{77B8D3A9-8770-4F63-ACAA-6124D01B102C}" type="pres">
+      <dgm:prSet presAssocID="{6179FA6B-6E22-457E-AA9F-A88BDF6FDCF7}" presName="spaceRect" presStyleCnt="0"/>
       <dgm:spPr/>
     </dgm:pt>
-    <dgm:pt modelId="{81BB4BCD-C3F9-4DF5-A76A-2C2CC839ABDE}" type="pres">
-      <dgm:prSet presAssocID="{6897197B-3FAB-4F80-9FAF-5B919A499483}" presName="textRect" presStyleLbl="revTx" presStyleIdx="0" presStyleCnt="3">
+    <dgm:pt modelId="{D64CB0EA-0247-4ACB-BFBA-51964A50DC72}" type="pres">
+      <dgm:prSet presAssocID="{6179FA6B-6E22-457E-AA9F-A88BDF6FDCF7}" presName="textRect" presStyleLbl="revTx" presStyleIdx="0" presStyleCnt="4">
         <dgm:presLayoutVars>
           <dgm:chMax val="1"/>
           <dgm:chPref val="1"/>
@@ -1066,27 +1102,16 @@
       </dgm:prSet>
       <dgm:spPr/>
     </dgm:pt>
-    <dgm:pt modelId="{55CE4157-D053-4447-9450-A5CE73BD47BB}" type="pres">
-      <dgm:prSet presAssocID="{9C73A0E1-367E-439F-9A34-CE5022FDA8F9}" presName="sibTrans" presStyleCnt="0"/>
+    <dgm:pt modelId="{5B793C7F-9862-4E8E-98C7-E057BD5207F7}" type="pres">
+      <dgm:prSet presAssocID="{9654F6CC-66F4-4C84-85AA-7E62934979C9}" presName="sibTrans" presStyleCnt="0"/>
       <dgm:spPr/>
     </dgm:pt>
-    <dgm:pt modelId="{C084D14E-D7D1-496C-AD76-F1C3032527D5}" type="pres">
-      <dgm:prSet presAssocID="{15637258-B2B1-47FF-8CA4-709222999456}" presName="compNode" presStyleCnt="0"/>
+    <dgm:pt modelId="{95231216-3909-4F70-BA72-606CC0137A32}" type="pres">
+      <dgm:prSet presAssocID="{579D3A54-D7B1-4584-AC59-339C4879DC57}" presName="compNode" presStyleCnt="0"/>
       <dgm:spPr/>
     </dgm:pt>
-    <dgm:pt modelId="{EE09FE1C-8DC7-42C4-B6A2-32FABE2D7569}" type="pres">
-      <dgm:prSet presAssocID="{15637258-B2B1-47FF-8CA4-709222999456}" presName="iconBgRect" presStyleLbl="bgShp" presStyleIdx="1" presStyleCnt="3"/>
-      <dgm:spPr>
-        <a:prstGeom prst="round2DiagRect">
-          <a:avLst>
-            <a:gd name="adj1" fmla="val 29727"/>
-            <a:gd name="adj2" fmla="val 0"/>
-          </a:avLst>
-        </a:prstGeom>
-      </dgm:spPr>
-    </dgm:pt>
-    <dgm:pt modelId="{D292CC50-761B-4111-B4D5-03BD64A62937}" type="pres">
-      <dgm:prSet presAssocID="{15637258-B2B1-47FF-8CA4-709222999456}" presName="iconRect" presStyleLbl="node1" presStyleIdx="1" presStyleCnt="3"/>
+    <dgm:pt modelId="{9AEF652C-0FA0-4A99-9F37-B7BA24B332FA}" type="pres">
+      <dgm:prSet presAssocID="{579D3A54-D7B1-4584-AC59-339C4879DC57}" presName="iconRect" presStyleLbl="node1" presStyleIdx="1" presStyleCnt="4"/>
       <dgm:spPr>
         <a:blipFill>
           <a:blip xmlns:r="http://schemas.openxmlformats.org/officeDocument/2006/relationships" r:embed="rId3">
@@ -1103,9 +1128,6 @@
             <a:fillRect/>
           </a:stretch>
         </a:blipFill>
-        <a:ln>
-          <a:noFill/>
-        </a:ln>
       </dgm:spPr>
       <dgm:extLst>
         <a:ext uri="{E40237B7-FDA0-4F09-8148-C483321AD2D9}">
@@ -1113,12 +1135,12 @@
         </a:ext>
       </dgm:extLst>
     </dgm:pt>
-    <dgm:pt modelId="{A37036E1-7147-4F8D-AE92-BDD5D9DFF707}" type="pres">
-      <dgm:prSet presAssocID="{15637258-B2B1-47FF-8CA4-709222999456}" presName="spaceRect" presStyleCnt="0"/>
+    <dgm:pt modelId="{1ECDFBEF-BC40-475B-AF7B-77E83891FC9E}" type="pres">
+      <dgm:prSet presAssocID="{579D3A54-D7B1-4584-AC59-339C4879DC57}" presName="spaceRect" presStyleCnt="0"/>
       <dgm:spPr/>
     </dgm:pt>
-    <dgm:pt modelId="{0B3D473D-E15F-4A79-AC41-7CEA7BD9740F}" type="pres">
-      <dgm:prSet presAssocID="{15637258-B2B1-47FF-8CA4-709222999456}" presName="textRect" presStyleLbl="revTx" presStyleIdx="1" presStyleCnt="3">
+    <dgm:pt modelId="{7160FDA4-BC97-44C1-871B-54C3785EA1EC}" type="pres">
+      <dgm:prSet presAssocID="{579D3A54-D7B1-4584-AC59-339C4879DC57}" presName="textRect" presStyleLbl="revTx" presStyleIdx="1" presStyleCnt="4">
         <dgm:presLayoutVars>
           <dgm:chMax val="1"/>
           <dgm:chPref val="1"/>
@@ -1126,27 +1148,16 @@
       </dgm:prSet>
       <dgm:spPr/>
     </dgm:pt>
-    <dgm:pt modelId="{2C629EE7-325C-4EBD-8CB9-295D7E601885}" type="pres">
-      <dgm:prSet presAssocID="{F3A18858-8DB1-4B47-BC4E-009894BA46F9}" presName="sibTrans" presStyleCnt="0"/>
+    <dgm:pt modelId="{B780113A-F3BA-49A1-9350-5FBECCE0B7CA}" type="pres">
+      <dgm:prSet presAssocID="{CE319F30-83DD-4780-94AB-464B8B631524}" presName="sibTrans" presStyleCnt="0"/>
       <dgm:spPr/>
     </dgm:pt>
-    <dgm:pt modelId="{7F5BD639-AC47-4B48-80DE-52CBA9CA63B5}" type="pres">
-      <dgm:prSet presAssocID="{6E74844A-2DC5-4E46-893C-B8EBC57A18DA}" presName="compNode" presStyleCnt="0"/>
+    <dgm:pt modelId="{07E44ABC-079F-42F1-A8A7-CA2D678B3D17}" type="pres">
+      <dgm:prSet presAssocID="{5FF9BDC9-E0D6-4F67-B9F6-DBD93E945A8F}" presName="compNode" presStyleCnt="0"/>
       <dgm:spPr/>
     </dgm:pt>
-    <dgm:pt modelId="{5759DC80-8AAA-4BD0-A957-CB2422CE6B56}" type="pres">
-      <dgm:prSet presAssocID="{6E74844A-2DC5-4E46-893C-B8EBC57A18DA}" presName="iconBgRect" presStyleLbl="bgShp" presStyleIdx="2" presStyleCnt="3"/>
-      <dgm:spPr>
-        <a:prstGeom prst="round2DiagRect">
-          <a:avLst>
-            <a:gd name="adj1" fmla="val 29727"/>
-            <a:gd name="adj2" fmla="val 0"/>
-          </a:avLst>
-        </a:prstGeom>
-      </dgm:spPr>
-    </dgm:pt>
-    <dgm:pt modelId="{5BA583C4-6B4B-407A-93FA-3124B323D24B}" type="pres">
-      <dgm:prSet presAssocID="{6E74844A-2DC5-4E46-893C-B8EBC57A18DA}" presName="iconRect" presStyleLbl="node1" presStyleIdx="2" presStyleCnt="3"/>
+    <dgm:pt modelId="{A15B1896-83B1-4937-9CFF-3E7558BB88C0}" type="pres">
+      <dgm:prSet presAssocID="{5FF9BDC9-E0D6-4F67-B9F6-DBD93E945A8F}" presName="iconRect" presStyleLbl="node1" presStyleIdx="2" presStyleCnt="4"/>
       <dgm:spPr>
         <a:blipFill>
           <a:blip xmlns:r="http://schemas.openxmlformats.org/officeDocument/2006/relationships" r:embed="rId5">
@@ -1156,6 +1167,53 @@
               </a:ext>
               <a:ext uri="{96DAC541-7B7A-43D3-8B79-37D633B846F1}">
                 <asvg:svgBlip xmlns:asvg="http://schemas.microsoft.com/office/drawing/2016/SVG/main" r:embed="rId6"/>
+              </a:ext>
+            </a:extLst>
+          </a:blip>
+          <a:srcRect/>
+          <a:stretch>
+            <a:fillRect/>
+          </a:stretch>
+        </a:blipFill>
+      </dgm:spPr>
+      <dgm:extLst>
+        <a:ext uri="{E40237B7-FDA0-4F09-8148-C483321AD2D9}">
+          <dgm14:cNvPr xmlns:dgm14="http://schemas.microsoft.com/office/drawing/2010/diagram" id="0" name="" descr="Ambition mit einfarbiger Füllung"/>
+        </a:ext>
+      </dgm:extLst>
+    </dgm:pt>
+    <dgm:pt modelId="{F6435551-13D0-47FF-8AC2-FBD2D4C054D0}" type="pres">
+      <dgm:prSet presAssocID="{5FF9BDC9-E0D6-4F67-B9F6-DBD93E945A8F}" presName="spaceRect" presStyleCnt="0"/>
+      <dgm:spPr/>
+    </dgm:pt>
+    <dgm:pt modelId="{D1CBFEFA-7A82-4991-87A1-B4C28CA4580B}" type="pres">
+      <dgm:prSet presAssocID="{5FF9BDC9-E0D6-4F67-B9F6-DBD93E945A8F}" presName="textRect" presStyleLbl="revTx" presStyleIdx="2" presStyleCnt="4">
+        <dgm:presLayoutVars>
+          <dgm:chMax val="1"/>
+          <dgm:chPref val="1"/>
+        </dgm:presLayoutVars>
+      </dgm:prSet>
+      <dgm:spPr/>
+    </dgm:pt>
+    <dgm:pt modelId="{B4F9FC1F-09AD-49EE-92E4-3D84DAD287DE}" type="pres">
+      <dgm:prSet presAssocID="{BE1367A1-19B9-4B99-8E38-DDFDDB3C8790}" presName="sibTrans" presStyleCnt="0"/>
+      <dgm:spPr/>
+    </dgm:pt>
+    <dgm:pt modelId="{B6856CF6-B0C1-4769-9D62-7618AA7BD9BC}" type="pres">
+      <dgm:prSet presAssocID="{56FFF146-0B7B-4BF4-B20C-24F4777921CA}" presName="compNode" presStyleCnt="0"/>
+      <dgm:spPr/>
+    </dgm:pt>
+    <dgm:pt modelId="{0C532AAF-39FF-41CF-BF12-65D1DBB63F04}" type="pres">
+      <dgm:prSet presAssocID="{56FFF146-0B7B-4BF4-B20C-24F4777921CA}" presName="iconRect" presStyleLbl="node1" presStyleIdx="3" presStyleCnt="4"/>
+      <dgm:spPr>
+        <a:blipFill>
+          <a:blip xmlns:r="http://schemas.openxmlformats.org/officeDocument/2006/relationships" r:embed="rId7">
+            <a:extLst>
+              <a:ext uri="{28A0092B-C50C-407E-A947-70E740481C1C}">
+                <a14:useLocalDpi xmlns:a14="http://schemas.microsoft.com/office/drawing/2010/main" val="0"/>
+              </a:ext>
+              <a:ext uri="{96DAC541-7B7A-43D3-8B79-37D633B846F1}">
+                <asvg:svgBlip xmlns:asvg="http://schemas.microsoft.com/office/drawing/2016/SVG/main" r:embed="rId8"/>
               </a:ext>
             </a:extLst>
           </a:blip>
@@ -1163,9 +1221,6 @@
             <a:fillRect/>
           </a:stretch>
         </a:blipFill>
-        <a:ln>
-          <a:noFill/>
-        </a:ln>
       </dgm:spPr>
       <dgm:extLst>
         <a:ext uri="{E40237B7-FDA0-4F09-8148-C483321AD2D9}">
@@ -1173,12 +1228,12 @@
         </a:ext>
       </dgm:extLst>
     </dgm:pt>
-    <dgm:pt modelId="{9A9B5821-5ECD-4339-B8B9-8371D21CCF5F}" type="pres">
-      <dgm:prSet presAssocID="{6E74844A-2DC5-4E46-893C-B8EBC57A18DA}" presName="spaceRect" presStyleCnt="0"/>
+    <dgm:pt modelId="{A7AA45A5-94BE-4AEE-8F52-C889F88E6489}" type="pres">
+      <dgm:prSet presAssocID="{56FFF146-0B7B-4BF4-B20C-24F4777921CA}" presName="spaceRect" presStyleCnt="0"/>
       <dgm:spPr/>
     </dgm:pt>
-    <dgm:pt modelId="{29CAC306-4C12-403C-87E6-5C852F196ECB}" type="pres">
-      <dgm:prSet presAssocID="{6E74844A-2DC5-4E46-893C-B8EBC57A18DA}" presName="textRect" presStyleLbl="revTx" presStyleIdx="2" presStyleCnt="3">
+    <dgm:pt modelId="{BB8161B7-E784-4615-A142-2E46DDEA6B37}" type="pres">
+      <dgm:prSet presAssocID="{56FFF146-0B7B-4BF4-B20C-24F4777921CA}" presName="textRect" presStyleLbl="revTx" presStyleIdx="3" presStyleCnt="4">
         <dgm:presLayoutVars>
           <dgm:chMax val="1"/>
           <dgm:chPref val="1"/>
@@ -1188,30 +1243,34 @@
     </dgm:pt>
   </dgm:ptLst>
   <dgm:cxnLst>
-    <dgm:cxn modelId="{7F6D6221-A8F4-4027-9F44-7AE5F99800AD}" srcId="{559FD288-FB9B-448A-806D-1CD8E2576BFB}" destId="{6897197B-3FAB-4F80-9FAF-5B919A499483}" srcOrd="0" destOrd="0" parTransId="{3139994E-3040-402C-9053-3C804F718D0E}" sibTransId="{9C73A0E1-367E-439F-9A34-CE5022FDA8F9}"/>
-    <dgm:cxn modelId="{FDD94D22-B1CB-47EA-B37F-35BA8D845071}" srcId="{559FD288-FB9B-448A-806D-1CD8E2576BFB}" destId="{15637258-B2B1-47FF-8CA4-709222999456}" srcOrd="1" destOrd="0" parTransId="{A4E1A641-B5D7-4FFF-B658-669ABFAD8F47}" sibTransId="{F3A18858-8DB1-4B47-BC4E-009894BA46F9}"/>
-    <dgm:cxn modelId="{8296BA7D-8EA3-40BA-8F3D-2AA898F9E0A5}" type="presOf" srcId="{559FD288-FB9B-448A-806D-1CD8E2576BFB}" destId="{1A05A2EB-B956-47F8-9799-A24CA3DEFB81}" srcOrd="0" destOrd="0" presId="urn:microsoft.com/office/officeart/2018/5/layout/IconLeafLabelList"/>
-    <dgm:cxn modelId="{3EF40883-DA5E-45BD-A590-12E8B51CFA6F}" type="presOf" srcId="{6897197B-3FAB-4F80-9FAF-5B919A499483}" destId="{81BB4BCD-C3F9-4DF5-A76A-2C2CC839ABDE}" srcOrd="0" destOrd="0" presId="urn:microsoft.com/office/officeart/2018/5/layout/IconLeafLabelList"/>
-    <dgm:cxn modelId="{730E0BB3-A8F5-4B33-A6D7-BBA6E089A143}" srcId="{559FD288-FB9B-448A-806D-1CD8E2576BFB}" destId="{6E74844A-2DC5-4E46-893C-B8EBC57A18DA}" srcOrd="2" destOrd="0" parTransId="{8B18B01B-3F58-42A0-B1DD-4296D8B29FB0}" sibTransId="{02A3F3D9-E0BB-46A9-BED8-5FDA9BFDDA14}"/>
-    <dgm:cxn modelId="{65CFA2B9-5A18-48BA-A061-82B21D17F042}" type="presOf" srcId="{6E74844A-2DC5-4E46-893C-B8EBC57A18DA}" destId="{29CAC306-4C12-403C-87E6-5C852F196ECB}" srcOrd="0" destOrd="0" presId="urn:microsoft.com/office/officeart/2018/5/layout/IconLeafLabelList"/>
-    <dgm:cxn modelId="{E52792FF-C17F-4029-9E4E-39F9B8258B50}" type="presOf" srcId="{15637258-B2B1-47FF-8CA4-709222999456}" destId="{0B3D473D-E15F-4A79-AC41-7CEA7BD9740F}" srcOrd="0" destOrd="0" presId="urn:microsoft.com/office/officeart/2018/5/layout/IconLeafLabelList"/>
-    <dgm:cxn modelId="{7968FFEC-D3EB-4D94-BD5A-A6E5C487557E}" type="presParOf" srcId="{1A05A2EB-B956-47F8-9799-A24CA3DEFB81}" destId="{8DC61ECE-DEF8-4797-BA10-92393BF3EA3D}" srcOrd="0" destOrd="0" presId="urn:microsoft.com/office/officeart/2018/5/layout/IconLeafLabelList"/>
-    <dgm:cxn modelId="{BCBA2C5E-F3BF-4A21-B314-6B3D5C50B175}" type="presParOf" srcId="{8DC61ECE-DEF8-4797-BA10-92393BF3EA3D}" destId="{1BF1F8C0-8021-46D2-896C-12AD938DB647}" srcOrd="0" destOrd="0" presId="urn:microsoft.com/office/officeart/2018/5/layout/IconLeafLabelList"/>
-    <dgm:cxn modelId="{40A142B9-E98C-4052-9BA6-80F1F7B26E9A}" type="presParOf" srcId="{8DC61ECE-DEF8-4797-BA10-92393BF3EA3D}" destId="{CDEC2682-C9EA-49B7-B630-B5A19E5BB08A}" srcOrd="1" destOrd="0" presId="urn:microsoft.com/office/officeart/2018/5/layout/IconLeafLabelList"/>
-    <dgm:cxn modelId="{48BA7CAD-F601-48FE-ABEE-2F8352EA1554}" type="presParOf" srcId="{8DC61ECE-DEF8-4797-BA10-92393BF3EA3D}" destId="{313BADA7-5BFC-40C2-830F-439019993F88}" srcOrd="2" destOrd="0" presId="urn:microsoft.com/office/officeart/2018/5/layout/IconLeafLabelList"/>
-    <dgm:cxn modelId="{36556F14-68C4-4606-AD42-2E72640E8665}" type="presParOf" srcId="{8DC61ECE-DEF8-4797-BA10-92393BF3EA3D}" destId="{81BB4BCD-C3F9-4DF5-A76A-2C2CC839ABDE}" srcOrd="3" destOrd="0" presId="urn:microsoft.com/office/officeart/2018/5/layout/IconLeafLabelList"/>
-    <dgm:cxn modelId="{CF22745D-77F3-4FD9-A08A-D8B4D1798ABD}" type="presParOf" srcId="{1A05A2EB-B956-47F8-9799-A24CA3DEFB81}" destId="{55CE4157-D053-4447-9450-A5CE73BD47BB}" srcOrd="1" destOrd="0" presId="urn:microsoft.com/office/officeart/2018/5/layout/IconLeafLabelList"/>
-    <dgm:cxn modelId="{9BF417B0-66C3-48A6-A989-C4AE6849B513}" type="presParOf" srcId="{1A05A2EB-B956-47F8-9799-A24CA3DEFB81}" destId="{C084D14E-D7D1-496C-AD76-F1C3032527D5}" srcOrd="2" destOrd="0" presId="urn:microsoft.com/office/officeart/2018/5/layout/IconLeafLabelList"/>
-    <dgm:cxn modelId="{481D4D51-8E79-4B8F-886B-4188858D4703}" type="presParOf" srcId="{C084D14E-D7D1-496C-AD76-F1C3032527D5}" destId="{EE09FE1C-8DC7-42C4-B6A2-32FABE2D7569}" srcOrd="0" destOrd="0" presId="urn:microsoft.com/office/officeart/2018/5/layout/IconLeafLabelList"/>
-    <dgm:cxn modelId="{0BADAFDA-E30C-4462-840B-E2D5586DBFCE}" type="presParOf" srcId="{C084D14E-D7D1-496C-AD76-F1C3032527D5}" destId="{D292CC50-761B-4111-B4D5-03BD64A62937}" srcOrd="1" destOrd="0" presId="urn:microsoft.com/office/officeart/2018/5/layout/IconLeafLabelList"/>
-    <dgm:cxn modelId="{869BB933-6DDC-418E-96F5-7C070DC2B07B}" type="presParOf" srcId="{C084D14E-D7D1-496C-AD76-F1C3032527D5}" destId="{A37036E1-7147-4F8D-AE92-BDD5D9DFF707}" srcOrd="2" destOrd="0" presId="urn:microsoft.com/office/officeart/2018/5/layout/IconLeafLabelList"/>
-    <dgm:cxn modelId="{707A40C0-D3A7-4767-BC49-114E9CFE32D1}" type="presParOf" srcId="{C084D14E-D7D1-496C-AD76-F1C3032527D5}" destId="{0B3D473D-E15F-4A79-AC41-7CEA7BD9740F}" srcOrd="3" destOrd="0" presId="urn:microsoft.com/office/officeart/2018/5/layout/IconLeafLabelList"/>
-    <dgm:cxn modelId="{0B8FDFC0-2492-49DC-898C-F30F19438549}" type="presParOf" srcId="{1A05A2EB-B956-47F8-9799-A24CA3DEFB81}" destId="{2C629EE7-325C-4EBD-8CB9-295D7E601885}" srcOrd="3" destOrd="0" presId="urn:microsoft.com/office/officeart/2018/5/layout/IconLeafLabelList"/>
-    <dgm:cxn modelId="{0D893616-BED2-433C-A510-721061DEA9BA}" type="presParOf" srcId="{1A05A2EB-B956-47F8-9799-A24CA3DEFB81}" destId="{7F5BD639-AC47-4B48-80DE-52CBA9CA63B5}" srcOrd="4" destOrd="0" presId="urn:microsoft.com/office/officeart/2018/5/layout/IconLeafLabelList"/>
-    <dgm:cxn modelId="{F740D3F6-2E5A-454F-8840-808E311DA674}" type="presParOf" srcId="{7F5BD639-AC47-4B48-80DE-52CBA9CA63B5}" destId="{5759DC80-8AAA-4BD0-A957-CB2422CE6B56}" srcOrd="0" destOrd="0" presId="urn:microsoft.com/office/officeart/2018/5/layout/IconLeafLabelList"/>
-    <dgm:cxn modelId="{040C6D9B-F8FD-4379-B90B-F44E14E6A6F3}" type="presParOf" srcId="{7F5BD639-AC47-4B48-80DE-52CBA9CA63B5}" destId="{5BA583C4-6B4B-407A-93FA-3124B323D24B}" srcOrd="1" destOrd="0" presId="urn:microsoft.com/office/officeart/2018/5/layout/IconLeafLabelList"/>
-    <dgm:cxn modelId="{461D4BFF-5478-41F9-9645-30BC60A95D8D}" type="presParOf" srcId="{7F5BD639-AC47-4B48-80DE-52CBA9CA63B5}" destId="{9A9B5821-5ECD-4339-B8B9-8371D21CCF5F}" srcOrd="2" destOrd="0" presId="urn:microsoft.com/office/officeart/2018/5/layout/IconLeafLabelList"/>
-    <dgm:cxn modelId="{6A0D43A6-BF6C-4A2B-B007-F06710D18243}" type="presParOf" srcId="{7F5BD639-AC47-4B48-80DE-52CBA9CA63B5}" destId="{29CAC306-4C12-403C-87E6-5C852F196ECB}" srcOrd="3" destOrd="0" presId="urn:microsoft.com/office/officeart/2018/5/layout/IconLeafLabelList"/>
+    <dgm:cxn modelId="{EAC49A24-17CF-409F-A2DA-4E2BED95F0F1}" type="presOf" srcId="{5FF9BDC9-E0D6-4F67-B9F6-DBD93E945A8F}" destId="{D1CBFEFA-7A82-4991-87A1-B4C28CA4580B}" srcOrd="0" destOrd="0" presId="urn:microsoft.com/office/officeart/2018/2/layout/IconLabelList"/>
+    <dgm:cxn modelId="{D6636647-5EAC-499A-B451-399A0D0C4FC5}" type="presOf" srcId="{3DD52CC2-A763-45F0-989D-66B72F9BB5A7}" destId="{ACE56B43-2A4A-4E70-9E87-64710A5DF97E}" srcOrd="0" destOrd="0" presId="urn:microsoft.com/office/officeart/2018/2/layout/IconLabelList"/>
+    <dgm:cxn modelId="{D040D84A-FDC5-45AD-A1BE-4A20B745D5E6}" type="presOf" srcId="{56FFF146-0B7B-4BF4-B20C-24F4777921CA}" destId="{BB8161B7-E784-4615-A142-2E46DDEA6B37}" srcOrd="0" destOrd="0" presId="urn:microsoft.com/office/officeart/2018/2/layout/IconLabelList"/>
+    <dgm:cxn modelId="{2078189F-77D5-4517-A45E-59F51E232D54}" type="presOf" srcId="{6179FA6B-6E22-457E-AA9F-A88BDF6FDCF7}" destId="{D64CB0EA-0247-4ACB-BFBA-51964A50DC72}" srcOrd="0" destOrd="0" presId="urn:microsoft.com/office/officeart/2018/2/layout/IconLabelList"/>
+    <dgm:cxn modelId="{EB1C4CA1-FBE2-4EB1-85D3-A272AAC7E5F2}" srcId="{3DD52CC2-A763-45F0-989D-66B72F9BB5A7}" destId="{5FF9BDC9-E0D6-4F67-B9F6-DBD93E945A8F}" srcOrd="2" destOrd="0" parTransId="{32BE930B-D782-47A2-AEBD-6314028057FF}" sibTransId="{BE1367A1-19B9-4B99-8E38-DDFDDB3C8790}"/>
+    <dgm:cxn modelId="{665A87B4-C7E8-43D3-AA1D-7866E6EED3F7}" srcId="{3DD52CC2-A763-45F0-989D-66B72F9BB5A7}" destId="{579D3A54-D7B1-4584-AC59-339C4879DC57}" srcOrd="1" destOrd="0" parTransId="{9E2897AE-2615-442A-92D2-E98BAEFF3866}" sibTransId="{CE319F30-83DD-4780-94AB-464B8B631524}"/>
+    <dgm:cxn modelId="{12EA36B5-D8FD-4CD5-8212-19FA2C58A211}" srcId="{3DD52CC2-A763-45F0-989D-66B72F9BB5A7}" destId="{56FFF146-0B7B-4BF4-B20C-24F4777921CA}" srcOrd="3" destOrd="0" parTransId="{10196441-531F-40E8-ADFE-13EE683D66CB}" sibTransId="{8B5F6EC8-F137-46CA-AF95-07270C298A02}"/>
+    <dgm:cxn modelId="{EDECD0C5-F74B-42A5-90A0-373D50338EDB}" srcId="{3DD52CC2-A763-45F0-989D-66B72F9BB5A7}" destId="{6179FA6B-6E22-457E-AA9F-A88BDF6FDCF7}" srcOrd="0" destOrd="0" parTransId="{44F4A118-09DC-4B65-92CA-4EBC7AE321DE}" sibTransId="{9654F6CC-66F4-4C84-85AA-7E62934979C9}"/>
+    <dgm:cxn modelId="{C33E1ED4-2A55-4898-8369-EC54CC676827}" type="presOf" srcId="{579D3A54-D7B1-4584-AC59-339C4879DC57}" destId="{7160FDA4-BC97-44C1-871B-54C3785EA1EC}" srcOrd="0" destOrd="0" presId="urn:microsoft.com/office/officeart/2018/2/layout/IconLabelList"/>
+    <dgm:cxn modelId="{856187F9-5FFD-4854-A8E4-6C93332E5861}" type="presParOf" srcId="{ACE56B43-2A4A-4E70-9E87-64710A5DF97E}" destId="{0214DC26-4A22-402B-A1BB-0A39D3C30678}" srcOrd="0" destOrd="0" presId="urn:microsoft.com/office/officeart/2018/2/layout/IconLabelList"/>
+    <dgm:cxn modelId="{57C0409F-048B-4998-BA56-C52697BABD6B}" type="presParOf" srcId="{0214DC26-4A22-402B-A1BB-0A39D3C30678}" destId="{35746FF6-595E-4D6C-9EEA-9897AECBE2C6}" srcOrd="0" destOrd="0" presId="urn:microsoft.com/office/officeart/2018/2/layout/IconLabelList"/>
+    <dgm:cxn modelId="{8F011A14-E2D9-4DD6-9190-7610FFC66517}" type="presParOf" srcId="{0214DC26-4A22-402B-A1BB-0A39D3C30678}" destId="{77B8D3A9-8770-4F63-ACAA-6124D01B102C}" srcOrd="1" destOrd="0" presId="urn:microsoft.com/office/officeart/2018/2/layout/IconLabelList"/>
+    <dgm:cxn modelId="{2D262C12-374E-4455-A325-9A30AA0DC1EB}" type="presParOf" srcId="{0214DC26-4A22-402B-A1BB-0A39D3C30678}" destId="{D64CB0EA-0247-4ACB-BFBA-51964A50DC72}" srcOrd="2" destOrd="0" presId="urn:microsoft.com/office/officeart/2018/2/layout/IconLabelList"/>
+    <dgm:cxn modelId="{608EA8EE-093B-456E-8E7D-29720A4BD704}" type="presParOf" srcId="{ACE56B43-2A4A-4E70-9E87-64710A5DF97E}" destId="{5B793C7F-9862-4E8E-98C7-E057BD5207F7}" srcOrd="1" destOrd="0" presId="urn:microsoft.com/office/officeart/2018/2/layout/IconLabelList"/>
+    <dgm:cxn modelId="{5185D359-C77F-4874-97FB-678A8967770C}" type="presParOf" srcId="{ACE56B43-2A4A-4E70-9E87-64710A5DF97E}" destId="{95231216-3909-4F70-BA72-606CC0137A32}" srcOrd="2" destOrd="0" presId="urn:microsoft.com/office/officeart/2018/2/layout/IconLabelList"/>
+    <dgm:cxn modelId="{324AAC96-9858-4094-AE7C-A9F7DE6808AA}" type="presParOf" srcId="{95231216-3909-4F70-BA72-606CC0137A32}" destId="{9AEF652C-0FA0-4A99-9F37-B7BA24B332FA}" srcOrd="0" destOrd="0" presId="urn:microsoft.com/office/officeart/2018/2/layout/IconLabelList"/>
+    <dgm:cxn modelId="{0F342D25-1E1C-4C34-B0E2-AFA51AE82736}" type="presParOf" srcId="{95231216-3909-4F70-BA72-606CC0137A32}" destId="{1ECDFBEF-BC40-475B-AF7B-77E83891FC9E}" srcOrd="1" destOrd="0" presId="urn:microsoft.com/office/officeart/2018/2/layout/IconLabelList"/>
+    <dgm:cxn modelId="{1B348BEE-059D-432D-A724-AEF5676EE84C}" type="presParOf" srcId="{95231216-3909-4F70-BA72-606CC0137A32}" destId="{7160FDA4-BC97-44C1-871B-54C3785EA1EC}" srcOrd="2" destOrd="0" presId="urn:microsoft.com/office/officeart/2018/2/layout/IconLabelList"/>
+    <dgm:cxn modelId="{28DBE284-38AD-4703-9EA7-20A196DDA636}" type="presParOf" srcId="{ACE56B43-2A4A-4E70-9E87-64710A5DF97E}" destId="{B780113A-F3BA-49A1-9350-5FBECCE0B7CA}" srcOrd="3" destOrd="0" presId="urn:microsoft.com/office/officeart/2018/2/layout/IconLabelList"/>
+    <dgm:cxn modelId="{4C860CB8-9F87-4046-BFA7-09766C644100}" type="presParOf" srcId="{ACE56B43-2A4A-4E70-9E87-64710A5DF97E}" destId="{07E44ABC-079F-42F1-A8A7-CA2D678B3D17}" srcOrd="4" destOrd="0" presId="urn:microsoft.com/office/officeart/2018/2/layout/IconLabelList"/>
+    <dgm:cxn modelId="{1FD431B6-12CB-4B48-899B-1451766F6208}" type="presParOf" srcId="{07E44ABC-079F-42F1-A8A7-CA2D678B3D17}" destId="{A15B1896-83B1-4937-9CFF-3E7558BB88C0}" srcOrd="0" destOrd="0" presId="urn:microsoft.com/office/officeart/2018/2/layout/IconLabelList"/>
+    <dgm:cxn modelId="{FAB6A785-C42E-407F-A60C-BBDE8B18DD9F}" type="presParOf" srcId="{07E44ABC-079F-42F1-A8A7-CA2D678B3D17}" destId="{F6435551-13D0-47FF-8AC2-FBD2D4C054D0}" srcOrd="1" destOrd="0" presId="urn:microsoft.com/office/officeart/2018/2/layout/IconLabelList"/>
+    <dgm:cxn modelId="{16114B8C-1B4E-475D-B1A6-34B04FEB3E57}" type="presParOf" srcId="{07E44ABC-079F-42F1-A8A7-CA2D678B3D17}" destId="{D1CBFEFA-7A82-4991-87A1-B4C28CA4580B}" srcOrd="2" destOrd="0" presId="urn:microsoft.com/office/officeart/2018/2/layout/IconLabelList"/>
+    <dgm:cxn modelId="{E88D6BF9-91C0-4E01-ABF0-2CF80CB974DF}" type="presParOf" srcId="{ACE56B43-2A4A-4E70-9E87-64710A5DF97E}" destId="{B4F9FC1F-09AD-49EE-92E4-3D84DAD287DE}" srcOrd="5" destOrd="0" presId="urn:microsoft.com/office/officeart/2018/2/layout/IconLabelList"/>
+    <dgm:cxn modelId="{D1E07EC7-2CD6-4B57-B13C-0E23AED34FE4}" type="presParOf" srcId="{ACE56B43-2A4A-4E70-9E87-64710A5DF97E}" destId="{B6856CF6-B0C1-4769-9D62-7618AA7BD9BC}" srcOrd="6" destOrd="0" presId="urn:microsoft.com/office/officeart/2018/2/layout/IconLabelList"/>
+    <dgm:cxn modelId="{2ACFAF4D-D27A-4708-9920-A1E046D2DF29}" type="presParOf" srcId="{B6856CF6-B0C1-4769-9D62-7618AA7BD9BC}" destId="{0C532AAF-39FF-41CF-BF12-65D1DBB63F04}" srcOrd="0" destOrd="0" presId="urn:microsoft.com/office/officeart/2018/2/layout/IconLabelList"/>
+    <dgm:cxn modelId="{8FE9DDEB-805B-45CC-8EF4-BCDAE09CBA14}" type="presParOf" srcId="{B6856CF6-B0C1-4769-9D62-7618AA7BD9BC}" destId="{A7AA45A5-94BE-4AEE-8F52-C889F88E6489}" srcOrd="1" destOrd="0" presId="urn:microsoft.com/office/officeart/2018/2/layout/IconLabelList"/>
+    <dgm:cxn modelId="{1DA3DDC0-2781-4BCB-98BA-7DA883C16022}" type="presParOf" srcId="{B6856CF6-B0C1-4769-9D62-7618AA7BD9BC}" destId="{BB8161B7-E784-4615-A142-2E46DDEA6B37}" srcOrd="2" destOrd="0" presId="urn:microsoft.com/office/officeart/2018/2/layout/IconLabelList"/>
   </dgm:cxnLst>
   <dgm:bg/>
   <dgm:whole/>
@@ -1231,58 +1290,15 @@
       <dsp:cNvGrpSpPr/>
     </dsp:nvGrpSpPr>
     <dsp:grpSpPr/>
-    <dsp:sp modelId="{1BF1F8C0-8021-46D2-896C-12AD938DB647}">
+    <dsp:sp modelId="{35746FF6-595E-4D6C-9EEA-9897AECBE2C6}">
       <dsp:nvSpPr>
         <dsp:cNvPr id="0" name=""/>
         <dsp:cNvSpPr/>
       </dsp:nvSpPr>
       <dsp:spPr>
         <a:xfrm>
-          <a:off x="679050" y="376937"/>
-          <a:ext cx="1887187" cy="1887187"/>
-        </a:xfrm>
-        <a:prstGeom prst="round2DiagRect">
-          <a:avLst>
-            <a:gd name="adj1" fmla="val 29727"/>
-            <a:gd name="adj2" fmla="val 0"/>
-          </a:avLst>
-        </a:prstGeom>
-        <a:solidFill>
-          <a:schemeClr val="bg1">
-            <a:lumMod val="95000"/>
-            <a:hueOff val="0"/>
-            <a:satOff val="0"/>
-            <a:lumOff val="0"/>
-            <a:alphaOff val="0"/>
-          </a:schemeClr>
-        </a:solidFill>
-        <a:ln>
-          <a:noFill/>
-        </a:ln>
-        <a:effectLst/>
-      </dsp:spPr>
-      <dsp:style>
-        <a:lnRef idx="0">
-          <a:scrgbClr r="0" g="0" b="0"/>
-        </a:lnRef>
-        <a:fillRef idx="1">
-          <a:scrgbClr r="0" g="0" b="0"/>
-        </a:fillRef>
-        <a:effectRef idx="0">
-          <a:scrgbClr r="0" g="0" b="0"/>
-        </a:effectRef>
-        <a:fontRef idx="minor"/>
-      </dsp:style>
-    </dsp:sp>
-    <dsp:sp modelId="{CDEC2682-C9EA-49B7-B630-B5A19E5BB08A}">
-      <dsp:nvSpPr>
-        <dsp:cNvPr id="0" name=""/>
-        <dsp:cNvSpPr/>
-      </dsp:nvSpPr>
-      <dsp:spPr>
-        <a:xfrm>
-          <a:off x="1081237" y="779125"/>
-          <a:ext cx="1082812" cy="1082812"/>
+          <a:off x="1138979" y="1203549"/>
+          <a:ext cx="932563" cy="932563"/>
         </a:xfrm>
         <a:prstGeom prst="rect">
           <a:avLst/>
@@ -1303,7 +1319,14 @@
           </a:stretch>
         </a:blipFill>
         <a:ln w="12700" cap="flat" cmpd="sng" algn="ctr">
-          <a:noFill/>
+          <a:solidFill>
+            <a:schemeClr val="lt1">
+              <a:hueOff val="0"/>
+              <a:satOff val="0"/>
+              <a:lumOff val="0"/>
+              <a:alphaOff val="0"/>
+            </a:schemeClr>
+          </a:solidFill>
           <a:prstDash val="solid"/>
           <a:miter lim="800000"/>
         </a:ln>
@@ -1324,15 +1347,15 @@
         </a:fontRef>
       </dsp:style>
     </dsp:sp>
-    <dsp:sp modelId="{81BB4BCD-C3F9-4DF5-A76A-2C2CC839ABDE}">
+    <dsp:sp modelId="{D64CB0EA-0247-4ACB-BFBA-51964A50DC72}">
       <dsp:nvSpPr>
         <dsp:cNvPr id="0" name=""/>
         <dsp:cNvSpPr/>
       </dsp:nvSpPr>
       <dsp:spPr>
         <a:xfrm>
-          <a:off x="75768" y="2851938"/>
-          <a:ext cx="3093750" cy="720000"/>
+          <a:off x="569079" y="2427788"/>
+          <a:ext cx="2072362" cy="720000"/>
         </a:xfrm>
         <a:prstGeom prst="rect">
           <a:avLst/>
@@ -1361,9 +1384,9 @@
         </a:bodyPr>
         <a:lstStyle/>
         <a:p>
-          <a:pPr marL="0" lvl="0" indent="0" algn="ctr" defTabSz="1333500">
+          <a:pPr marL="0" lvl="0" indent="0" algn="ctr" defTabSz="1022350">
             <a:lnSpc>
-              <a:spcPct val="90000"/>
+              <a:spcPct val="100000"/>
             </a:lnSpc>
             <a:spcBef>
               <a:spcPct val="0"/>
@@ -1372,72 +1395,28 @@
               <a:spcPct val="35000"/>
             </a:spcAft>
             <a:buNone/>
-            <a:defRPr cap="all"/>
           </a:pPr>
           <a:r>
-            <a:rPr lang="de-DE" sz="3000" kern="1200"/>
+            <a:rPr lang="de-DE" sz="2300" kern="1200"/>
             <a:t>Motivation</a:t>
           </a:r>
-          <a:endParaRPr lang="en-US" sz="3000" kern="1200"/>
+          <a:endParaRPr lang="en-US" sz="2300" kern="1200"/>
         </a:p>
       </dsp:txBody>
       <dsp:txXfrm>
-        <a:off x="75768" y="2851938"/>
-        <a:ext cx="3093750" cy="720000"/>
+        <a:off x="569079" y="2427788"/>
+        <a:ext cx="2072362" cy="720000"/>
       </dsp:txXfrm>
     </dsp:sp>
-    <dsp:sp modelId="{EE09FE1C-8DC7-42C4-B6A2-32FABE2D7569}">
+    <dsp:sp modelId="{9AEF652C-0FA0-4A99-9F37-B7BA24B332FA}">
       <dsp:nvSpPr>
         <dsp:cNvPr id="0" name=""/>
         <dsp:cNvSpPr/>
       </dsp:nvSpPr>
       <dsp:spPr>
         <a:xfrm>
-          <a:off x="4314206" y="376937"/>
-          <a:ext cx="1887187" cy="1887187"/>
-        </a:xfrm>
-        <a:prstGeom prst="round2DiagRect">
-          <a:avLst>
-            <a:gd name="adj1" fmla="val 29727"/>
-            <a:gd name="adj2" fmla="val 0"/>
-          </a:avLst>
-        </a:prstGeom>
-        <a:solidFill>
-          <a:schemeClr val="bg1">
-            <a:lumMod val="95000"/>
-            <a:hueOff val="0"/>
-            <a:satOff val="0"/>
-            <a:lumOff val="0"/>
-            <a:alphaOff val="0"/>
-          </a:schemeClr>
-        </a:solidFill>
-        <a:ln>
-          <a:noFill/>
-        </a:ln>
-        <a:effectLst/>
-      </dsp:spPr>
-      <dsp:style>
-        <a:lnRef idx="0">
-          <a:scrgbClr r="0" g="0" b="0"/>
-        </a:lnRef>
-        <a:fillRef idx="1">
-          <a:scrgbClr r="0" g="0" b="0"/>
-        </a:fillRef>
-        <a:effectRef idx="0">
-          <a:scrgbClr r="0" g="0" b="0"/>
-        </a:effectRef>
-        <a:fontRef idx="minor"/>
-      </dsp:style>
-    </dsp:sp>
-    <dsp:sp modelId="{D292CC50-761B-4111-B4D5-03BD64A62937}">
-      <dsp:nvSpPr>
-        <dsp:cNvPr id="0" name=""/>
-        <dsp:cNvSpPr/>
-      </dsp:nvSpPr>
-      <dsp:spPr>
-        <a:xfrm>
-          <a:off x="4716393" y="779125"/>
-          <a:ext cx="1082812" cy="1082812"/>
+          <a:off x="3574005" y="1203549"/>
+          <a:ext cx="932563" cy="932563"/>
         </a:xfrm>
         <a:prstGeom prst="rect">
           <a:avLst/>
@@ -1458,7 +1437,14 @@
           </a:stretch>
         </a:blipFill>
         <a:ln w="12700" cap="flat" cmpd="sng" algn="ctr">
-          <a:noFill/>
+          <a:solidFill>
+            <a:schemeClr val="lt1">
+              <a:hueOff val="0"/>
+              <a:satOff val="0"/>
+              <a:lumOff val="0"/>
+              <a:alphaOff val="0"/>
+            </a:schemeClr>
+          </a:solidFill>
           <a:prstDash val="solid"/>
           <a:miter lim="800000"/>
         </a:ln>
@@ -1479,15 +1465,15 @@
         </a:fontRef>
       </dsp:style>
     </dsp:sp>
-    <dsp:sp modelId="{0B3D473D-E15F-4A79-AC41-7CEA7BD9740F}">
+    <dsp:sp modelId="{7160FDA4-BC97-44C1-871B-54C3785EA1EC}">
       <dsp:nvSpPr>
         <dsp:cNvPr id="0" name=""/>
         <dsp:cNvSpPr/>
       </dsp:nvSpPr>
       <dsp:spPr>
         <a:xfrm>
-          <a:off x="3710925" y="2851938"/>
-          <a:ext cx="3093750" cy="720000"/>
+          <a:off x="3004105" y="2427788"/>
+          <a:ext cx="2072362" cy="720000"/>
         </a:xfrm>
         <a:prstGeom prst="rect">
           <a:avLst/>
@@ -1516,9 +1502,9 @@
         </a:bodyPr>
         <a:lstStyle/>
         <a:p>
-          <a:pPr marL="0" lvl="0" indent="0" algn="ctr" defTabSz="1333500">
+          <a:pPr marL="0" lvl="0" indent="0" algn="ctr" defTabSz="1022350">
             <a:lnSpc>
-              <a:spcPct val="90000"/>
+              <a:spcPct val="100000"/>
             </a:lnSpc>
             <a:spcBef>
               <a:spcPct val="0"/>
@@ -1527,72 +1513,28 @@
               <a:spcPct val="35000"/>
             </a:spcAft>
             <a:buNone/>
-            <a:defRPr cap="all"/>
           </a:pPr>
           <a:r>
-            <a:rPr lang="de-DE" sz="3000" kern="1200"/>
+            <a:rPr lang="de-DE" sz="2300" kern="1200"/>
             <a:t>Funktionalitäten</a:t>
           </a:r>
-          <a:endParaRPr lang="en-US" sz="3000" kern="1200"/>
+          <a:endParaRPr lang="en-US" sz="2300" kern="1200"/>
         </a:p>
       </dsp:txBody>
       <dsp:txXfrm>
-        <a:off x="3710925" y="2851938"/>
-        <a:ext cx="3093750" cy="720000"/>
+        <a:off x="3004105" y="2427788"/>
+        <a:ext cx="2072362" cy="720000"/>
       </dsp:txXfrm>
     </dsp:sp>
-    <dsp:sp modelId="{5759DC80-8AAA-4BD0-A957-CB2422CE6B56}">
+    <dsp:sp modelId="{A15B1896-83B1-4937-9CFF-3E7558BB88C0}">
       <dsp:nvSpPr>
         <dsp:cNvPr id="0" name=""/>
         <dsp:cNvSpPr/>
       </dsp:nvSpPr>
       <dsp:spPr>
         <a:xfrm>
-          <a:off x="7949362" y="376937"/>
-          <a:ext cx="1887187" cy="1887187"/>
-        </a:xfrm>
-        <a:prstGeom prst="round2DiagRect">
-          <a:avLst>
-            <a:gd name="adj1" fmla="val 29727"/>
-            <a:gd name="adj2" fmla="val 0"/>
-          </a:avLst>
-        </a:prstGeom>
-        <a:solidFill>
-          <a:schemeClr val="bg1">
-            <a:lumMod val="95000"/>
-            <a:hueOff val="0"/>
-            <a:satOff val="0"/>
-            <a:lumOff val="0"/>
-            <a:alphaOff val="0"/>
-          </a:schemeClr>
-        </a:solidFill>
-        <a:ln>
-          <a:noFill/>
-        </a:ln>
-        <a:effectLst/>
-      </dsp:spPr>
-      <dsp:style>
-        <a:lnRef idx="0">
-          <a:scrgbClr r="0" g="0" b="0"/>
-        </a:lnRef>
-        <a:fillRef idx="1">
-          <a:scrgbClr r="0" g="0" b="0"/>
-        </a:fillRef>
-        <a:effectRef idx="0">
-          <a:scrgbClr r="0" g="0" b="0"/>
-        </a:effectRef>
-        <a:fontRef idx="minor"/>
-      </dsp:style>
-    </dsp:sp>
-    <dsp:sp modelId="{5BA583C4-6B4B-407A-93FA-3124B323D24B}">
-      <dsp:nvSpPr>
-        <dsp:cNvPr id="0" name=""/>
-        <dsp:cNvSpPr/>
-      </dsp:nvSpPr>
-      <dsp:spPr>
-        <a:xfrm>
-          <a:off x="8351550" y="779125"/>
-          <a:ext cx="1082812" cy="1082812"/>
+          <a:off x="6009031" y="1203549"/>
+          <a:ext cx="932563" cy="932563"/>
         </a:xfrm>
         <a:prstGeom prst="rect">
           <a:avLst/>
@@ -1608,12 +1550,20 @@
               </a:ext>
             </a:extLst>
           </a:blip>
+          <a:srcRect/>
           <a:stretch>
             <a:fillRect/>
           </a:stretch>
         </a:blipFill>
         <a:ln w="12700" cap="flat" cmpd="sng" algn="ctr">
-          <a:noFill/>
+          <a:solidFill>
+            <a:schemeClr val="lt1">
+              <a:hueOff val="0"/>
+              <a:satOff val="0"/>
+              <a:lumOff val="0"/>
+              <a:alphaOff val="0"/>
+            </a:schemeClr>
+          </a:solidFill>
           <a:prstDash val="solid"/>
           <a:miter lim="800000"/>
         </a:ln>
@@ -1634,15 +1584,15 @@
         </a:fontRef>
       </dsp:style>
     </dsp:sp>
-    <dsp:sp modelId="{29CAC306-4C12-403C-87E6-5C852F196ECB}">
+    <dsp:sp modelId="{D1CBFEFA-7A82-4991-87A1-B4C28CA4580B}">
       <dsp:nvSpPr>
         <dsp:cNvPr id="0" name=""/>
         <dsp:cNvSpPr/>
       </dsp:nvSpPr>
       <dsp:spPr>
         <a:xfrm>
-          <a:off x="7346081" y="2851938"/>
-          <a:ext cx="3093750" cy="720000"/>
+          <a:off x="5439131" y="2427788"/>
+          <a:ext cx="2072362" cy="720000"/>
         </a:xfrm>
         <a:prstGeom prst="rect">
           <a:avLst/>
@@ -1671,9 +1621,9 @@
         </a:bodyPr>
         <a:lstStyle/>
         <a:p>
-          <a:pPr marL="0" lvl="0" indent="0" algn="ctr" defTabSz="1333500">
+          <a:pPr marL="0" lvl="0" indent="0" algn="ctr" defTabSz="1022350">
             <a:lnSpc>
-              <a:spcPct val="90000"/>
+              <a:spcPct val="100000"/>
             </a:lnSpc>
             <a:spcBef>
               <a:spcPct val="0"/>
@@ -1682,18 +1632,135 @@
               <a:spcPct val="35000"/>
             </a:spcAft>
             <a:buNone/>
-            <a:defRPr cap="all"/>
           </a:pPr>
           <a:r>
-            <a:rPr lang="de-DE" sz="3000" kern="1200"/>
-            <a:t>Live Demo</a:t>
+            <a:rPr lang="de-AT" sz="2300" kern="1200"/>
+            <a:t>Was wir gemacht haben</a:t>
           </a:r>
-          <a:endParaRPr lang="en-US" sz="3000" kern="1200"/>
+          <a:endParaRPr lang="en-US" sz="2300" kern="1200"/>
         </a:p>
       </dsp:txBody>
       <dsp:txXfrm>
-        <a:off x="7346081" y="2851938"/>
-        <a:ext cx="3093750" cy="720000"/>
+        <a:off x="5439131" y="2427788"/>
+        <a:ext cx="2072362" cy="720000"/>
+      </dsp:txXfrm>
+    </dsp:sp>
+    <dsp:sp modelId="{0C532AAF-39FF-41CF-BF12-65D1DBB63F04}">
+      <dsp:nvSpPr>
+        <dsp:cNvPr id="0" name=""/>
+        <dsp:cNvSpPr/>
+      </dsp:nvSpPr>
+      <dsp:spPr>
+        <a:xfrm>
+          <a:off x="8444057" y="1203549"/>
+          <a:ext cx="932563" cy="932563"/>
+        </a:xfrm>
+        <a:prstGeom prst="rect">
+          <a:avLst/>
+        </a:prstGeom>
+        <a:blipFill>
+          <a:blip xmlns:r="http://schemas.openxmlformats.org/officeDocument/2006/relationships" r:embed="rId7">
+            <a:extLst>
+              <a:ext uri="{28A0092B-C50C-407E-A947-70E740481C1C}">
+                <a14:useLocalDpi xmlns:a14="http://schemas.microsoft.com/office/drawing/2010/main" val="0"/>
+              </a:ext>
+              <a:ext uri="{96DAC541-7B7A-43D3-8B79-37D633B846F1}">
+                <asvg:svgBlip xmlns:asvg="http://schemas.microsoft.com/office/drawing/2016/SVG/main" r:embed="rId8"/>
+              </a:ext>
+            </a:extLst>
+          </a:blip>
+          <a:stretch>
+            <a:fillRect/>
+          </a:stretch>
+        </a:blipFill>
+        <a:ln w="12700" cap="flat" cmpd="sng" algn="ctr">
+          <a:solidFill>
+            <a:schemeClr val="lt1">
+              <a:hueOff val="0"/>
+              <a:satOff val="0"/>
+              <a:lumOff val="0"/>
+              <a:alphaOff val="0"/>
+            </a:schemeClr>
+          </a:solidFill>
+          <a:prstDash val="solid"/>
+          <a:miter lim="800000"/>
+        </a:ln>
+        <a:effectLst/>
+      </dsp:spPr>
+      <dsp:style>
+        <a:lnRef idx="2">
+          <a:scrgbClr r="0" g="0" b="0"/>
+        </a:lnRef>
+        <a:fillRef idx="1">
+          <a:scrgbClr r="0" g="0" b="0"/>
+        </a:fillRef>
+        <a:effectRef idx="0">
+          <a:scrgbClr r="0" g="0" b="0"/>
+        </a:effectRef>
+        <a:fontRef idx="minor">
+          <a:schemeClr val="lt1"/>
+        </a:fontRef>
+      </dsp:style>
+    </dsp:sp>
+    <dsp:sp modelId="{BB8161B7-E784-4615-A142-2E46DDEA6B37}">
+      <dsp:nvSpPr>
+        <dsp:cNvPr id="0" name=""/>
+        <dsp:cNvSpPr/>
+      </dsp:nvSpPr>
+      <dsp:spPr>
+        <a:xfrm>
+          <a:off x="7874157" y="2427788"/>
+          <a:ext cx="2072362" cy="720000"/>
+        </a:xfrm>
+        <a:prstGeom prst="rect">
+          <a:avLst/>
+        </a:prstGeom>
+        <a:noFill/>
+        <a:ln>
+          <a:noFill/>
+        </a:ln>
+        <a:effectLst/>
+      </dsp:spPr>
+      <dsp:style>
+        <a:lnRef idx="0">
+          <a:scrgbClr r="0" g="0" b="0"/>
+        </a:lnRef>
+        <a:fillRef idx="0">
+          <a:scrgbClr r="0" g="0" b="0"/>
+        </a:fillRef>
+        <a:effectRef idx="0">
+          <a:scrgbClr r="0" g="0" b="0"/>
+        </a:effectRef>
+        <a:fontRef idx="minor"/>
+      </dsp:style>
+      <dsp:txBody>
+        <a:bodyPr spcFirstLastPara="0" vert="horz" wrap="square" lIns="0" tIns="0" rIns="0" bIns="0" numCol="1" spcCol="1270" anchor="t" anchorCtr="0">
+          <a:noAutofit/>
+        </a:bodyPr>
+        <a:lstStyle/>
+        <a:p>
+          <a:pPr marL="0" lvl="0" indent="0" algn="ctr" defTabSz="1022350">
+            <a:lnSpc>
+              <a:spcPct val="100000"/>
+            </a:lnSpc>
+            <a:spcBef>
+              <a:spcPct val="0"/>
+            </a:spcBef>
+            <a:spcAft>
+              <a:spcPct val="35000"/>
+            </a:spcAft>
+            <a:buNone/>
+          </a:pPr>
+          <a:r>
+            <a:rPr lang="de-DE" sz="2300" kern="1200"/>
+            <a:t>Live Demo</a:t>
+          </a:r>
+          <a:endParaRPr lang="en-US" sz="2300" kern="1200"/>
+        </a:p>
+      </dsp:txBody>
+      <dsp:txXfrm>
+        <a:off x="7874157" y="2427788"/>
+        <a:ext cx="2072362" cy="720000"/>
       </dsp:txXfrm>
     </dsp:sp>
   </dsp:spTree>
@@ -1701,8 +1768,8 @@
 </file>
 
 <file path=ppt/diagrams/layout1.xml><?xml version="1.0" encoding="utf-8"?>
-<dgm:layoutDef xmlns:dgm="http://schemas.openxmlformats.org/drawingml/2006/diagram" xmlns:a="http://schemas.openxmlformats.org/drawingml/2006/main" uniqueId="urn:microsoft.com/office/officeart/2018/5/layout/IconLeafLabelList">
-  <dgm:title val="Icon Leaf Label List"/>
+<dgm:layoutDef xmlns:dgm="http://schemas.openxmlformats.org/drawingml/2006/diagram" xmlns:a="http://schemas.openxmlformats.org/drawingml/2006/main" uniqueId="urn:microsoft.com/office/officeart/2018/2/layout/IconLabelList">
+  <dgm:title val="Icon Label List"/>
   <dgm:desc val="Use to show non-sequential or grouped chunks of information accompanied by a related visuals. Works best with icons or small pictures with short text captions."/>
   <dgm:catLst>
     <dgm:cat type="icon" pri="500"/>
@@ -1763,37 +1830,26 @@
       <dgm:if name="Name4" axis="ch" ptType="node" func="cnt" op="lte" val="2">
         <dgm:constrLst>
           <dgm:constr type="h" for="ch" forName="compNode" refType="h" fact="0.4"/>
-          <dgm:constr type="w" for="ch" forName="compNode" val="100"/>
+          <dgm:constr type="w" for="ch" forName="compNode" val="120"/>
           <dgm:constr type="w" for="ch" forName="sibTrans" refType="w" refFor="ch" refForName="compNode" fact="0.175"/>
           <dgm:constr type="sp" refType="w" refFor="ch" refForName="compNode" op="equ" fact="0.25"/>
-          <dgm:constr type="primFontSz" for="des" ptType="node" op="equ" val="44"/>
+          <dgm:constr type="primFontSz" for="des" ptType="node" op="equ" val="50"/>
           <dgm:constr type="h" for="des" forName="compNode" op="equ"/>
           <dgm:constr type="h" for="des" forName="textRect" op="equ"/>
         </dgm:constrLst>
       </dgm:if>
-      <dgm:if name="Name5" axis="ch" ptType="node" func="cnt" op="lte" val="3">
-        <dgm:constrLst>
-          <dgm:constr type="h" for="ch" forName="compNode" refType="h" fact="0.4"/>
-          <dgm:constr type="w" for="ch" forName="compNode" val="100"/>
-          <dgm:constr type="w" for="ch" forName="sibTrans" refType="w" refFor="ch" refForName="compNode" fact="0.175"/>
-          <dgm:constr type="sp" refType="w" refFor="ch" refForName="compNode" op="equ" fact="0.25"/>
-          <dgm:constr type="primFontSz" for="des" ptType="node" op="equ" val="40"/>
-          <dgm:constr type="h" for="des" forName="compNode" op="equ"/>
-          <dgm:constr type="h" for="des" forName="textRect" op="equ"/>
-        </dgm:constrLst>
-      </dgm:if>
-      <dgm:if name="Name6" axis="ch" ptType="node" func="cnt" op="lte" val="4">
+      <dgm:if name="Name5" axis="ch" ptType="node" func="cnt" op="lte" val="4">
         <dgm:constrLst>
           <dgm:constr type="h" for="ch" forName="compNode" refType="h" fact="0.4"/>
           <dgm:constr type="w" for="ch" forName="compNode" refType="w"/>
           <dgm:constr type="w" for="ch" forName="sibTrans" refType="w" refFor="ch" refForName="compNode" fact="0.175"/>
           <dgm:constr type="sp" refType="w" refFor="ch" refForName="compNode" op="equ" fact="0.25"/>
-          <dgm:constr type="primFontSz" for="des" ptType="node" op="equ" val="32"/>
+          <dgm:constr type="primFontSz" for="des" ptType="node" op="equ" val="36"/>
           <dgm:constr type="h" for="des" forName="compNode" op="equ"/>
           <dgm:constr type="h" for="des" forName="textRect" op="equ"/>
         </dgm:constrLst>
       </dgm:if>
-      <dgm:else name="Name7">
+      <dgm:else name="Name6">
         <dgm:constrLst>
           <dgm:constr type="h" for="ch" forName="compNode" refType="h" fact="0.4"/>
           <dgm:constr type="w" for="ch" forName="compNode" refType="w"/>
@@ -1808,7 +1864,7 @@
     <dgm:ruleLst>
       <dgm:rule type="w" for="ch" forName="compNode" val="50" fact="NaN" max="NaN"/>
     </dgm:ruleLst>
-    <dgm:forEach name="Name8" axis="ch" ptType="node">
+    <dgm:forEach name="Name7" axis="ch" ptType="node">
       <dgm:layoutNode name="compNode">
         <dgm:alg type="composite"/>
         <dgm:shape xmlns:r="http://schemas.openxmlformats.org/officeDocument/2006/relationships" r:blip="">
@@ -1816,18 +1872,14 @@
         </dgm:shape>
         <dgm:presOf axis="self"/>
         <dgm:constrLst>
-          <dgm:constr type="w" for="ch" forName="iconBgRect" refType="w" fact="0.61"/>
-          <dgm:constr type="h" for="ch" forName="iconBgRect" refType="w" refFor="ch" refForName="iconBgRect"/>
-          <dgm:constr type="t" for="ch" forName="iconBgRect"/>
-          <dgm:constr type="ctrX" for="ch" forName="iconBgRect" refType="w" fact="0.5"/>
-          <dgm:constr type="w" for="ch" forName="iconRect" refType="w" fact="0.35"/>
+          <dgm:constr type="w" for="ch" forName="iconRect" refType="w" fact="0.45"/>
           <dgm:constr type="h" for="ch" forName="iconRect" refType="w" refFor="ch" refForName="iconRect"/>
-          <dgm:constr type="ctrX" for="ch" forName="iconRect" refType="ctrX" refFor="ch" refForName="iconBgRect"/>
-          <dgm:constr type="ctrY" for="ch" forName="iconRect" refType="ctrY" refFor="ch" refForName="iconBgRect"/>
-          <dgm:constr type="h" for="ch" forName="spaceRect" refType="w" fact="0.19"/>
+          <dgm:constr type="ctrX" for="ch" forName="iconRect" refType="w" fact="0.5"/>
+          <dgm:constr type="t" for="ch" forName="iconRect"/>
+          <dgm:constr type="h" for="ch" forName="spaceRect" refType="h" fact="0.15"/>
           <dgm:constr type="w" for="ch" forName="spaceRect" refType="w"/>
           <dgm:constr type="l" for="ch" forName="spaceRect"/>
-          <dgm:constr type="t" for="ch" forName="spaceRect" refType="b" refFor="ch" refForName="iconBgRect"/>
+          <dgm:constr type="t" for="ch" forName="spaceRect" refType="b" refFor="ch" refForName="iconRect"/>
           <dgm:constr type="h" for="ch" forName="textRect" val="20"/>
           <dgm:constr type="w" for="ch" forName="textRect" refType="w"/>
           <dgm:constr type="l" for="ch" forName="textRect"/>
@@ -1836,27 +1888,6 @@
         <dgm:ruleLst>
           <dgm:rule type="h" val="INF" fact="NaN" max="NaN"/>
         </dgm:ruleLst>
-        <dgm:layoutNode name="iconBgRect" styleLbl="bgShp">
-          <dgm:alg type="sp"/>
-          <dgm:shape xmlns:r="http://schemas.openxmlformats.org/officeDocument/2006/relationships" type="round2DiagRect" r:blip="">
-            <dgm:adjLst/>
-            <dgm:extLst>
-              <a:ext uri="{B698B0E9-8C71-41B9-8309-B3DCBF30829C}">
-                <dgm1612:spPr xmlns:dgm1612="http://schemas.microsoft.com/office/drawing/2016/12/diagram">
-                  <a:prstGeom prst="round2DiagRect">
-                    <a:avLst>
-                      <a:gd name="adj1" fmla="val 29727"/>
-                      <a:gd name="adj2" fmla="val 0"/>
-                    </a:avLst>
-                  </a:prstGeom>
-                </dgm1612:spPr>
-              </a:ext>
-            </dgm:extLst>
-          </dgm:shape>
-          <dgm:presOf/>
-          <dgm:constrLst/>
-          <dgm:ruleLst/>
-        </dgm:layoutNode>
         <dgm:layoutNode name="iconRect" styleLbl="node1">
           <dgm:alg type="sp"/>
           <dgm:shape xmlns:r="http://schemas.openxmlformats.org/officeDocument/2006/relationships" type="rect" r:blip="" blipPhldr="1">
@@ -1899,7 +1930,7 @@
           </dgm:ruleLst>
         </dgm:layoutNode>
       </dgm:layoutNode>
-      <dgm:forEach name="Name9" axis="followSib" ptType="sibTrans" cnt="1">
+      <dgm:forEach name="Name8" axis="followSib" ptType="sibTrans" cnt="1">
         <dgm:layoutNode name="sibTrans">
           <dgm:alg type="sp"/>
           <dgm:shape xmlns:r="http://schemas.openxmlformats.org/officeDocument/2006/relationships" r:blip="">
@@ -1919,7 +1950,6 @@
           <a:lnSpc>
             <a:spcPct val="100000"/>
           </a:lnSpc>
-          <a:defRPr cap="all"/>
         </a:lvl1pPr>
       </dgm1612:lstStyle>
     </a:ext>
@@ -6407,6 +6437,436 @@
 </p:sld>
 </file>
 
+<file path=ppt/slides/slide10.xml><?xml version="1.0" encoding="utf-8"?>
+<p:sld xmlns:a="http://schemas.openxmlformats.org/drawingml/2006/main" xmlns:r="http://schemas.openxmlformats.org/officeDocument/2006/relationships" xmlns:p="http://schemas.openxmlformats.org/presentationml/2006/main">
+  <p:cSld>
+    <p:bg>
+      <p:bgPr>
+        <a:solidFill>
+          <a:srgbClr val="000000"/>
+        </a:solidFill>
+        <a:effectLst/>
+      </p:bgPr>
+    </p:bg>
+    <p:spTree>
+      <p:nvGrpSpPr>
+        <p:cNvPr id="1" name=""/>
+        <p:cNvGrpSpPr/>
+        <p:nvPr/>
+      </p:nvGrpSpPr>
+      <p:grpSpPr>
+        <a:xfrm>
+          <a:off x="0" y="0"/>
+          <a:ext cx="0" cy="0"/>
+          <a:chOff x="0" y="0"/>
+          <a:chExt cx="0" cy="0"/>
+        </a:xfrm>
+      </p:grpSpPr>
+      <p:sp>
+        <p:nvSpPr>
+          <p:cNvPr id="10" name="Rectangle 9">
+            <a:extLst>
+              <a:ext uri="{FF2B5EF4-FFF2-40B4-BE49-F238E27FC236}">
+                <a16:creationId xmlns:a16="http://schemas.microsoft.com/office/drawing/2014/main" id="{71B2258F-86CA-4D4D-8270-BC05FCDEBFB3}"/>
+              </a:ext>
+              <a:ext uri="{C183D7F6-B498-43B3-948B-1728B52AA6E4}">
+                <adec:decorative xmlns:adec="http://schemas.microsoft.com/office/drawing/2017/decorative" val="1"/>
+              </a:ext>
+            </a:extLst>
+          </p:cNvPr>
+          <p:cNvSpPr>
+            <a:spLocks noGrp="1" noRot="1" noChangeAspect="1" noMove="1" noResize="1" noEditPoints="1" noAdjustHandles="1" noChangeArrowheads="1" noChangeShapeType="1" noTextEdit="1"/>
+          </p:cNvSpPr>
+          <p:nvPr>
+            <p:extLst>
+              <p:ext uri="{386F3935-93C4-4BCD-93E2-E3B085C9AB24}">
+                <p16:designElem xmlns:p16="http://schemas.microsoft.com/office/powerpoint/2015/main" val="1"/>
+              </p:ext>
+            </p:extLst>
+          </p:nvPr>
+        </p:nvSpPr>
+        <p:spPr>
+          <a:xfrm>
+            <a:off x="0" y="0"/>
+            <a:ext cx="12192000" cy="6857999"/>
+          </a:xfrm>
+          <a:prstGeom prst="rect">
+            <a:avLst/>
+          </a:prstGeom>
+          <a:solidFill>
+            <a:srgbClr val="000000"/>
+          </a:solidFill>
+          <a:ln>
+            <a:noFill/>
+          </a:ln>
+        </p:spPr>
+        <p:style>
+          <a:lnRef idx="2">
+            <a:schemeClr val="accent1">
+              <a:shade val="50000"/>
+            </a:schemeClr>
+          </a:lnRef>
+          <a:fillRef idx="1">
+            <a:schemeClr val="accent1"/>
+          </a:fillRef>
+          <a:effectRef idx="0">
+            <a:schemeClr val="accent1"/>
+          </a:effectRef>
+          <a:fontRef idx="minor">
+            <a:schemeClr val="lt1"/>
+          </a:fontRef>
+        </p:style>
+        <p:txBody>
+          <a:bodyPr rtlCol="0" anchor="ctr"/>
+          <a:lstStyle/>
+          <a:p>
+            <a:pPr algn="ctr"/>
+            <a:endParaRPr lang="en-US"/>
+          </a:p>
+        </p:txBody>
+      </p:sp>
+      <p:pic>
+        <p:nvPicPr>
+          <p:cNvPr id="5" name="Grafik 4" descr="Ein Bild, das Entwurf, Zeichnung, Clipart, Darstellung enthält.&#10;&#10;Automatisch generierte Beschreibung">
+            <a:extLst>
+              <a:ext uri="{FF2B5EF4-FFF2-40B4-BE49-F238E27FC236}">
+                <a16:creationId xmlns:a16="http://schemas.microsoft.com/office/drawing/2014/main" id="{DF55B904-3997-7331-CF04-6E9348515771}"/>
+              </a:ext>
+            </a:extLst>
+          </p:cNvPr>
+          <p:cNvPicPr>
+            <a:picLocks noChangeAspect="1"/>
+          </p:cNvPicPr>
+          <p:nvPr/>
+        </p:nvPicPr>
+        <p:blipFill rotWithShape="1">
+          <a:blip r:embed="rId2">
+            <a:alphaModFix amt="50000"/>
+            <a:extLst>
+              <a:ext uri="{28A0092B-C50C-407E-A947-70E740481C1C}">
+                <a14:useLocalDpi xmlns:a14="http://schemas.microsoft.com/office/drawing/2010/main" val="0"/>
+              </a:ext>
+            </a:extLst>
+          </a:blip>
+          <a:srcRect t="21568" b="22182"/>
+          <a:stretch/>
+        </p:blipFill>
+        <p:spPr>
+          <a:xfrm>
+            <a:off x="20" y="1"/>
+            <a:ext cx="12191980" cy="6857999"/>
+          </a:xfrm>
+          <a:prstGeom prst="rect">
+            <a:avLst/>
+          </a:prstGeom>
+        </p:spPr>
+      </p:pic>
+      <p:sp>
+        <p:nvSpPr>
+          <p:cNvPr id="2" name="Titel 1">
+            <a:extLst>
+              <a:ext uri="{FF2B5EF4-FFF2-40B4-BE49-F238E27FC236}">
+                <a16:creationId xmlns:a16="http://schemas.microsoft.com/office/drawing/2014/main" id="{486F8E60-515E-DD72-8C61-48A809BAEB8A}"/>
+              </a:ext>
+            </a:extLst>
+          </p:cNvPr>
+          <p:cNvSpPr>
+            <a:spLocks noGrp="1"/>
+          </p:cNvSpPr>
+          <p:nvPr>
+            <p:ph type="ctrTitle"/>
+          </p:nvPr>
+        </p:nvSpPr>
+        <p:spPr>
+          <a:xfrm>
+            <a:off x="1524000" y="1122362"/>
+            <a:ext cx="9144000" cy="2900518"/>
+          </a:xfrm>
+        </p:spPr>
+        <p:txBody>
+          <a:bodyPr>
+            <a:normAutofit/>
+          </a:bodyPr>
+          <a:lstStyle/>
+          <a:p>
+            <a:r>
+              <a:rPr lang="de-AT" sz="7200" b="1" dirty="0">
+                <a:solidFill>
+                  <a:srgbClr val="FFFFFF"/>
+                </a:solidFill>
+              </a:rPr>
+              <a:t>Live Demo</a:t>
+            </a:r>
+          </a:p>
+        </p:txBody>
+      </p:sp>
+      <p:sp>
+        <p:nvSpPr>
+          <p:cNvPr id="3" name="Untertitel 2">
+            <a:extLst>
+              <a:ext uri="{FF2B5EF4-FFF2-40B4-BE49-F238E27FC236}">
+                <a16:creationId xmlns:a16="http://schemas.microsoft.com/office/drawing/2014/main" id="{0E8967FC-619E-3B3C-E98A-C8D97714019C}"/>
+              </a:ext>
+            </a:extLst>
+          </p:cNvPr>
+          <p:cNvSpPr>
+            <a:spLocks noGrp="1"/>
+          </p:cNvSpPr>
+          <p:nvPr>
+            <p:ph type="subTitle" idx="1"/>
+          </p:nvPr>
+        </p:nvSpPr>
+        <p:spPr>
+          <a:xfrm>
+            <a:off x="1524000" y="4159404"/>
+            <a:ext cx="9144000" cy="1098395"/>
+          </a:xfrm>
+        </p:spPr>
+        <p:txBody>
+          <a:bodyPr>
+            <a:normAutofit/>
+          </a:bodyPr>
+          <a:lstStyle/>
+          <a:p>
+            <a:endParaRPr lang="de-AT">
+              <a:solidFill>
+                <a:srgbClr val="FFFFFF"/>
+              </a:solidFill>
+            </a:endParaRPr>
+          </a:p>
+        </p:txBody>
+      </p:sp>
+    </p:spTree>
+    <p:extLst>
+      <p:ext uri="{BB962C8B-B14F-4D97-AF65-F5344CB8AC3E}">
+        <p14:creationId xmlns:p14="http://schemas.microsoft.com/office/powerpoint/2010/main" val="1876321446"/>
+      </p:ext>
+    </p:extLst>
+  </p:cSld>
+  <p:clrMapOvr>
+    <a:overrideClrMapping bg1="dk1" tx1="lt1" bg2="dk2" tx2="lt2" accent1="accent1" accent2="accent2" accent3="accent3" accent4="accent4" accent5="accent5" accent6="accent6" hlink="hlink" folHlink="folHlink"/>
+  </p:clrMapOvr>
+</p:sld>
+</file>
+
+<file path=ppt/slides/slide11.xml><?xml version="1.0" encoding="utf-8"?>
+<p:sld xmlns:a="http://schemas.openxmlformats.org/drawingml/2006/main" xmlns:r="http://schemas.openxmlformats.org/officeDocument/2006/relationships" xmlns:p="http://schemas.openxmlformats.org/presentationml/2006/main">
+  <p:cSld>
+    <p:bg>
+      <p:bgPr>
+        <a:solidFill>
+          <a:srgbClr val="000000"/>
+        </a:solidFill>
+        <a:effectLst/>
+      </p:bgPr>
+    </p:bg>
+    <p:spTree>
+      <p:nvGrpSpPr>
+        <p:cNvPr id="1" name=""/>
+        <p:cNvGrpSpPr/>
+        <p:nvPr/>
+      </p:nvGrpSpPr>
+      <p:grpSpPr>
+        <a:xfrm>
+          <a:off x="0" y="0"/>
+          <a:ext cx="0" cy="0"/>
+          <a:chOff x="0" y="0"/>
+          <a:chExt cx="0" cy="0"/>
+        </a:xfrm>
+      </p:grpSpPr>
+      <p:sp>
+        <p:nvSpPr>
+          <p:cNvPr id="10" name="Rectangle 9">
+            <a:extLst>
+              <a:ext uri="{FF2B5EF4-FFF2-40B4-BE49-F238E27FC236}">
+                <a16:creationId xmlns:a16="http://schemas.microsoft.com/office/drawing/2014/main" id="{71B2258F-86CA-4D4D-8270-BC05FCDEBFB3}"/>
+              </a:ext>
+              <a:ext uri="{C183D7F6-B498-43B3-948B-1728B52AA6E4}">
+                <adec:decorative xmlns:adec="http://schemas.microsoft.com/office/drawing/2017/decorative" val="1"/>
+              </a:ext>
+            </a:extLst>
+          </p:cNvPr>
+          <p:cNvSpPr>
+            <a:spLocks noGrp="1" noRot="1" noChangeAspect="1" noMove="1" noResize="1" noEditPoints="1" noAdjustHandles="1" noChangeArrowheads="1" noChangeShapeType="1" noTextEdit="1"/>
+          </p:cNvSpPr>
+          <p:nvPr>
+            <p:extLst>
+              <p:ext uri="{386F3935-93C4-4BCD-93E2-E3B085C9AB24}">
+                <p16:designElem xmlns:p16="http://schemas.microsoft.com/office/powerpoint/2015/main" val="1"/>
+              </p:ext>
+            </p:extLst>
+          </p:nvPr>
+        </p:nvSpPr>
+        <p:spPr>
+          <a:xfrm>
+            <a:off x="0" y="0"/>
+            <a:ext cx="12192000" cy="6857999"/>
+          </a:xfrm>
+          <a:prstGeom prst="rect">
+            <a:avLst/>
+          </a:prstGeom>
+          <a:solidFill>
+            <a:srgbClr val="000000"/>
+          </a:solidFill>
+          <a:ln>
+            <a:noFill/>
+          </a:ln>
+        </p:spPr>
+        <p:style>
+          <a:lnRef idx="2">
+            <a:schemeClr val="accent1">
+              <a:shade val="50000"/>
+            </a:schemeClr>
+          </a:lnRef>
+          <a:fillRef idx="1">
+            <a:schemeClr val="accent1"/>
+          </a:fillRef>
+          <a:effectRef idx="0">
+            <a:schemeClr val="accent1"/>
+          </a:effectRef>
+          <a:fontRef idx="minor">
+            <a:schemeClr val="lt1"/>
+          </a:fontRef>
+        </p:style>
+        <p:txBody>
+          <a:bodyPr rtlCol="0" anchor="ctr"/>
+          <a:lstStyle/>
+          <a:p>
+            <a:pPr algn="ctr"/>
+            <a:endParaRPr lang="en-US"/>
+          </a:p>
+        </p:txBody>
+      </p:sp>
+      <p:pic>
+        <p:nvPicPr>
+          <p:cNvPr id="5" name="Grafik 4" descr="Ein Bild, das Entwurf, Zeichnung, Clipart, Darstellung enthält.&#10;&#10;Automatisch generierte Beschreibung">
+            <a:extLst>
+              <a:ext uri="{FF2B5EF4-FFF2-40B4-BE49-F238E27FC236}">
+                <a16:creationId xmlns:a16="http://schemas.microsoft.com/office/drawing/2014/main" id="{E5996C1B-D19D-CB93-953D-E0F13860FB4C}"/>
+              </a:ext>
+            </a:extLst>
+          </p:cNvPr>
+          <p:cNvPicPr>
+            <a:picLocks noChangeAspect="1"/>
+          </p:cNvPicPr>
+          <p:nvPr/>
+        </p:nvPicPr>
+        <p:blipFill rotWithShape="1">
+          <a:blip r:embed="rId2">
+            <a:alphaModFix amt="50000"/>
+            <a:extLst>
+              <a:ext uri="{28A0092B-C50C-407E-A947-70E740481C1C}">
+                <a14:useLocalDpi xmlns:a14="http://schemas.microsoft.com/office/drawing/2010/main" val="0"/>
+              </a:ext>
+            </a:extLst>
+          </a:blip>
+          <a:srcRect t="21568" b="22182"/>
+          <a:stretch/>
+        </p:blipFill>
+        <p:spPr>
+          <a:xfrm>
+            <a:off x="20" y="10"/>
+            <a:ext cx="12191980" cy="6857990"/>
+          </a:xfrm>
+          <a:prstGeom prst="rect">
+            <a:avLst/>
+          </a:prstGeom>
+        </p:spPr>
+      </p:pic>
+      <p:sp>
+        <p:nvSpPr>
+          <p:cNvPr id="2" name="Titel 1">
+            <a:extLst>
+              <a:ext uri="{FF2B5EF4-FFF2-40B4-BE49-F238E27FC236}">
+                <a16:creationId xmlns:a16="http://schemas.microsoft.com/office/drawing/2014/main" id="{CBFA93A0-BA12-6A64-0021-E04D7644D509}"/>
+              </a:ext>
+            </a:extLst>
+          </p:cNvPr>
+          <p:cNvSpPr>
+            <a:spLocks noGrp="1"/>
+          </p:cNvSpPr>
+          <p:nvPr>
+            <p:ph type="ctrTitle"/>
+          </p:nvPr>
+        </p:nvSpPr>
+        <p:spPr>
+          <a:xfrm>
+            <a:off x="1524000" y="1122362"/>
+            <a:ext cx="9144000" cy="2900518"/>
+          </a:xfrm>
+        </p:spPr>
+        <p:txBody>
+          <a:bodyPr>
+            <a:normAutofit/>
+          </a:bodyPr>
+          <a:lstStyle/>
+          <a:p>
+            <a:r>
+              <a:rPr lang="de-AT" sz="6600" b="1" dirty="0">
+                <a:ln w="22225">
+                  <a:solidFill>
+                    <a:schemeClr val="tx1"/>
+                  </a:solidFill>
+                  <a:miter lim="800000"/>
+                </a:ln>
+                <a:solidFill>
+                  <a:srgbClr val="FFFFFF"/>
+                </a:solidFill>
+              </a:rPr>
+              <a:t>VIELEN DANK FÜR EURE AUFMERKSAMKEIT</a:t>
+            </a:r>
+          </a:p>
+        </p:txBody>
+      </p:sp>
+      <p:sp>
+        <p:nvSpPr>
+          <p:cNvPr id="3" name="Untertitel 2">
+            <a:extLst>
+              <a:ext uri="{FF2B5EF4-FFF2-40B4-BE49-F238E27FC236}">
+                <a16:creationId xmlns:a16="http://schemas.microsoft.com/office/drawing/2014/main" id="{24ED2226-889D-6A68-BB41-1B7BAC6BA60A}"/>
+              </a:ext>
+            </a:extLst>
+          </p:cNvPr>
+          <p:cNvSpPr>
+            <a:spLocks noGrp="1"/>
+          </p:cNvSpPr>
+          <p:nvPr>
+            <p:ph type="subTitle" idx="1"/>
+          </p:nvPr>
+        </p:nvSpPr>
+        <p:spPr>
+          <a:xfrm>
+            <a:off x="1524000" y="4159404"/>
+            <a:ext cx="9144000" cy="1098395"/>
+          </a:xfrm>
+        </p:spPr>
+        <p:txBody>
+          <a:bodyPr>
+            <a:normAutofit/>
+          </a:bodyPr>
+          <a:lstStyle/>
+          <a:p>
+            <a:endParaRPr lang="de-AT">
+              <a:solidFill>
+                <a:srgbClr val="FFFFFF"/>
+              </a:solidFill>
+            </a:endParaRPr>
+          </a:p>
+        </p:txBody>
+      </p:sp>
+    </p:spTree>
+    <p:extLst>
+      <p:ext uri="{BB962C8B-B14F-4D97-AF65-F5344CB8AC3E}">
+        <p14:creationId xmlns:p14="http://schemas.microsoft.com/office/powerpoint/2010/main" val="3916215557"/>
+      </p:ext>
+    </p:extLst>
+  </p:cSld>
+  <p:clrMapOvr>
+    <a:overrideClrMapping bg1="dk1" tx1="lt1" bg2="dk2" tx2="lt2" accent1="accent1" accent2="accent2" accent3="accent3" accent4="accent4" accent5="accent5" accent6="accent6" hlink="hlink" folHlink="folHlink"/>
+  </p:clrMapOvr>
+</p:sld>
+</file>
+
 <file path=ppt/slides/slide2.xml><?xml version="1.0" encoding="utf-8"?>
 <p:sld xmlns:a="http://schemas.openxmlformats.org/drawingml/2006/main" xmlns:r="http://schemas.openxmlformats.org/officeDocument/2006/relationships" xmlns:p="http://schemas.openxmlformats.org/presentationml/2006/main">
   <p:cSld>
@@ -7142,37 +7602,153 @@
           </a:p>
         </p:txBody>
       </p:sp>
-      <p:graphicFrame>
-        <p:nvGraphicFramePr>
-          <p:cNvPr id="5" name="Inhaltsplatzhalter 2">
-            <a:extLst>
-              <a:ext uri="{FF2B5EF4-FFF2-40B4-BE49-F238E27FC236}">
-                <a16:creationId xmlns:a16="http://schemas.microsoft.com/office/drawing/2014/main" id="{2D508419-D7CF-DBB4-E3D7-0886445FABEE}"/>
-              </a:ext>
-            </a:extLst>
-          </p:cNvPr>
-          <p:cNvGraphicFramePr>
-            <a:graphicFrameLocks noGrp="1"/>
-          </p:cNvGraphicFramePr>
+      <p:sp>
+        <p:nvSpPr>
+          <p:cNvPr id="3" name="Rechteck: diagonal liegende Ecken abgerundet 2">
+            <a:extLst>
+              <a:ext uri="{FF2B5EF4-FFF2-40B4-BE49-F238E27FC236}">
+                <a16:creationId xmlns:a16="http://schemas.microsoft.com/office/drawing/2014/main" id="{8372EF84-FA93-36B7-4F0F-0A895C9384F8}"/>
+              </a:ext>
+            </a:extLst>
+          </p:cNvPr>
+          <p:cNvSpPr/>
+          <p:nvPr/>
+        </p:nvSpPr>
+        <p:spPr>
+          <a:xfrm>
+            <a:off x="6342077" y="2678320"/>
+            <a:ext cx="1640280" cy="1750692"/>
+          </a:xfrm>
+          <a:prstGeom prst="round2DiagRect">
+            <a:avLst>
+              <a:gd name="adj1" fmla="val 29727"/>
+              <a:gd name="adj2" fmla="val 0"/>
+            </a:avLst>
+          </a:prstGeom>
+        </p:spPr>
+        <p:style>
+          <a:lnRef idx="0">
+            <a:schemeClr val="accent2">
+              <a:hueOff val="0"/>
+              <a:satOff val="0"/>
+              <a:lumOff val="0"/>
+              <a:alphaOff val="0"/>
+            </a:schemeClr>
+          </a:lnRef>
+          <a:fillRef idx="1">
+            <a:schemeClr val="bg1">
+              <a:lumMod val="95000"/>
+              <a:hueOff val="0"/>
+              <a:satOff val="0"/>
+              <a:lumOff val="0"/>
+              <a:alphaOff val="0"/>
+            </a:schemeClr>
+          </a:fillRef>
+          <a:effectRef idx="0">
+            <a:schemeClr val="bg1">
+              <a:lumMod val="95000"/>
+              <a:hueOff val="0"/>
+              <a:satOff val="0"/>
+              <a:lumOff val="0"/>
+              <a:alphaOff val="0"/>
+            </a:schemeClr>
+          </a:effectRef>
+          <a:fontRef idx="minor">
+            <a:schemeClr val="dk1">
+              <a:hueOff val="0"/>
+              <a:satOff val="0"/>
+              <a:lumOff val="0"/>
+              <a:alphaOff val="0"/>
+            </a:schemeClr>
+          </a:fontRef>
+        </p:style>
+      </p:sp>
+      <p:sp>
+        <p:nvSpPr>
+          <p:cNvPr id="6" name="Rechteck: diagonal liegende Ecken abgerundet 5">
+            <a:extLst>
+              <a:ext uri="{FF2B5EF4-FFF2-40B4-BE49-F238E27FC236}">
+                <a16:creationId xmlns:a16="http://schemas.microsoft.com/office/drawing/2014/main" id="{F46ED38C-A9B9-8AC2-9C89-5561B2019304}"/>
+              </a:ext>
+            </a:extLst>
+          </p:cNvPr>
+          <p:cNvSpPr/>
+          <p:nvPr/>
+        </p:nvSpPr>
+        <p:spPr>
+          <a:xfrm>
+            <a:off x="5152406" y="2485406"/>
+            <a:ext cx="1887187" cy="1887187"/>
+          </a:xfrm>
+          <a:prstGeom prst="round2DiagRect">
+            <a:avLst>
+              <a:gd name="adj1" fmla="val 29727"/>
+              <a:gd name="adj2" fmla="val 0"/>
+            </a:avLst>
+          </a:prstGeom>
+        </p:spPr>
+        <p:style>
+          <a:lnRef idx="0">
+            <a:schemeClr val="accent2">
+              <a:hueOff val="0"/>
+              <a:satOff val="0"/>
+              <a:lumOff val="0"/>
+              <a:alphaOff val="0"/>
+            </a:schemeClr>
+          </a:lnRef>
+          <a:fillRef idx="1">
+            <a:schemeClr val="bg1">
+              <a:lumMod val="95000"/>
+              <a:hueOff val="0"/>
+              <a:satOff val="0"/>
+              <a:lumOff val="0"/>
+              <a:alphaOff val="0"/>
+            </a:schemeClr>
+          </a:fillRef>
+          <a:effectRef idx="0">
+            <a:schemeClr val="bg1">
+              <a:lumMod val="95000"/>
+              <a:hueOff val="0"/>
+              <a:satOff val="0"/>
+              <a:lumOff val="0"/>
+              <a:alphaOff val="0"/>
+            </a:schemeClr>
+          </a:effectRef>
+          <a:fontRef idx="minor">
+            <a:schemeClr val="dk1">
+              <a:hueOff val="0"/>
+              <a:satOff val="0"/>
+              <a:lumOff val="0"/>
+              <a:alphaOff val="0"/>
+            </a:schemeClr>
+          </a:fontRef>
+        </p:style>
+      </p:sp>
+      <p:sp>
+        <p:nvSpPr>
+          <p:cNvPr id="8" name="Inhaltsplatzhalter 7">
+            <a:extLst>
+              <a:ext uri="{FF2B5EF4-FFF2-40B4-BE49-F238E27FC236}">
+                <a16:creationId xmlns:a16="http://schemas.microsoft.com/office/drawing/2014/main" id="{B2FAB209-0274-B7FB-B58E-EA9323ACBEFE}"/>
+              </a:ext>
+            </a:extLst>
+          </p:cNvPr>
+          <p:cNvSpPr>
+            <a:spLocks noGrp="1"/>
+          </p:cNvSpPr>
           <p:nvPr>
             <p:ph idx="1"/>
-            <p:extLst>
-              <p:ext uri="{D42A27DB-BD31-4B8C-83A1-F6EECF244321}">
-                <p14:modId xmlns:p14="http://schemas.microsoft.com/office/powerpoint/2010/main" val="808956724"/>
-              </p:ext>
-            </p:extLst>
           </p:nvPr>
-        </p:nvGraphicFramePr>
-        <p:xfrm>
-          <a:off x="838200" y="2228087"/>
-          <a:ext cx="10515600" cy="3948876"/>
-        </p:xfrm>
-        <a:graphic>
-          <a:graphicData uri="http://schemas.openxmlformats.org/drawingml/2006/diagram">
-            <dgm:relIds xmlns:dgm="http://schemas.openxmlformats.org/drawingml/2006/diagram" xmlns:r="http://schemas.openxmlformats.org/officeDocument/2006/relationships" r:dm="rId2" r:lo="rId3" r:qs="rId4" r:cs="rId5"/>
-          </a:graphicData>
-        </a:graphic>
-      </p:graphicFrame>
+        </p:nvSpPr>
+        <p:spPr/>
+        <p:txBody>
+          <a:bodyPr/>
+          <a:lstStyle/>
+          <a:p>
+            <a:endParaRPr lang="de-DE" dirty="0"/>
+          </a:p>
+        </p:txBody>
+      </p:sp>
     </p:spTree>
     <p:extLst>
       <p:ext uri="{BB962C8B-B14F-4D97-AF65-F5344CB8AC3E}">
@@ -7187,6 +7763,96 @@
 </file>
 
 <file path=ppt/slides/slide3.xml><?xml version="1.0" encoding="utf-8"?>
+<p:sld xmlns:a="http://schemas.openxmlformats.org/drawingml/2006/main" xmlns:r="http://schemas.openxmlformats.org/officeDocument/2006/relationships" xmlns:p="http://schemas.openxmlformats.org/presentationml/2006/main">
+  <p:cSld>
+    <p:spTree>
+      <p:nvGrpSpPr>
+        <p:cNvPr id="1" name=""/>
+        <p:cNvGrpSpPr/>
+        <p:nvPr/>
+      </p:nvGrpSpPr>
+      <p:grpSpPr>
+        <a:xfrm>
+          <a:off x="0" y="0"/>
+          <a:ext cx="0" cy="0"/>
+          <a:chOff x="0" y="0"/>
+          <a:chExt cx="0" cy="0"/>
+        </a:xfrm>
+      </p:grpSpPr>
+      <p:sp>
+        <p:nvSpPr>
+          <p:cNvPr id="2" name="Titel 1">
+            <a:extLst>
+              <a:ext uri="{FF2B5EF4-FFF2-40B4-BE49-F238E27FC236}">
+                <a16:creationId xmlns:a16="http://schemas.microsoft.com/office/drawing/2014/main" id="{F1F324F7-9490-513D-F62E-B6AD54715FAC}"/>
+              </a:ext>
+            </a:extLst>
+          </p:cNvPr>
+          <p:cNvSpPr>
+            <a:spLocks noGrp="1"/>
+          </p:cNvSpPr>
+          <p:nvPr>
+            <p:ph type="title"/>
+          </p:nvPr>
+        </p:nvSpPr>
+        <p:spPr/>
+        <p:txBody>
+          <a:bodyPr/>
+          <a:lstStyle/>
+          <a:p>
+            <a:r>
+              <a:rPr lang="de-AT" dirty="0"/>
+              <a:t>Überblick</a:t>
+            </a:r>
+            <a:endParaRPr lang="de-DE" dirty="0"/>
+          </a:p>
+        </p:txBody>
+      </p:sp>
+      <p:graphicFrame>
+        <p:nvGraphicFramePr>
+          <p:cNvPr id="5" name="Inhaltsplatzhalter 2">
+            <a:extLst>
+              <a:ext uri="{FF2B5EF4-FFF2-40B4-BE49-F238E27FC236}">
+                <a16:creationId xmlns:a16="http://schemas.microsoft.com/office/drawing/2014/main" id="{D26CF753-ECBC-CAC0-16F4-144426D77F6B}"/>
+              </a:ext>
+            </a:extLst>
+          </p:cNvPr>
+          <p:cNvGraphicFramePr>
+            <a:graphicFrameLocks noGrp="1"/>
+          </p:cNvGraphicFramePr>
+          <p:nvPr>
+            <p:ph idx="1"/>
+            <p:extLst>
+              <p:ext uri="{D42A27DB-BD31-4B8C-83A1-F6EECF244321}">
+                <p14:modId xmlns:p14="http://schemas.microsoft.com/office/powerpoint/2010/main" val="3997340930"/>
+              </p:ext>
+            </p:extLst>
+          </p:nvPr>
+        </p:nvGraphicFramePr>
+        <p:xfrm>
+          <a:off x="838200" y="1825625"/>
+          <a:ext cx="10515600" cy="4351338"/>
+        </p:xfrm>
+        <a:graphic>
+          <a:graphicData uri="http://schemas.openxmlformats.org/drawingml/2006/diagram">
+            <dgm:relIds xmlns:dgm="http://schemas.openxmlformats.org/drawingml/2006/diagram" xmlns:r="http://schemas.openxmlformats.org/officeDocument/2006/relationships" r:dm="rId2" r:lo="rId3" r:qs="rId4" r:cs="rId5"/>
+          </a:graphicData>
+        </a:graphic>
+      </p:graphicFrame>
+    </p:spTree>
+    <p:extLst>
+      <p:ext uri="{BB962C8B-B14F-4D97-AF65-F5344CB8AC3E}">
+        <p14:creationId xmlns:p14="http://schemas.microsoft.com/office/powerpoint/2010/main" val="2494947964"/>
+      </p:ext>
+    </p:extLst>
+  </p:cSld>
+  <p:clrMapOvr>
+    <a:masterClrMapping/>
+  </p:clrMapOvr>
+</p:sld>
+</file>
+
+<file path=ppt/slides/slide4.xml><?xml version="1.0" encoding="utf-8"?>
 <p:sld xmlns:a="http://schemas.openxmlformats.org/drawingml/2006/main" xmlns:r="http://schemas.openxmlformats.org/officeDocument/2006/relationships" xmlns:p="http://schemas.openxmlformats.org/presentationml/2006/main">
   <p:cSld>
     <p:bg>
@@ -7849,342 +8515,6 @@
 </p:sld>
 </file>
 
-<file path=ppt/slides/slide4.xml><?xml version="1.0" encoding="utf-8"?>
-<p:sld xmlns:a="http://schemas.openxmlformats.org/drawingml/2006/main" xmlns:r="http://schemas.openxmlformats.org/officeDocument/2006/relationships" xmlns:p="http://schemas.openxmlformats.org/presentationml/2006/main">
-  <p:cSld>
-    <p:bg>
-      <p:bgPr>
-        <a:solidFill>
-          <a:schemeClr val="bg1"/>
-        </a:solidFill>
-        <a:effectLst/>
-      </p:bgPr>
-    </p:bg>
-    <p:spTree>
-      <p:nvGrpSpPr>
-        <p:cNvPr id="1" name=""/>
-        <p:cNvGrpSpPr/>
-        <p:nvPr/>
-      </p:nvGrpSpPr>
-      <p:grpSpPr>
-        <a:xfrm>
-          <a:off x="0" y="0"/>
-          <a:ext cx="0" cy="0"/>
-          <a:chOff x="0" y="0"/>
-          <a:chExt cx="0" cy="0"/>
-        </a:xfrm>
-      </p:grpSpPr>
-      <p:sp>
-        <p:nvSpPr>
-          <p:cNvPr id="8" name="Rectangle 7">
-            <a:extLst>
-              <a:ext uri="{FF2B5EF4-FFF2-40B4-BE49-F238E27FC236}">
-                <a16:creationId xmlns:a16="http://schemas.microsoft.com/office/drawing/2014/main" id="{70DFC902-7D23-471A-B557-B6B6917D7A0D}"/>
-              </a:ext>
-              <a:ext uri="{C183D7F6-B498-43B3-948B-1728B52AA6E4}">
-                <adec:decorative xmlns:adec="http://schemas.microsoft.com/office/drawing/2017/decorative" val="1"/>
-              </a:ext>
-            </a:extLst>
-          </p:cNvPr>
-          <p:cNvSpPr>
-            <a:spLocks noGrp="1" noRot="1" noChangeAspect="1" noMove="1" noResize="1" noEditPoints="1" noAdjustHandles="1" noChangeArrowheads="1" noChangeShapeType="1" noTextEdit="1"/>
-          </p:cNvSpPr>
-          <p:nvPr>
-            <p:extLst>
-              <p:ext uri="{386F3935-93C4-4BCD-93E2-E3B085C9AB24}">
-                <p16:designElem xmlns:p16="http://schemas.microsoft.com/office/powerpoint/2015/main" val="1"/>
-              </p:ext>
-            </p:extLst>
-          </p:nvPr>
-        </p:nvSpPr>
-        <p:spPr>
-          <a:xfrm>
-            <a:off x="10" y="-5705"/>
-            <a:ext cx="12191990" cy="1694346"/>
-          </a:xfrm>
-          <a:prstGeom prst="rect">
-            <a:avLst/>
-          </a:prstGeom>
-          <a:solidFill>
-            <a:schemeClr val="tx1">
-              <a:lumMod val="85000"/>
-              <a:lumOff val="15000"/>
-            </a:schemeClr>
-          </a:solidFill>
-          <a:ln>
-            <a:noFill/>
-          </a:ln>
-        </p:spPr>
-        <p:style>
-          <a:lnRef idx="2">
-            <a:schemeClr val="accent1">
-              <a:shade val="50000"/>
-            </a:schemeClr>
-          </a:lnRef>
-          <a:fillRef idx="1">
-            <a:schemeClr val="accent1"/>
-          </a:fillRef>
-          <a:effectRef idx="0">
-            <a:schemeClr val="accent1"/>
-          </a:effectRef>
-          <a:fontRef idx="minor">
-            <a:schemeClr val="lt1"/>
-          </a:fontRef>
-        </p:style>
-        <p:txBody>
-          <a:bodyPr rtlCol="0" anchor="ctr"/>
-          <a:lstStyle/>
-          <a:p>
-            <a:pPr algn="ctr"/>
-            <a:endParaRPr lang="en-US"/>
-          </a:p>
-        </p:txBody>
-      </p:sp>
-      <p:sp>
-        <p:nvSpPr>
-          <p:cNvPr id="2" name="Titel 1">
-            <a:extLst>
-              <a:ext uri="{FF2B5EF4-FFF2-40B4-BE49-F238E27FC236}">
-                <a16:creationId xmlns:a16="http://schemas.microsoft.com/office/drawing/2014/main" id="{4FD4B520-9540-1645-538A-F974120DC583}"/>
-              </a:ext>
-            </a:extLst>
-          </p:cNvPr>
-          <p:cNvSpPr>
-            <a:spLocks noGrp="1"/>
-          </p:cNvSpPr>
-          <p:nvPr>
-            <p:ph type="title"/>
-          </p:nvPr>
-        </p:nvSpPr>
-        <p:spPr>
-          <a:xfrm>
-            <a:off x="1156851" y="637762"/>
-            <a:ext cx="9888496" cy="900131"/>
-          </a:xfrm>
-        </p:spPr>
-        <p:txBody>
-          <a:bodyPr anchor="t">
-            <a:normAutofit/>
-          </a:bodyPr>
-          <a:lstStyle/>
-          <a:p>
-            <a:r>
-              <a:rPr lang="de-DE" sz="4000">
-                <a:solidFill>
-                  <a:schemeClr val="bg1"/>
-                </a:solidFill>
-              </a:rPr>
-              <a:t>Funktionalitäten</a:t>
-            </a:r>
-            <a:endParaRPr lang="de-AT" sz="4000">
-              <a:solidFill>
-                <a:schemeClr val="bg1"/>
-              </a:solidFill>
-            </a:endParaRPr>
-          </a:p>
-        </p:txBody>
-      </p:sp>
-      <p:sp>
-        <p:nvSpPr>
-          <p:cNvPr id="10" name="Rectangle 9">
-            <a:extLst>
-              <a:ext uri="{FF2B5EF4-FFF2-40B4-BE49-F238E27FC236}">
-                <a16:creationId xmlns:a16="http://schemas.microsoft.com/office/drawing/2014/main" id="{A55D5633-D557-4DCA-982C-FF36EB7A1C00}"/>
-              </a:ext>
-              <a:ext uri="{C183D7F6-B498-43B3-948B-1728B52AA6E4}">
-                <adec:decorative xmlns:adec="http://schemas.microsoft.com/office/drawing/2017/decorative" val="1"/>
-              </a:ext>
-            </a:extLst>
-          </p:cNvPr>
-          <p:cNvSpPr>
-            <a:spLocks noGrp="1" noRot="1" noChangeAspect="1" noMove="1" noResize="1" noEditPoints="1" noAdjustHandles="1" noChangeArrowheads="1" noChangeShapeType="1" noTextEdit="1"/>
-          </p:cNvSpPr>
-          <p:nvPr>
-            <p:extLst>
-              <p:ext uri="{386F3935-93C4-4BCD-93E2-E3B085C9AB24}">
-                <p16:designElem xmlns:p16="http://schemas.microsoft.com/office/powerpoint/2015/main" val="1"/>
-              </p:ext>
-            </p:extLst>
-          </p:nvPr>
-        </p:nvSpPr>
-        <p:spPr>
-          <a:xfrm>
-            <a:off x="0" y="1688641"/>
-            <a:ext cx="12191990" cy="5169359"/>
-          </a:xfrm>
-          <a:prstGeom prst="rect">
-            <a:avLst/>
-          </a:prstGeom>
-          <a:solidFill>
-            <a:schemeClr val="bg1">
-              <a:lumMod val="95000"/>
-            </a:schemeClr>
-          </a:solidFill>
-          <a:ln>
-            <a:noFill/>
-          </a:ln>
-        </p:spPr>
-        <p:style>
-          <a:lnRef idx="2">
-            <a:schemeClr val="accent1">
-              <a:shade val="50000"/>
-            </a:schemeClr>
-          </a:lnRef>
-          <a:fillRef idx="1">
-            <a:schemeClr val="accent1"/>
-          </a:fillRef>
-          <a:effectRef idx="0">
-            <a:schemeClr val="accent1"/>
-          </a:effectRef>
-          <a:fontRef idx="minor">
-            <a:schemeClr val="lt1"/>
-          </a:fontRef>
-        </p:style>
-        <p:txBody>
-          <a:bodyPr rtlCol="0" anchor="ctr"/>
-          <a:lstStyle/>
-          <a:p>
-            <a:pPr algn="ctr"/>
-            <a:endParaRPr lang="en-US"/>
-          </a:p>
-        </p:txBody>
-      </p:sp>
-      <p:sp>
-        <p:nvSpPr>
-          <p:cNvPr id="12" name="Rectangle 11">
-            <a:extLst>
-              <a:ext uri="{FF2B5EF4-FFF2-40B4-BE49-F238E27FC236}">
-                <a16:creationId xmlns:a16="http://schemas.microsoft.com/office/drawing/2014/main" id="{450D3AD2-FA80-415F-A9CE-54D884561CD7}"/>
-              </a:ext>
-              <a:ext uri="{C183D7F6-B498-43B3-948B-1728B52AA6E4}">
-                <adec:decorative xmlns:adec="http://schemas.microsoft.com/office/drawing/2017/decorative" val="1"/>
-              </a:ext>
-            </a:extLst>
-          </p:cNvPr>
-          <p:cNvSpPr>
-            <a:spLocks noGrp="1" noRot="1" noChangeAspect="1" noMove="1" noResize="1" noEditPoints="1" noAdjustHandles="1" noChangeArrowheads="1" noChangeShapeType="1" noTextEdit="1"/>
-          </p:cNvSpPr>
-          <p:nvPr>
-            <p:extLst>
-              <p:ext uri="{386F3935-93C4-4BCD-93E2-E3B085C9AB24}">
-                <p16:designElem xmlns:p16="http://schemas.microsoft.com/office/powerpoint/2015/main" val="1"/>
-              </p:ext>
-            </p:extLst>
-          </p:nvPr>
-        </p:nvSpPr>
-        <p:spPr>
-          <a:xfrm>
-            <a:off x="1156851" y="2010758"/>
-            <a:ext cx="457190" cy="45719"/>
-          </a:xfrm>
-          <a:prstGeom prst="rect">
-            <a:avLst/>
-          </a:prstGeom>
-          <a:solidFill>
-            <a:schemeClr val="tx1"/>
-          </a:solidFill>
-          <a:ln>
-            <a:noFill/>
-          </a:ln>
-        </p:spPr>
-        <p:style>
-          <a:lnRef idx="2">
-            <a:schemeClr val="accent1">
-              <a:shade val="50000"/>
-            </a:schemeClr>
-          </a:lnRef>
-          <a:fillRef idx="1">
-            <a:schemeClr val="accent1"/>
-          </a:fillRef>
-          <a:effectRef idx="0">
-            <a:schemeClr val="accent1"/>
-          </a:effectRef>
-          <a:fontRef idx="minor">
-            <a:schemeClr val="lt1"/>
-          </a:fontRef>
-        </p:style>
-        <p:txBody>
-          <a:bodyPr rtlCol="0" anchor="ctr"/>
-          <a:lstStyle/>
-          <a:p>
-            <a:pPr algn="ctr"/>
-            <a:endParaRPr lang="en-US"/>
-          </a:p>
-        </p:txBody>
-      </p:sp>
-      <p:sp>
-        <p:nvSpPr>
-          <p:cNvPr id="3" name="Inhaltsplatzhalter 2">
-            <a:extLst>
-              <a:ext uri="{FF2B5EF4-FFF2-40B4-BE49-F238E27FC236}">
-                <a16:creationId xmlns:a16="http://schemas.microsoft.com/office/drawing/2014/main" id="{C53939C4-A49D-91B0-F661-4C3B474BBA38}"/>
-              </a:ext>
-            </a:extLst>
-          </p:cNvPr>
-          <p:cNvSpPr>
-            <a:spLocks noGrp="1"/>
-          </p:cNvSpPr>
-          <p:nvPr>
-            <p:ph idx="1"/>
-          </p:nvPr>
-        </p:nvSpPr>
-        <p:spPr>
-          <a:xfrm>
-            <a:off x="1155548" y="2217343"/>
-            <a:ext cx="9880893" cy="3959619"/>
-          </a:xfrm>
-        </p:spPr>
-        <p:txBody>
-          <a:bodyPr>
-            <a:normAutofit/>
-          </a:bodyPr>
-          <a:lstStyle/>
-          <a:p>
-            <a:r>
-              <a:rPr lang="de-DE" sz="2400" dirty="0"/>
-              <a:t>Vorlagen erstellen</a:t>
-            </a:r>
-          </a:p>
-          <a:p>
-            <a:r>
-              <a:rPr lang="de-DE" sz="2400" dirty="0"/>
-              <a:t>Übungen zur Vorlage hinzufügen</a:t>
-            </a:r>
-          </a:p>
-          <a:p>
-            <a:r>
-              <a:rPr lang="de-DE" sz="2400" dirty="0"/>
-              <a:t>Sätze einer Übung hinzufügen/speichern</a:t>
-            </a:r>
-          </a:p>
-          <a:p>
-            <a:r>
-              <a:rPr lang="de-DE" sz="2400" dirty="0"/>
-              <a:t>Login -&gt; jeder User hat eigene Vorlagen und somit auch eigene Sätze</a:t>
-            </a:r>
-          </a:p>
-          <a:p>
-            <a:r>
-              <a:rPr lang="de-DE" sz="2400" dirty="0"/>
-              <a:t>Kalorienrechner</a:t>
-            </a:r>
-            <a:endParaRPr lang="de-AT" sz="2400" dirty="0"/>
-          </a:p>
-        </p:txBody>
-      </p:sp>
-    </p:spTree>
-    <p:extLst>
-      <p:ext uri="{BB962C8B-B14F-4D97-AF65-F5344CB8AC3E}">
-        <p14:creationId xmlns:p14="http://schemas.microsoft.com/office/powerpoint/2010/main" val="623969392"/>
-      </p:ext>
-    </p:extLst>
-  </p:cSld>
-  <p:clrMapOvr>
-    <a:masterClrMapping/>
-  </p:clrMapOvr>
-</p:sld>
-</file>
-
 <file path=ppt/slides/slide5.xml><?xml version="1.0" encoding="utf-8"?>
 <p:sld xmlns:a="http://schemas.openxmlformats.org/drawingml/2006/main" xmlns:r="http://schemas.openxmlformats.org/officeDocument/2006/relationships" xmlns:p="http://schemas.openxmlformats.org/presentationml/2006/main">
   <p:cSld>
@@ -8210,12 +8540,12 @@
           <a:chExt cx="0" cy="0"/>
         </a:xfrm>
       </p:grpSpPr>
-      <p:sp>
+      <p:sp useBgFill="1">
         <p:nvSpPr>
-          <p:cNvPr id="19" name="Rectangle 18">
-            <a:extLst>
-              <a:ext uri="{FF2B5EF4-FFF2-40B4-BE49-F238E27FC236}">
-                <a16:creationId xmlns:a16="http://schemas.microsoft.com/office/drawing/2014/main" id="{B34F5AD2-EDBD-4BBD-A55C-EAFFD0C7097A}"/>
+          <p:cNvPr id="21" name="Rectangle 17">
+            <a:extLst>
+              <a:ext uri="{FF2B5EF4-FFF2-40B4-BE49-F238E27FC236}">
+                <a16:creationId xmlns:a16="http://schemas.microsoft.com/office/drawing/2014/main" id="{2C61293E-6EBE-43EF-A52C-9BEBFD7679D4}"/>
               </a:ext>
               <a:ext uri="{C183D7F6-B498-43B3-948B-1728B52AA6E4}">
                 <adec:decorative xmlns:adec="http://schemas.microsoft.com/office/drawing/2017/decorative" val="1"/>
@@ -8235,16 +8565,902 @@
         </p:nvSpPr>
         <p:spPr>
           <a:xfrm>
-            <a:off x="3738193" y="0"/>
-            <a:ext cx="8453797" cy="6858001"/>
+            <a:off x="0" y="0"/>
+            <a:ext cx="12188952" cy="6858000"/>
+          </a:xfrm>
+          <a:prstGeom prst="rect">
+            <a:avLst/>
+          </a:prstGeom>
+          <a:ln>
+            <a:noFill/>
+          </a:ln>
+        </p:spPr>
+        <p:style>
+          <a:lnRef idx="2">
+            <a:schemeClr val="accent1">
+              <a:shade val="50000"/>
+            </a:schemeClr>
+          </a:lnRef>
+          <a:fillRef idx="1">
+            <a:schemeClr val="accent1"/>
+          </a:fillRef>
+          <a:effectRef idx="0">
+            <a:schemeClr val="accent1"/>
+          </a:effectRef>
+          <a:fontRef idx="minor">
+            <a:schemeClr val="lt1"/>
+          </a:fontRef>
+        </p:style>
+        <p:txBody>
+          <a:bodyPr rtlCol="0" anchor="ctr"/>
+          <a:lstStyle/>
+          <a:p>
+            <a:pPr algn="ctr"/>
+            <a:endParaRPr lang="en-US"/>
+          </a:p>
+        </p:txBody>
+      </p:sp>
+      <p:sp>
+        <p:nvSpPr>
+          <p:cNvPr id="2" name="Titel 1">
+            <a:extLst>
+              <a:ext uri="{FF2B5EF4-FFF2-40B4-BE49-F238E27FC236}">
+                <a16:creationId xmlns:a16="http://schemas.microsoft.com/office/drawing/2014/main" id="{4FD4B520-9540-1645-538A-F974120DC583}"/>
+              </a:ext>
+            </a:extLst>
+          </p:cNvPr>
+          <p:cNvSpPr>
+            <a:spLocks noGrp="1"/>
+          </p:cNvSpPr>
+          <p:nvPr>
+            <p:ph type="title"/>
+          </p:nvPr>
+        </p:nvSpPr>
+        <p:spPr>
+          <a:xfrm>
+            <a:off x="5297762" y="329184"/>
+            <a:ext cx="6251110" cy="1783080"/>
+          </a:xfrm>
+        </p:spPr>
+        <p:txBody>
+          <a:bodyPr anchor="b">
+            <a:normAutofit/>
+          </a:bodyPr>
+          <a:lstStyle/>
+          <a:p>
+            <a:r>
+              <a:rPr lang="de-DE" sz="5400"/>
+              <a:t>Funktionalitäten</a:t>
+            </a:r>
+            <a:endParaRPr lang="de-AT" sz="5400"/>
+          </a:p>
+        </p:txBody>
+      </p:sp>
+      <p:pic>
+        <p:nvPicPr>
+          <p:cNvPr id="22" name="Picture 13" descr="Fragezeichen vor pastellgrünem Hintergrund">
+            <a:extLst>
+              <a:ext uri="{FF2B5EF4-FFF2-40B4-BE49-F238E27FC236}">
+                <a16:creationId xmlns:a16="http://schemas.microsoft.com/office/drawing/2014/main" id="{07784B94-489F-B211-5EA7-1B842055281D}"/>
+              </a:ext>
+            </a:extLst>
+          </p:cNvPr>
+          <p:cNvPicPr>
+            <a:picLocks noChangeAspect="1"/>
+          </p:cNvPicPr>
+          <p:nvPr/>
+        </p:nvPicPr>
+        <p:blipFill rotWithShape="1">
+          <a:blip r:embed="rId2"/>
+          <a:srcRect l="44529" r="4537"/>
+          <a:stretch/>
+        </p:blipFill>
+        <p:spPr>
+          <a:xfrm>
+            <a:off x="1" y="10"/>
+            <a:ext cx="4657344" cy="6857990"/>
+          </a:xfrm>
+          <a:custGeom>
+            <a:avLst/>
+            <a:gdLst/>
+            <a:ahLst/>
+            <a:cxnLst/>
+            <a:rect l="l" t="t" r="r" b="b"/>
+            <a:pathLst>
+              <a:path w="4657344" h="6858000">
+                <a:moveTo>
+                  <a:pt x="0" y="0"/>
+                </a:moveTo>
+                <a:lnTo>
+                  <a:pt x="3429755" y="0"/>
+                </a:lnTo>
+                <a:lnTo>
+                  <a:pt x="3526016" y="148742"/>
+                </a:lnTo>
+                <a:cubicBezTo>
+                  <a:pt x="3657740" y="365513"/>
+                  <a:pt x="3777402" y="589569"/>
+                  <a:pt x="3886489" y="819975"/>
+                </a:cubicBezTo>
+                <a:cubicBezTo>
+                  <a:pt x="3891856" y="833492"/>
+                  <a:pt x="3900663" y="845393"/>
+                  <a:pt x="3912049" y="854514"/>
+                </a:cubicBezTo>
+                <a:cubicBezTo>
+                  <a:pt x="3897352" y="819849"/>
+                  <a:pt x="3883037" y="784928"/>
+                  <a:pt x="3868083" y="750263"/>
+                </a:cubicBezTo>
+                <a:cubicBezTo>
+                  <a:pt x="3806989" y="608712"/>
+                  <a:pt x="3742478" y="469145"/>
+                  <a:pt x="3674155" y="331786"/>
+                </a:cubicBezTo>
+                <a:lnTo>
+                  <a:pt x="3496656" y="0"/>
+                </a:lnTo>
+                <a:lnTo>
+                  <a:pt x="3554371" y="0"/>
+                </a:lnTo>
+                <a:lnTo>
+                  <a:pt x="3661621" y="196614"/>
+                </a:lnTo>
+                <a:cubicBezTo>
+                  <a:pt x="3856899" y="573253"/>
+                  <a:pt x="4021071" y="966066"/>
+                  <a:pt x="4161279" y="1371196"/>
+                </a:cubicBezTo>
+                <a:cubicBezTo>
+                  <a:pt x="4379525" y="2007265"/>
+                  <a:pt x="4530141" y="2664286"/>
+                  <a:pt x="4610660" y="3331516"/>
+                </a:cubicBezTo>
+                <a:cubicBezTo>
+                  <a:pt x="4652837" y="3672965"/>
+                  <a:pt x="4671625" y="4013908"/>
+                  <a:pt x="4645040" y="4357388"/>
+                </a:cubicBezTo>
+                <a:cubicBezTo>
+                  <a:pt x="4613599" y="4758899"/>
+                  <a:pt x="4566181" y="5157998"/>
+                  <a:pt x="4485789" y="5552906"/>
+                </a:cubicBezTo>
+                <a:cubicBezTo>
+                  <a:pt x="4397121" y="5988893"/>
+                  <a:pt x="4276748" y="6414594"/>
+                  <a:pt x="4117769" y="6828295"/>
+                </a:cubicBezTo>
+                <a:lnTo>
+                  <a:pt x="4105288" y="6858000"/>
+                </a:lnTo>
+                <a:lnTo>
+                  <a:pt x="4052520" y="6858000"/>
+                </a:lnTo>
+                <a:lnTo>
+                  <a:pt x="4059369" y="6841549"/>
+                </a:lnTo>
+                <a:cubicBezTo>
+                  <a:pt x="4147276" y="6614016"/>
+                  <a:pt x="4224193" y="6380817"/>
+                  <a:pt x="4291518" y="6142729"/>
+                </a:cubicBezTo>
+                <a:cubicBezTo>
+                  <a:pt x="4350055" y="5935370"/>
+                  <a:pt x="4393256" y="5723695"/>
+                  <a:pt x="4443357" y="5513923"/>
+                </a:cubicBezTo>
+                <a:cubicBezTo>
+                  <a:pt x="4444541" y="5502788"/>
+                  <a:pt x="4445137" y="5491601"/>
+                  <a:pt x="4445146" y="5480401"/>
+                </a:cubicBezTo>
+                <a:cubicBezTo>
+                  <a:pt x="4408465" y="5607635"/>
+                  <a:pt x="4379196" y="5719759"/>
+                  <a:pt x="4344559" y="5830359"/>
+                </a:cubicBezTo>
+                <a:cubicBezTo>
+                  <a:pt x="4254261" y="6118381"/>
+                  <a:pt x="4150112" y="6398531"/>
+                  <a:pt x="4031702" y="6670527"/>
+                </a:cubicBezTo>
+                <a:lnTo>
+                  <a:pt x="3943824" y="6858000"/>
+                </a:lnTo>
+                <a:lnTo>
+                  <a:pt x="0" y="6858000"/>
+                </a:lnTo>
+                <a:close/>
+              </a:path>
+            </a:pathLst>
+          </a:custGeom>
+        </p:spPr>
+      </p:pic>
+      <p:sp>
+        <p:nvSpPr>
+          <p:cNvPr id="20" name="sketchy line">
+            <a:extLst>
+              <a:ext uri="{FF2B5EF4-FFF2-40B4-BE49-F238E27FC236}">
+                <a16:creationId xmlns:a16="http://schemas.microsoft.com/office/drawing/2014/main" id="{21540236-BFD5-4A9D-8840-4703E7F76825}"/>
+              </a:ext>
+              <a:ext uri="{C183D7F6-B498-43B3-948B-1728B52AA6E4}">
+                <adec:decorative xmlns:adec="http://schemas.microsoft.com/office/drawing/2017/decorative" val="1"/>
+              </a:ext>
+            </a:extLst>
+          </p:cNvPr>
+          <p:cNvSpPr>
+            <a:spLocks noGrp="1" noRot="1" noChangeAspect="1" noMove="1" noResize="1" noEditPoints="1" noAdjustHandles="1" noChangeArrowheads="1" noChangeShapeType="1" noTextEdit="1"/>
+          </p:cNvSpPr>
+          <p:nvPr>
+            <p:extLst>
+              <p:ext uri="{386F3935-93C4-4BCD-93E2-E3B085C9AB24}">
+                <p16:designElem xmlns:p16="http://schemas.microsoft.com/office/powerpoint/2015/main" val="1"/>
+              </p:ext>
+            </p:extLst>
+          </p:nvPr>
+        </p:nvSpPr>
+        <p:spPr>
+          <a:xfrm>
+            <a:off x="5297762" y="2374947"/>
+            <a:ext cx="4243589" cy="18288"/>
+          </a:xfrm>
+          <a:custGeom>
+            <a:avLst/>
+            <a:gdLst>
+              <a:gd name="connsiteX0" fmla="*/ 0 w 4243589"/>
+              <a:gd name="connsiteY0" fmla="*/ 0 h 18288"/>
+              <a:gd name="connsiteX1" fmla="*/ 478919 w 4243589"/>
+              <a:gd name="connsiteY1" fmla="*/ 0 h 18288"/>
+              <a:gd name="connsiteX2" fmla="*/ 957839 w 4243589"/>
+              <a:gd name="connsiteY2" fmla="*/ 0 h 18288"/>
+              <a:gd name="connsiteX3" fmla="*/ 1521630 w 4243589"/>
+              <a:gd name="connsiteY3" fmla="*/ 0 h 18288"/>
+              <a:gd name="connsiteX4" fmla="*/ 2212729 w 4243589"/>
+              <a:gd name="connsiteY4" fmla="*/ 0 h 18288"/>
+              <a:gd name="connsiteX5" fmla="*/ 2734084 w 4243589"/>
+              <a:gd name="connsiteY5" fmla="*/ 0 h 18288"/>
+              <a:gd name="connsiteX6" fmla="*/ 3255439 w 4243589"/>
+              <a:gd name="connsiteY6" fmla="*/ 0 h 18288"/>
+              <a:gd name="connsiteX7" fmla="*/ 4243589 w 4243589"/>
+              <a:gd name="connsiteY7" fmla="*/ 0 h 18288"/>
+              <a:gd name="connsiteX8" fmla="*/ 4243589 w 4243589"/>
+              <a:gd name="connsiteY8" fmla="*/ 18288 h 18288"/>
+              <a:gd name="connsiteX9" fmla="*/ 3594926 w 4243589"/>
+              <a:gd name="connsiteY9" fmla="*/ 18288 h 18288"/>
+              <a:gd name="connsiteX10" fmla="*/ 3073571 w 4243589"/>
+              <a:gd name="connsiteY10" fmla="*/ 18288 h 18288"/>
+              <a:gd name="connsiteX11" fmla="*/ 2552216 w 4243589"/>
+              <a:gd name="connsiteY11" fmla="*/ 18288 h 18288"/>
+              <a:gd name="connsiteX12" fmla="*/ 1903553 w 4243589"/>
+              <a:gd name="connsiteY12" fmla="*/ 18288 h 18288"/>
+              <a:gd name="connsiteX13" fmla="*/ 1212454 w 4243589"/>
+              <a:gd name="connsiteY13" fmla="*/ 18288 h 18288"/>
+              <a:gd name="connsiteX14" fmla="*/ 733535 w 4243589"/>
+              <a:gd name="connsiteY14" fmla="*/ 18288 h 18288"/>
+              <a:gd name="connsiteX15" fmla="*/ 0 w 4243589"/>
+              <a:gd name="connsiteY15" fmla="*/ 18288 h 18288"/>
+              <a:gd name="connsiteX16" fmla="*/ 0 w 4243589"/>
+              <a:gd name="connsiteY16" fmla="*/ 0 h 18288"/>
+            </a:gdLst>
+            <a:ahLst/>
+            <a:cxnLst>
+              <a:cxn ang="0">
+                <a:pos x="connsiteX0" y="connsiteY0"/>
+              </a:cxn>
+              <a:cxn ang="0">
+                <a:pos x="connsiteX1" y="connsiteY1"/>
+              </a:cxn>
+              <a:cxn ang="0">
+                <a:pos x="connsiteX2" y="connsiteY2"/>
+              </a:cxn>
+              <a:cxn ang="0">
+                <a:pos x="connsiteX3" y="connsiteY3"/>
+              </a:cxn>
+              <a:cxn ang="0">
+                <a:pos x="connsiteX4" y="connsiteY4"/>
+              </a:cxn>
+              <a:cxn ang="0">
+                <a:pos x="connsiteX5" y="connsiteY5"/>
+              </a:cxn>
+              <a:cxn ang="0">
+                <a:pos x="connsiteX6" y="connsiteY6"/>
+              </a:cxn>
+              <a:cxn ang="0">
+                <a:pos x="connsiteX7" y="connsiteY7"/>
+              </a:cxn>
+              <a:cxn ang="0">
+                <a:pos x="connsiteX8" y="connsiteY8"/>
+              </a:cxn>
+              <a:cxn ang="0">
+                <a:pos x="connsiteX9" y="connsiteY9"/>
+              </a:cxn>
+              <a:cxn ang="0">
+                <a:pos x="connsiteX10" y="connsiteY10"/>
+              </a:cxn>
+              <a:cxn ang="0">
+                <a:pos x="connsiteX11" y="connsiteY11"/>
+              </a:cxn>
+              <a:cxn ang="0">
+                <a:pos x="connsiteX12" y="connsiteY12"/>
+              </a:cxn>
+              <a:cxn ang="0">
+                <a:pos x="connsiteX13" y="connsiteY13"/>
+              </a:cxn>
+              <a:cxn ang="0">
+                <a:pos x="connsiteX14" y="connsiteY14"/>
+              </a:cxn>
+              <a:cxn ang="0">
+                <a:pos x="connsiteX15" y="connsiteY15"/>
+              </a:cxn>
+              <a:cxn ang="0">
+                <a:pos x="connsiteX16" y="connsiteY16"/>
+              </a:cxn>
+            </a:cxnLst>
+            <a:rect l="l" t="t" r="r" b="b"/>
+            <a:pathLst>
+              <a:path w="4243589" h="18288" fill="none" extrusionOk="0">
+                <a:moveTo>
+                  <a:pt x="0" y="0"/>
+                </a:moveTo>
+                <a:cubicBezTo>
+                  <a:pt x="213395" y="-21006"/>
+                  <a:pt x="307421" y="-18116"/>
+                  <a:pt x="478919" y="0"/>
+                </a:cubicBezTo>
+                <a:cubicBezTo>
+                  <a:pt x="650417" y="18116"/>
+                  <a:pt x="831092" y="-21237"/>
+                  <a:pt x="957839" y="0"/>
+                </a:cubicBezTo>
+                <a:cubicBezTo>
+                  <a:pt x="1084586" y="21237"/>
+                  <a:pt x="1301682" y="25124"/>
+                  <a:pt x="1521630" y="0"/>
+                </a:cubicBezTo>
+                <a:cubicBezTo>
+                  <a:pt x="1741578" y="-25124"/>
+                  <a:pt x="1970269" y="-29139"/>
+                  <a:pt x="2212729" y="0"/>
+                </a:cubicBezTo>
+                <a:cubicBezTo>
+                  <a:pt x="2455189" y="29139"/>
+                  <a:pt x="2558847" y="-4796"/>
+                  <a:pt x="2734084" y="0"/>
+                </a:cubicBezTo>
+                <a:cubicBezTo>
+                  <a:pt x="2909321" y="4796"/>
+                  <a:pt x="3097217" y="-13409"/>
+                  <a:pt x="3255439" y="0"/>
+                </a:cubicBezTo>
+                <a:cubicBezTo>
+                  <a:pt x="3413662" y="13409"/>
+                  <a:pt x="3979999" y="-10121"/>
+                  <a:pt x="4243589" y="0"/>
+                </a:cubicBezTo>
+                <a:cubicBezTo>
+                  <a:pt x="4244484" y="8974"/>
+                  <a:pt x="4243043" y="9359"/>
+                  <a:pt x="4243589" y="18288"/>
+                </a:cubicBezTo>
+                <a:cubicBezTo>
+                  <a:pt x="4058777" y="31246"/>
+                  <a:pt x="3910348" y="3158"/>
+                  <a:pt x="3594926" y="18288"/>
+                </a:cubicBezTo>
+                <a:cubicBezTo>
+                  <a:pt x="3279504" y="33418"/>
+                  <a:pt x="3319955" y="-3977"/>
+                  <a:pt x="3073571" y="18288"/>
+                </a:cubicBezTo>
+                <a:cubicBezTo>
+                  <a:pt x="2827187" y="40553"/>
+                  <a:pt x="2767387" y="1863"/>
+                  <a:pt x="2552216" y="18288"/>
+                </a:cubicBezTo>
+                <a:cubicBezTo>
+                  <a:pt x="2337046" y="34713"/>
+                  <a:pt x="2181871" y="19527"/>
+                  <a:pt x="1903553" y="18288"/>
+                </a:cubicBezTo>
+                <a:cubicBezTo>
+                  <a:pt x="1625235" y="17049"/>
+                  <a:pt x="1557672" y="24174"/>
+                  <a:pt x="1212454" y="18288"/>
+                </a:cubicBezTo>
+                <a:cubicBezTo>
+                  <a:pt x="867236" y="12402"/>
+                  <a:pt x="874382" y="15627"/>
+                  <a:pt x="733535" y="18288"/>
+                </a:cubicBezTo>
+                <a:cubicBezTo>
+                  <a:pt x="592688" y="20949"/>
+                  <a:pt x="183477" y="14753"/>
+                  <a:pt x="0" y="18288"/>
+                </a:cubicBezTo>
+                <a:cubicBezTo>
+                  <a:pt x="-229" y="14222"/>
+                  <a:pt x="509" y="5816"/>
+                  <a:pt x="0" y="0"/>
+                </a:cubicBezTo>
+                <a:close/>
+              </a:path>
+              <a:path w="4243589" h="18288" stroke="0" extrusionOk="0">
+                <a:moveTo>
+                  <a:pt x="0" y="0"/>
+                </a:moveTo>
+                <a:cubicBezTo>
+                  <a:pt x="143690" y="16630"/>
+                  <a:pt x="266667" y="14847"/>
+                  <a:pt x="521355" y="0"/>
+                </a:cubicBezTo>
+                <a:cubicBezTo>
+                  <a:pt x="776043" y="-14847"/>
+                  <a:pt x="814491" y="-17363"/>
+                  <a:pt x="1000275" y="0"/>
+                </a:cubicBezTo>
+                <a:cubicBezTo>
+                  <a:pt x="1186059" y="17363"/>
+                  <a:pt x="1352504" y="-23507"/>
+                  <a:pt x="1521630" y="0"/>
+                </a:cubicBezTo>
+                <a:cubicBezTo>
+                  <a:pt x="1690756" y="23507"/>
+                  <a:pt x="1889525" y="5871"/>
+                  <a:pt x="2127857" y="0"/>
+                </a:cubicBezTo>
+                <a:cubicBezTo>
+                  <a:pt x="2366189" y="-5871"/>
+                  <a:pt x="2620628" y="-27997"/>
+                  <a:pt x="2776520" y="0"/>
+                </a:cubicBezTo>
+                <a:cubicBezTo>
+                  <a:pt x="2932412" y="27997"/>
+                  <a:pt x="3131683" y="-25073"/>
+                  <a:pt x="3467618" y="0"/>
+                </a:cubicBezTo>
+                <a:cubicBezTo>
+                  <a:pt x="3803553" y="25073"/>
+                  <a:pt x="4017371" y="3071"/>
+                  <a:pt x="4243589" y="0"/>
+                </a:cubicBezTo>
+                <a:cubicBezTo>
+                  <a:pt x="4243134" y="6162"/>
+                  <a:pt x="4243492" y="11775"/>
+                  <a:pt x="4243589" y="18288"/>
+                </a:cubicBezTo>
+                <a:cubicBezTo>
+                  <a:pt x="4017834" y="-5779"/>
+                  <a:pt x="3834586" y="13376"/>
+                  <a:pt x="3594926" y="18288"/>
+                </a:cubicBezTo>
+                <a:cubicBezTo>
+                  <a:pt x="3355266" y="23200"/>
+                  <a:pt x="3204179" y="2869"/>
+                  <a:pt x="2903827" y="18288"/>
+                </a:cubicBezTo>
+                <a:cubicBezTo>
+                  <a:pt x="2603475" y="33707"/>
+                  <a:pt x="2526187" y="46187"/>
+                  <a:pt x="2212729" y="18288"/>
+                </a:cubicBezTo>
+                <a:cubicBezTo>
+                  <a:pt x="1899271" y="-9611"/>
+                  <a:pt x="1966289" y="29692"/>
+                  <a:pt x="1733809" y="18288"/>
+                </a:cubicBezTo>
+                <a:cubicBezTo>
+                  <a:pt x="1501329" y="6884"/>
+                  <a:pt x="1343612" y="12492"/>
+                  <a:pt x="1085146" y="18288"/>
+                </a:cubicBezTo>
+                <a:cubicBezTo>
+                  <a:pt x="826680" y="24084"/>
+                  <a:pt x="778184" y="35607"/>
+                  <a:pt x="521355" y="18288"/>
+                </a:cubicBezTo>
+                <a:cubicBezTo>
+                  <a:pt x="264526" y="969"/>
+                  <a:pt x="120277" y="4268"/>
+                  <a:pt x="0" y="18288"/>
+                </a:cubicBezTo>
+                <a:cubicBezTo>
+                  <a:pt x="766" y="10800"/>
+                  <a:pt x="-457" y="8180"/>
+                  <a:pt x="0" y="0"/>
+                </a:cubicBezTo>
+                <a:close/>
+              </a:path>
+            </a:pathLst>
+          </a:custGeom>
+          <a:solidFill>
+            <a:schemeClr val="accent2"/>
+          </a:solidFill>
+          <a:ln w="44450" cap="rnd">
+            <a:solidFill>
+              <a:schemeClr val="accent2"/>
+            </a:solidFill>
+            <a:round/>
+            <a:extLst>
+              <a:ext uri="{C807C97D-BFC1-408E-A445-0C87EB9F89A2}">
+                <ask:lineSketchStyleProps xmlns:ask="http://schemas.microsoft.com/office/drawing/2018/sketchyshapes" sd="2727557108">
+                  <a:prstGeom prst="rect">
+                    <a:avLst/>
+                  </a:prstGeom>
+                  <ask:type>
+                    <ask:lineSketchFreehand/>
+                  </ask:type>
+                </ask:lineSketchStyleProps>
+              </a:ext>
+            </a:extLst>
+          </a:ln>
+        </p:spPr>
+        <p:style>
+          <a:lnRef idx="2">
+            <a:schemeClr val="accent1">
+              <a:shade val="50000"/>
+            </a:schemeClr>
+          </a:lnRef>
+          <a:fillRef idx="1">
+            <a:schemeClr val="accent1"/>
+          </a:fillRef>
+          <a:effectRef idx="0">
+            <a:schemeClr val="accent1"/>
+          </a:effectRef>
+          <a:fontRef idx="minor">
+            <a:schemeClr val="lt1"/>
+          </a:fontRef>
+        </p:style>
+        <p:txBody>
+          <a:bodyPr rtlCol="0" anchor="ctr"/>
+          <a:lstStyle/>
+          <a:p>
+            <a:pPr algn="ctr"/>
+            <a:endParaRPr lang="en-US"/>
+          </a:p>
+        </p:txBody>
+      </p:sp>
+      <p:sp>
+        <p:nvSpPr>
+          <p:cNvPr id="3" name="Inhaltsplatzhalter 2">
+            <a:extLst>
+              <a:ext uri="{FF2B5EF4-FFF2-40B4-BE49-F238E27FC236}">
+                <a16:creationId xmlns:a16="http://schemas.microsoft.com/office/drawing/2014/main" id="{C53939C4-A49D-91B0-F661-4C3B474BBA38}"/>
+              </a:ext>
+            </a:extLst>
+          </p:cNvPr>
+          <p:cNvSpPr>
+            <a:spLocks noGrp="1"/>
+          </p:cNvSpPr>
+          <p:nvPr>
+            <p:ph idx="1"/>
+          </p:nvPr>
+        </p:nvSpPr>
+        <p:spPr>
+          <a:xfrm>
+            <a:off x="5297762" y="2706624"/>
+            <a:ext cx="6251110" cy="3483864"/>
+          </a:xfrm>
+        </p:spPr>
+        <p:txBody>
+          <a:bodyPr>
+            <a:normAutofit/>
+          </a:bodyPr>
+          <a:lstStyle/>
+          <a:p>
+            <a:r>
+              <a:rPr lang="de-DE" sz="2200"/>
+              <a:t>Vorlagen erstellen</a:t>
+            </a:r>
+          </a:p>
+          <a:p>
+            <a:r>
+              <a:rPr lang="de-DE" sz="2200"/>
+              <a:t>Übungen zur Vorlage hinzufügen</a:t>
+            </a:r>
+          </a:p>
+          <a:p>
+            <a:r>
+              <a:rPr lang="de-DE" sz="2200"/>
+              <a:t>Sätze einer Übung hinzufügen/speichern</a:t>
+            </a:r>
+          </a:p>
+          <a:p>
+            <a:r>
+              <a:rPr lang="de-DE" sz="2200"/>
+              <a:t>Login -&gt; jeder User hat eigene Vorlagen und somit auch eigene Sätze</a:t>
+            </a:r>
+          </a:p>
+          <a:p>
+            <a:r>
+              <a:rPr lang="de-DE" sz="2200"/>
+              <a:t>Kalorienrechner</a:t>
+            </a:r>
+            <a:endParaRPr lang="de-AT" sz="2200"/>
+          </a:p>
+        </p:txBody>
+      </p:sp>
+    </p:spTree>
+    <p:extLst>
+      <p:ext uri="{BB962C8B-B14F-4D97-AF65-F5344CB8AC3E}">
+        <p14:creationId xmlns:p14="http://schemas.microsoft.com/office/powerpoint/2010/main" val="623969392"/>
+      </p:ext>
+    </p:extLst>
+  </p:cSld>
+  <p:clrMapOvr>
+    <a:masterClrMapping/>
+  </p:clrMapOvr>
+</p:sld>
+</file>
+
+<file path=ppt/slides/slide6.xml><?xml version="1.0" encoding="utf-8"?>
+<p:sld xmlns:a="http://schemas.openxmlformats.org/drawingml/2006/main" xmlns:r="http://schemas.openxmlformats.org/officeDocument/2006/relationships" xmlns:p="http://schemas.openxmlformats.org/presentationml/2006/main">
+  <p:cSld>
+    <p:bg>
+      <p:bgPr>
+        <a:solidFill>
+          <a:schemeClr val="bg1"/>
+        </a:solidFill>
+        <a:effectLst/>
+      </p:bgPr>
+    </p:bg>
+    <p:spTree>
+      <p:nvGrpSpPr>
+        <p:cNvPr id="1" name=""/>
+        <p:cNvGrpSpPr/>
+        <p:nvPr/>
+      </p:nvGrpSpPr>
+      <p:grpSpPr>
+        <a:xfrm>
+          <a:off x="0" y="0"/>
+          <a:ext cx="0" cy="0"/>
+          <a:chOff x="0" y="0"/>
+          <a:chExt cx="0" cy="0"/>
+        </a:xfrm>
+      </p:grpSpPr>
+      <p:sp useBgFill="1">
+        <p:nvSpPr>
+          <p:cNvPr id="16" name="Rectangle 10">
+            <a:extLst>
+              <a:ext uri="{FF2B5EF4-FFF2-40B4-BE49-F238E27FC236}">
+                <a16:creationId xmlns:a16="http://schemas.microsoft.com/office/drawing/2014/main" id="{6CCA5F87-1D1E-45CB-8D83-FC7EEFAD9935}"/>
+              </a:ext>
+              <a:ext uri="{C183D7F6-B498-43B3-948B-1728B52AA6E4}">
+                <adec:decorative xmlns:adec="http://schemas.microsoft.com/office/drawing/2017/decorative" val="1"/>
+              </a:ext>
+            </a:extLst>
+          </p:cNvPr>
+          <p:cNvSpPr>
+            <a:spLocks noGrp="1" noRot="1" noChangeAspect="1" noMove="1" noResize="1" noEditPoints="1" noAdjustHandles="1" noChangeArrowheads="1" noChangeShapeType="1" noTextEdit="1"/>
+          </p:cNvSpPr>
+          <p:nvPr>
+            <p:extLst>
+              <p:ext uri="{386F3935-93C4-4BCD-93E2-E3B085C9AB24}">
+                <p16:designElem xmlns:p16="http://schemas.microsoft.com/office/powerpoint/2015/main" val="1"/>
+              </p:ext>
+            </p:extLst>
+          </p:nvPr>
+        </p:nvSpPr>
+        <p:spPr>
+          <a:xfrm>
+            <a:off x="0" y="0"/>
+            <a:ext cx="12192000" cy="6858000"/>
+          </a:xfrm>
+          <a:prstGeom prst="rect">
+            <a:avLst/>
+          </a:prstGeom>
+          <a:ln>
+            <a:noFill/>
+          </a:ln>
+        </p:spPr>
+        <p:style>
+          <a:lnRef idx="2">
+            <a:schemeClr val="accent1">
+              <a:shade val="50000"/>
+            </a:schemeClr>
+          </a:lnRef>
+          <a:fillRef idx="1">
+            <a:schemeClr val="accent1"/>
+          </a:fillRef>
+          <a:effectRef idx="0">
+            <a:schemeClr val="accent1"/>
+          </a:effectRef>
+          <a:fontRef idx="minor">
+            <a:schemeClr val="lt1"/>
+          </a:fontRef>
+        </p:style>
+        <p:txBody>
+          <a:bodyPr rtlCol="0" anchor="ctr"/>
+          <a:lstStyle/>
+          <a:p>
+            <a:pPr algn="ctr"/>
+            <a:endParaRPr lang="en-US"/>
+          </a:p>
+        </p:txBody>
+      </p:sp>
+      <p:pic>
+        <p:nvPicPr>
+          <p:cNvPr id="18" name="Picture 6">
+            <a:extLst>
+              <a:ext uri="{FF2B5EF4-FFF2-40B4-BE49-F238E27FC236}">
+                <a16:creationId xmlns:a16="http://schemas.microsoft.com/office/drawing/2014/main" id="{ABB667F3-488A-8B67-EDA2-8E53B670299E}"/>
+              </a:ext>
+            </a:extLst>
+          </p:cNvPr>
+          <p:cNvPicPr>
+            <a:picLocks noChangeAspect="1"/>
+          </p:cNvPicPr>
+          <p:nvPr/>
+        </p:nvPicPr>
+        <p:blipFill rotWithShape="1">
+          <a:blip r:embed="rId2"/>
+          <a:srcRect t="1108" r="-1" b="-1"/>
+          <a:stretch/>
+        </p:blipFill>
+        <p:spPr>
+          <a:xfrm>
+            <a:off x="20" y="10"/>
+            <a:ext cx="8668492" cy="6857990"/>
+          </a:xfrm>
+          <a:prstGeom prst="rect">
+            <a:avLst/>
+          </a:prstGeom>
+        </p:spPr>
+      </p:pic>
+      <p:sp>
+        <p:nvSpPr>
+          <p:cNvPr id="19" name="Rectangle 12">
+            <a:extLst>
+              <a:ext uri="{FF2B5EF4-FFF2-40B4-BE49-F238E27FC236}">
+                <a16:creationId xmlns:a16="http://schemas.microsoft.com/office/drawing/2014/main" id="{7CCFC2C6-6238-4A2F-93DE-2ADF74AF635E}"/>
+              </a:ext>
+              <a:ext uri="{C183D7F6-B498-43B3-948B-1728B52AA6E4}">
+                <adec:decorative xmlns:adec="http://schemas.microsoft.com/office/drawing/2017/decorative" val="1"/>
+              </a:ext>
+            </a:extLst>
+          </p:cNvPr>
+          <p:cNvSpPr>
+            <a:spLocks noGrp="1" noRot="1" noChangeAspect="1" noMove="1" noResize="1" noEditPoints="1" noAdjustHandles="1" noChangeArrowheads="1" noChangeShapeType="1" noTextEdit="1"/>
+          </p:cNvSpPr>
+          <p:nvPr>
+            <p:extLst>
+              <p:ext uri="{386F3935-93C4-4BCD-93E2-E3B085C9AB24}">
+                <p16:designElem xmlns:p16="http://schemas.microsoft.com/office/powerpoint/2015/main" val="1"/>
+              </p:ext>
+            </p:extLst>
+          </p:nvPr>
+        </p:nvSpPr>
+        <p:spPr>
+          <a:xfrm flipH="1">
+            <a:off x="3711652" y="0"/>
+            <a:ext cx="8480347" cy="6858000"/>
+          </a:xfrm>
+          <a:prstGeom prst="rect">
+            <a:avLst/>
+          </a:prstGeom>
+          <a:gradFill>
+            <a:gsLst>
+              <a:gs pos="48000">
+                <a:schemeClr val="bg1"/>
+              </a:gs>
+              <a:gs pos="35000">
+                <a:schemeClr val="bg1">
+                  <a:alpha val="77000"/>
+                </a:schemeClr>
+              </a:gs>
+              <a:gs pos="19000">
+                <a:schemeClr val="bg1">
+                  <a:alpha val="38000"/>
+                </a:schemeClr>
+              </a:gs>
+              <a:gs pos="0">
+                <a:schemeClr val="bg1">
+                  <a:alpha val="0"/>
+                </a:schemeClr>
+              </a:gs>
+              <a:gs pos="100000">
+                <a:schemeClr val="bg1"/>
+              </a:gs>
+            </a:gsLst>
+            <a:lin ang="10800000" scaled="0"/>
+          </a:gradFill>
+          <a:ln>
+            <a:noFill/>
+          </a:ln>
+        </p:spPr>
+        <p:style>
+          <a:lnRef idx="2">
+            <a:schemeClr val="accent1">
+              <a:shade val="50000"/>
+            </a:schemeClr>
+          </a:lnRef>
+          <a:fillRef idx="1">
+            <a:schemeClr val="accent1"/>
+          </a:fillRef>
+          <a:effectRef idx="0">
+            <a:schemeClr val="accent1"/>
+          </a:effectRef>
+          <a:fontRef idx="minor">
+            <a:schemeClr val="lt1"/>
+          </a:fontRef>
+        </p:style>
+        <p:txBody>
+          <a:bodyPr rtlCol="0" anchor="ctr"/>
+          <a:lstStyle/>
+          <a:p>
+            <a:pPr algn="ctr"/>
+            <a:endParaRPr lang="en-US" dirty="0"/>
+          </a:p>
+        </p:txBody>
+      </p:sp>
+      <p:sp>
+        <p:nvSpPr>
+          <p:cNvPr id="4" name="Titel 3">
+            <a:extLst>
+              <a:ext uri="{FF2B5EF4-FFF2-40B4-BE49-F238E27FC236}">
+                <a16:creationId xmlns:a16="http://schemas.microsoft.com/office/drawing/2014/main" id="{2F996F91-2236-8169-CEA9-7E02155564C6}"/>
+              </a:ext>
+            </a:extLst>
+          </p:cNvPr>
+          <p:cNvSpPr>
+            <a:spLocks noGrp="1"/>
+          </p:cNvSpPr>
+          <p:nvPr>
+            <p:ph type="title"/>
+          </p:nvPr>
+        </p:nvSpPr>
+        <p:spPr>
+          <a:xfrm>
+            <a:off x="7848600" y="1122363"/>
+            <a:ext cx="4023360" cy="3204134"/>
+          </a:xfrm>
+        </p:spPr>
+        <p:txBody>
+          <a:bodyPr vert="horz" lIns="91440" tIns="45720" rIns="91440" bIns="45720" rtlCol="0" anchor="b">
+            <a:normAutofit/>
+          </a:bodyPr>
+          <a:lstStyle/>
+          <a:p>
+            <a:r>
+              <a:rPr lang="en-US" sz="4800"/>
+              <a:t>Was haben wir gemacht?</a:t>
+            </a:r>
+          </a:p>
+        </p:txBody>
+      </p:sp>
+      <p:sp>
+        <p:nvSpPr>
+          <p:cNvPr id="15" name="Rectangle 14">
+            <a:extLst>
+              <a:ext uri="{FF2B5EF4-FFF2-40B4-BE49-F238E27FC236}">
+                <a16:creationId xmlns:a16="http://schemas.microsoft.com/office/drawing/2014/main" id="{AF2F604E-43BE-4DC3-B983-E071523364F8}"/>
+              </a:ext>
+              <a:ext uri="{C183D7F6-B498-43B3-948B-1728B52AA6E4}">
+                <adec:decorative xmlns:adec="http://schemas.microsoft.com/office/drawing/2017/decorative" val="1"/>
+              </a:ext>
+            </a:extLst>
+          </p:cNvPr>
+          <p:cNvSpPr>
+            <a:spLocks noGrp="1" noRot="1" noChangeAspect="1" noMove="1" noResize="1" noEditPoints="1" noAdjustHandles="1" noChangeArrowheads="1" noChangeShapeType="1" noTextEdit="1"/>
+          </p:cNvSpPr>
+          <p:nvPr>
+            <p:extLst>
+              <p:ext uri="{386F3935-93C4-4BCD-93E2-E3B085C9AB24}">
+                <p16:designElem xmlns:p16="http://schemas.microsoft.com/office/powerpoint/2015/main" val="1"/>
+              </p:ext>
+            </p:extLst>
+          </p:nvPr>
+        </p:nvSpPr>
+        <p:spPr>
+          <a:xfrm rot="5400000">
+            <a:off x="8130540" y="346791"/>
+            <a:ext cx="146304" cy="704088"/>
           </a:xfrm>
           <a:prstGeom prst="rect">
             <a:avLst/>
           </a:prstGeom>
           <a:solidFill>
-            <a:schemeClr val="bg1">
-              <a:lumMod val="95000"/>
-            </a:schemeClr>
+            <a:schemeClr val="accent2"/>
           </a:solidFill>
           <a:ln>
             <a:noFill/>
@@ -8271,16 +9487,21 @@
           <a:lstStyle/>
           <a:p>
             <a:pPr algn="ctr"/>
-            <a:endParaRPr lang="en-US"/>
+            <a:endParaRPr lang="en-US">
+              <a:solidFill>
+                <a:prstClr val="white"/>
+              </a:solidFill>
+              <a:latin typeface="Calibri" panose="020F0502020204030204"/>
+            </a:endParaRPr>
           </a:p>
         </p:txBody>
       </p:sp>
       <p:sp>
         <p:nvSpPr>
-          <p:cNvPr id="21" name="Rectangle 20">
-            <a:extLst>
-              <a:ext uri="{FF2B5EF4-FFF2-40B4-BE49-F238E27FC236}">
-                <a16:creationId xmlns:a16="http://schemas.microsoft.com/office/drawing/2014/main" id="{C3896A03-3945-419A-B66B-4EE266EDD152}"/>
+          <p:cNvPr id="17" name="Rectangle 16">
+            <a:extLst>
+              <a:ext uri="{FF2B5EF4-FFF2-40B4-BE49-F238E27FC236}">
+                <a16:creationId xmlns:a16="http://schemas.microsoft.com/office/drawing/2014/main" id="{08C9B587-E65E-4B52-B37C-ABEBB6E87928}"/>
               </a:ext>
               <a:ext uri="{C183D7F6-B498-43B3-948B-1728B52AA6E4}">
                 <adec:decorative xmlns:adec="http://schemas.microsoft.com/office/drawing/2017/decorative" val="1"/>
@@ -8300,18 +9521,339 @@
         </p:nvSpPr>
         <p:spPr>
           <a:xfrm>
-            <a:off x="10" y="0"/>
-            <a:ext cx="4067739" cy="6858001"/>
+            <a:off x="7851648" y="4546920"/>
+            <a:ext cx="4023360" cy="18288"/>
           </a:xfrm>
           <a:prstGeom prst="rect">
             <a:avLst/>
           </a:prstGeom>
           <a:solidFill>
-            <a:schemeClr val="tx1">
-              <a:lumMod val="85000"/>
-              <a:lumOff val="15000"/>
+            <a:srgbClr val="D5D5D5"/>
+          </a:solidFill>
+          <a:ln w="3175">
+            <a:noFill/>
+          </a:ln>
+          <a:effectLst/>
+        </p:spPr>
+        <p:style>
+          <a:lnRef idx="2">
+            <a:schemeClr val="accent1">
+              <a:shade val="50000"/>
             </a:schemeClr>
-          </a:solidFill>
+          </a:lnRef>
+          <a:fillRef idx="1">
+            <a:schemeClr val="accent1"/>
+          </a:fillRef>
+          <a:effectRef idx="0">
+            <a:schemeClr val="accent1"/>
+          </a:effectRef>
+          <a:fontRef idx="minor">
+            <a:schemeClr val="lt1"/>
+          </a:fontRef>
+        </p:style>
+        <p:txBody>
+          <a:bodyPr rtlCol="0" anchor="ctr"/>
+          <a:lstStyle/>
+          <a:p>
+            <a:pPr marL="0" marR="0" lvl="0" indent="0" algn="ctr" defTabSz="914400" rtl="0" eaLnBrk="1" fontAlgn="auto" latinLnBrk="0" hangingPunct="1">
+              <a:lnSpc>
+                <a:spcPct val="100000"/>
+              </a:lnSpc>
+              <a:spcBef>
+                <a:spcPts val="0"/>
+              </a:spcBef>
+              <a:spcAft>
+                <a:spcPts val="0"/>
+              </a:spcAft>
+              <a:buClrTx/>
+              <a:buSzTx/>
+              <a:buFontTx/>
+              <a:buNone/>
+              <a:tabLst/>
+              <a:defRPr/>
+            </a:pPr>
+            <a:endParaRPr kumimoji="0" lang="en-US" sz="1800" b="0" i="0" u="none" strike="noStrike" kern="1200" cap="none" spc="0" normalizeH="0" baseline="0" noProof="0">
+              <a:ln>
+                <a:noFill/>
+              </a:ln>
+              <a:solidFill>
+                <a:prstClr val="white"/>
+              </a:solidFill>
+              <a:effectLst/>
+              <a:uLnTx/>
+              <a:uFillTx/>
+              <a:latin typeface="Calibri" panose="020F0502020204030204"/>
+              <a:ea typeface="+mn-ea"/>
+              <a:cs typeface="+mn-cs"/>
+            </a:endParaRPr>
+          </a:p>
+        </p:txBody>
+      </p:sp>
+    </p:spTree>
+    <p:extLst>
+      <p:ext uri="{BB962C8B-B14F-4D97-AF65-F5344CB8AC3E}">
+        <p14:creationId xmlns:p14="http://schemas.microsoft.com/office/powerpoint/2010/main" val="2806023503"/>
+      </p:ext>
+    </p:extLst>
+  </p:cSld>
+  <p:clrMapOvr>
+    <a:masterClrMapping/>
+  </p:clrMapOvr>
+</p:sld>
+</file>
+
+<file path=ppt/slides/slide7.xml><?xml version="1.0" encoding="utf-8"?>
+<p:sld xmlns:a="http://schemas.openxmlformats.org/drawingml/2006/main" xmlns:r="http://schemas.openxmlformats.org/officeDocument/2006/relationships" xmlns:p="http://schemas.openxmlformats.org/presentationml/2006/main">
+  <p:cSld>
+    <p:spTree>
+      <p:nvGrpSpPr>
+        <p:cNvPr id="1" name=""/>
+        <p:cNvGrpSpPr/>
+        <p:nvPr/>
+      </p:nvGrpSpPr>
+      <p:grpSpPr>
+        <a:xfrm>
+          <a:off x="0" y="0"/>
+          <a:ext cx="0" cy="0"/>
+          <a:chOff x="0" y="0"/>
+          <a:chExt cx="0" cy="0"/>
+        </a:xfrm>
+      </p:grpSpPr>
+      <p:sp>
+        <p:nvSpPr>
+          <p:cNvPr id="4" name="Titel 3">
+            <a:extLst>
+              <a:ext uri="{FF2B5EF4-FFF2-40B4-BE49-F238E27FC236}">
+                <a16:creationId xmlns:a16="http://schemas.microsoft.com/office/drawing/2014/main" id="{6C432A6B-C68C-D124-E5CD-BF32033228B7}"/>
+              </a:ext>
+            </a:extLst>
+          </p:cNvPr>
+          <p:cNvSpPr>
+            <a:spLocks noGrp="1"/>
+          </p:cNvSpPr>
+          <p:nvPr>
+            <p:ph type="title"/>
+          </p:nvPr>
+        </p:nvSpPr>
+        <p:spPr/>
+        <p:txBody>
+          <a:bodyPr/>
+          <a:lstStyle/>
+          <a:p>
+            <a:r>
+              <a:rPr lang="de-AT" dirty="0"/>
+              <a:t>Idee / GUI</a:t>
+            </a:r>
+            <a:endParaRPr lang="de-DE" dirty="0"/>
+          </a:p>
+        </p:txBody>
+      </p:sp>
+      <p:pic>
+        <p:nvPicPr>
+          <p:cNvPr id="1026" name="Picture 2" descr="Nachdenklich - Kostenlose nutzer Icons">
+            <a:extLst>
+              <a:ext uri="{FF2B5EF4-FFF2-40B4-BE49-F238E27FC236}">
+                <a16:creationId xmlns:a16="http://schemas.microsoft.com/office/drawing/2014/main" id="{DBB899E6-7641-56AC-DCB8-D81E083EB4E7}"/>
+              </a:ext>
+            </a:extLst>
+          </p:cNvPr>
+          <p:cNvPicPr>
+            <a:picLocks noGrp="1" noChangeAspect="1" noChangeArrowheads="1"/>
+          </p:cNvPicPr>
+          <p:nvPr>
+            <p:ph idx="1"/>
+          </p:nvPr>
+        </p:nvPicPr>
+        <p:blipFill>
+          <a:blip r:embed="rId2">
+            <a:extLst>
+              <a:ext uri="{28A0092B-C50C-407E-A947-70E740481C1C}">
+                <a14:useLocalDpi xmlns:a14="http://schemas.microsoft.com/office/drawing/2010/main" val="0"/>
+              </a:ext>
+            </a:extLst>
+          </a:blip>
+          <a:srcRect/>
+          <a:stretch>
+            <a:fillRect/>
+          </a:stretch>
+        </p:blipFill>
+        <p:spPr bwMode="auto">
+          <a:xfrm>
+            <a:off x="10340181" y="223838"/>
+            <a:ext cx="1318419" cy="1318419"/>
+          </a:xfrm>
+          <a:prstGeom prst="rect">
+            <a:avLst/>
+          </a:prstGeom>
+          <a:noFill/>
+          <a:extLst>
+            <a:ext uri="{909E8E84-426E-40DD-AFC4-6F175D3DCCD1}">
+              <a14:hiddenFill xmlns:a14="http://schemas.microsoft.com/office/drawing/2010/main">
+                <a:solidFill>
+                  <a:srgbClr val="FFFFFF"/>
+                </a:solidFill>
+              </a14:hiddenFill>
+            </a:ext>
+          </a:extLst>
+        </p:spPr>
+      </p:pic>
+      <p:pic>
+        <p:nvPicPr>
+          <p:cNvPr id="7" name="Grafik 6">
+            <a:extLst>
+              <a:ext uri="{FF2B5EF4-FFF2-40B4-BE49-F238E27FC236}">
+                <a16:creationId xmlns:a16="http://schemas.microsoft.com/office/drawing/2014/main" id="{B36B688A-A6C1-C12B-98AD-19A5E777198B}"/>
+              </a:ext>
+            </a:extLst>
+          </p:cNvPr>
+          <p:cNvPicPr>
+            <a:picLocks noChangeAspect="1"/>
+          </p:cNvPicPr>
+          <p:nvPr/>
+        </p:nvPicPr>
+        <p:blipFill>
+          <a:blip r:embed="rId3"/>
+          <a:stretch>
+            <a:fillRect/>
+          </a:stretch>
+        </p:blipFill>
+        <p:spPr>
+          <a:xfrm>
+            <a:off x="838200" y="1831975"/>
+            <a:ext cx="1920871" cy="3565452"/>
+          </a:xfrm>
+          <a:prstGeom prst="rect">
+            <a:avLst/>
+          </a:prstGeom>
+        </p:spPr>
+      </p:pic>
+      <p:pic>
+        <p:nvPicPr>
+          <p:cNvPr id="9" name="Grafik 8">
+            <a:extLst>
+              <a:ext uri="{FF2B5EF4-FFF2-40B4-BE49-F238E27FC236}">
+                <a16:creationId xmlns:a16="http://schemas.microsoft.com/office/drawing/2014/main" id="{CCEFC785-C5DC-32B6-9ABD-7EE5E1E16E58}"/>
+              </a:ext>
+            </a:extLst>
+          </p:cNvPr>
+          <p:cNvPicPr>
+            <a:picLocks noChangeAspect="1"/>
+          </p:cNvPicPr>
+          <p:nvPr/>
+        </p:nvPicPr>
+        <p:blipFill rotWithShape="1">
+          <a:blip r:embed="rId4"/>
+          <a:srcRect l="5208" t="2108" r="5032"/>
+          <a:stretch/>
+        </p:blipFill>
+        <p:spPr>
+          <a:xfrm>
+            <a:off x="4517242" y="1831975"/>
+            <a:ext cx="1818903" cy="3565452"/>
+          </a:xfrm>
+          <a:prstGeom prst="rect">
+            <a:avLst/>
+          </a:prstGeom>
+        </p:spPr>
+      </p:pic>
+      <p:pic>
+        <p:nvPicPr>
+          <p:cNvPr id="11" name="Grafik 10">
+            <a:extLst>
+              <a:ext uri="{FF2B5EF4-FFF2-40B4-BE49-F238E27FC236}">
+                <a16:creationId xmlns:a16="http://schemas.microsoft.com/office/drawing/2014/main" id="{4CFB8F6E-2286-6F8D-CB5A-81F37742FDA0}"/>
+              </a:ext>
+            </a:extLst>
+          </p:cNvPr>
+          <p:cNvPicPr>
+            <a:picLocks noChangeAspect="1"/>
+          </p:cNvPicPr>
+          <p:nvPr/>
+        </p:nvPicPr>
+        <p:blipFill rotWithShape="1">
+          <a:blip r:embed="rId5"/>
+          <a:srcRect l="5308" t="3048" r="4778"/>
+          <a:stretch/>
+        </p:blipFill>
+        <p:spPr>
+          <a:xfrm>
+            <a:off x="8192718" y="1831975"/>
+            <a:ext cx="1727138" cy="3565451"/>
+          </a:xfrm>
+          <a:prstGeom prst="rect">
+            <a:avLst/>
+          </a:prstGeom>
+        </p:spPr>
+      </p:pic>
+    </p:spTree>
+    <p:extLst>
+      <p:ext uri="{BB962C8B-B14F-4D97-AF65-F5344CB8AC3E}">
+        <p14:creationId xmlns:p14="http://schemas.microsoft.com/office/powerpoint/2010/main" val="3556756438"/>
+      </p:ext>
+    </p:extLst>
+  </p:cSld>
+  <p:clrMapOvr>
+    <a:masterClrMapping/>
+  </p:clrMapOvr>
+</p:sld>
+</file>
+
+<file path=ppt/slides/slide8.xml><?xml version="1.0" encoding="utf-8"?>
+<p:sld xmlns:a="http://schemas.openxmlformats.org/drawingml/2006/main" xmlns:r="http://schemas.openxmlformats.org/officeDocument/2006/relationships" xmlns:p="http://schemas.openxmlformats.org/presentationml/2006/main">
+  <p:cSld>
+    <p:bg>
+      <p:bgPr>
+        <a:solidFill>
+          <a:schemeClr val="bg1"/>
+        </a:solidFill>
+        <a:effectLst/>
+      </p:bgPr>
+    </p:bg>
+    <p:spTree>
+      <p:nvGrpSpPr>
+        <p:cNvPr id="1" name=""/>
+        <p:cNvGrpSpPr/>
+        <p:nvPr/>
+      </p:nvGrpSpPr>
+      <p:grpSpPr>
+        <a:xfrm>
+          <a:off x="0" y="0"/>
+          <a:ext cx="0" cy="0"/>
+          <a:chOff x="0" y="0"/>
+          <a:chExt cx="0" cy="0"/>
+        </a:xfrm>
+      </p:grpSpPr>
+      <p:sp useBgFill="1">
+        <p:nvSpPr>
+          <p:cNvPr id="28" name="Rectangle 27">
+            <a:extLst>
+              <a:ext uri="{FF2B5EF4-FFF2-40B4-BE49-F238E27FC236}">
+                <a16:creationId xmlns:a16="http://schemas.microsoft.com/office/drawing/2014/main" id="{521C4EA8-6B83-4338-913D-D75D3C4F34D6}"/>
+              </a:ext>
+              <a:ext uri="{C183D7F6-B498-43B3-948B-1728B52AA6E4}">
+                <adec:decorative xmlns:adec="http://schemas.microsoft.com/office/drawing/2017/decorative" val="1"/>
+              </a:ext>
+            </a:extLst>
+          </p:cNvPr>
+          <p:cNvSpPr>
+            <a:spLocks noGrp="1" noRot="1" noChangeAspect="1" noMove="1" noResize="1" noEditPoints="1" noAdjustHandles="1" noChangeArrowheads="1" noChangeShapeType="1" noTextEdit="1"/>
+          </p:cNvSpPr>
+          <p:nvPr>
+            <p:extLst>
+              <p:ext uri="{386F3935-93C4-4BCD-93E2-E3B085C9AB24}">
+                <p16:designElem xmlns:p16="http://schemas.microsoft.com/office/powerpoint/2015/main" val="1"/>
+              </p:ext>
+            </p:extLst>
+          </p:nvPr>
+        </p:nvSpPr>
+        <p:spPr>
+          <a:xfrm>
+            <a:off x="0" y="0"/>
+            <a:ext cx="12191999" cy="6857365"/>
+          </a:xfrm>
+          <a:prstGeom prst="rect">
+            <a:avLst/>
+          </a:prstGeom>
           <a:ln>
             <a:noFill/>
           </a:ln>
@@ -8359,36 +9901,174 @@
         </p:nvSpPr>
         <p:spPr>
           <a:xfrm>
-            <a:off x="1156852" y="637763"/>
-            <a:ext cx="2424548" cy="484283"/>
+            <a:off x="337497" y="679731"/>
+            <a:ext cx="3124151" cy="3736540"/>
           </a:xfrm>
         </p:spPr>
         <p:txBody>
-          <a:bodyPr vert="horz" lIns="91440" tIns="45720" rIns="91440" bIns="45720" rtlCol="0" anchor="t">
-            <a:normAutofit fontScale="90000"/>
+          <a:bodyPr vert="horz" lIns="91440" tIns="45720" rIns="91440" bIns="45720" rtlCol="0" anchor="b">
+            <a:normAutofit/>
           </a:bodyPr>
           <a:lstStyle/>
           <a:p>
             <a:r>
-              <a:rPr lang="en-US" sz="3200" b="1" kern="1200">
-                <a:solidFill>
-                  <a:schemeClr val="bg1"/>
-                </a:solidFill>
-                <a:latin typeface="+mj-lt"/>
-                <a:ea typeface="+mj-ea"/>
-                <a:cs typeface="+mj-cs"/>
-              </a:rPr>
-              <a:t>Datenbank</a:t>
+              <a:rPr lang="en-US" sz="4600" b="1"/>
+              <a:t>CLD</a:t>
             </a:r>
           </a:p>
         </p:txBody>
       </p:sp>
+      <p:grpSp>
+        <p:nvGrpSpPr>
+          <p:cNvPr id="30" name="Group 29">
+            <a:extLst>
+              <a:ext uri="{FF2B5EF4-FFF2-40B4-BE49-F238E27FC236}">
+                <a16:creationId xmlns:a16="http://schemas.microsoft.com/office/drawing/2014/main" id="{3AF6A671-C637-4547-85F4-51B6D1881399}"/>
+              </a:ext>
+              <a:ext uri="{C183D7F6-B498-43B3-948B-1728B52AA6E4}">
+                <adec:decorative xmlns:adec="http://schemas.microsoft.com/office/drawing/2017/decorative" val="1"/>
+              </a:ext>
+            </a:extLst>
+          </p:cNvPr>
+          <p:cNvGrpSpPr>
+            <a:grpSpLocks noGrp="1" noUngrp="1" noRot="1" noChangeAspect="1" noMove="1" noResize="1"/>
+          </p:cNvGrpSpPr>
+          <p:nvPr>
+            <p:extLst>
+              <p:ext uri="{386F3935-93C4-4BCD-93E2-E3B085C9AB24}">
+                <p16:designElem xmlns:p16="http://schemas.microsoft.com/office/powerpoint/2015/main" val="1"/>
+              </p:ext>
+            </p:extLst>
+          </p:nvPr>
+        </p:nvGrpSpPr>
+        <p:grpSpPr>
+          <a:xfrm>
+            <a:off x="9416432" y="1"/>
+            <a:ext cx="2446384" cy="5777808"/>
+            <a:chOff x="329184" y="1"/>
+            <a:chExt cx="524256" cy="5777808"/>
+          </a:xfrm>
+        </p:grpSpPr>
+        <p:cxnSp>
+          <p:nvCxnSpPr>
+            <p:cNvPr id="31" name="Straight Connector 30">
+              <a:extLst>
+                <a:ext uri="{FF2B5EF4-FFF2-40B4-BE49-F238E27FC236}">
+                  <a16:creationId xmlns:a16="http://schemas.microsoft.com/office/drawing/2014/main" id="{C575CF26-3D3C-4C5A-A2B7-00432016EF62}"/>
+                </a:ext>
+                <a:ext uri="{C183D7F6-B498-43B3-948B-1728B52AA6E4}">
+                  <adec:decorative xmlns:adec="http://schemas.microsoft.com/office/drawing/2017/decorative" val="1"/>
+                </a:ext>
+              </a:extLst>
+            </p:cNvPr>
+            <p:cNvCxnSpPr>
+              <a:cxnSpLocks/>
+            </p:cNvCxnSpPr>
+            <p:nvPr>
+              <p:extLst>
+                <p:ext uri="{386F3935-93C4-4BCD-93E2-E3B085C9AB24}">
+                  <p16:designElem xmlns:p16="http://schemas.microsoft.com/office/powerpoint/2015/main" val="1"/>
+                </p:ext>
+              </p:extLst>
+            </p:nvPr>
+          </p:nvCxnSpPr>
+          <p:spPr>
+            <a:xfrm flipH="1">
+              <a:off x="329184" y="5777809"/>
+              <a:ext cx="521208" cy="0"/>
+            </a:xfrm>
+            <a:prstGeom prst="line">
+              <a:avLst/>
+            </a:prstGeom>
+            <a:ln w="152400">
+              <a:solidFill>
+                <a:schemeClr val="accent4"/>
+              </a:solidFill>
+            </a:ln>
+          </p:spPr>
+          <p:style>
+            <a:lnRef idx="1">
+              <a:schemeClr val="accent1"/>
+            </a:lnRef>
+            <a:fillRef idx="0">
+              <a:schemeClr val="accent1"/>
+            </a:fillRef>
+            <a:effectRef idx="0">
+              <a:schemeClr val="accent1"/>
+            </a:effectRef>
+            <a:fontRef idx="minor">
+              <a:schemeClr val="tx1"/>
+            </a:fontRef>
+          </p:style>
+        </p:cxnSp>
+        <p:sp>
+          <p:nvSpPr>
+            <p:cNvPr id="32" name="Rectangle 31">
+              <a:extLst>
+                <a:ext uri="{FF2B5EF4-FFF2-40B4-BE49-F238E27FC236}">
+                  <a16:creationId xmlns:a16="http://schemas.microsoft.com/office/drawing/2014/main" id="{99413ED5-9ED4-4772-BCE4-2BCAE6B12E35}"/>
+                </a:ext>
+                <a:ext uri="{C183D7F6-B498-43B3-948B-1728B52AA6E4}">
+                  <adec:decorative xmlns:adec="http://schemas.microsoft.com/office/drawing/2017/decorative" val="1"/>
+                </a:ext>
+              </a:extLst>
+            </p:cNvPr>
+            <p:cNvSpPr/>
+            <p:nvPr>
+              <p:extLst>
+                <p:ext uri="{386F3935-93C4-4BCD-93E2-E3B085C9AB24}">
+                  <p16:designElem xmlns:p16="http://schemas.microsoft.com/office/powerpoint/2015/main" val="1"/>
+                </p:ext>
+              </p:extLst>
+            </p:nvPr>
+          </p:nvSpPr>
+          <p:spPr>
+            <a:xfrm>
+              <a:off x="329184" y="1"/>
+              <a:ext cx="524256" cy="5532119"/>
+            </a:xfrm>
+            <a:prstGeom prst="rect">
+              <a:avLst/>
+            </a:prstGeom>
+            <a:solidFill>
+              <a:schemeClr val="accent4"/>
+            </a:solidFill>
+            <a:ln>
+              <a:noFill/>
+            </a:ln>
+          </p:spPr>
+          <p:style>
+            <a:lnRef idx="2">
+              <a:schemeClr val="accent1">
+                <a:shade val="50000"/>
+              </a:schemeClr>
+            </a:lnRef>
+            <a:fillRef idx="1">
+              <a:schemeClr val="accent1"/>
+            </a:fillRef>
+            <a:effectRef idx="0">
+              <a:schemeClr val="accent1"/>
+            </a:effectRef>
+            <a:fontRef idx="minor">
+              <a:schemeClr val="lt1"/>
+            </a:fontRef>
+          </p:style>
+          <p:txBody>
+            <a:bodyPr rtlCol="0" anchor="ctr"/>
+            <a:lstStyle/>
+            <a:p>
+              <a:pPr algn="ctr"/>
+              <a:endParaRPr lang="en-US"/>
+            </a:p>
+          </p:txBody>
+        </p:sp>
+      </p:grpSp>
       <p:sp>
         <p:nvSpPr>
-          <p:cNvPr id="23" name="Rectangle 22">
-            <a:extLst>
-              <a:ext uri="{FF2B5EF4-FFF2-40B4-BE49-F238E27FC236}">
-                <a16:creationId xmlns:a16="http://schemas.microsoft.com/office/drawing/2014/main" id="{450D3AD2-FA80-415F-A9CE-54D884561CD7}"/>
+          <p:cNvPr id="34" name="Rectangle 33">
+            <a:extLst>
+              <a:ext uri="{FF2B5EF4-FFF2-40B4-BE49-F238E27FC236}">
+                <a16:creationId xmlns:a16="http://schemas.microsoft.com/office/drawing/2014/main" id="{04357C93-F0CB-4A1C-8F77-4E9063789819}"/>
               </a:ext>
               <a:ext uri="{C183D7F6-B498-43B3-948B-1728B52AA6E4}">
                 <adec:decorative xmlns:adec="http://schemas.microsoft.com/office/drawing/2017/decorative" val="1"/>
@@ -8408,8 +10088,8 @@
         </p:nvSpPr>
         <p:spPr>
           <a:xfrm>
-            <a:off x="1156852" y="2794337"/>
-            <a:ext cx="457200" cy="45720"/>
+            <a:off x="3821084" y="679731"/>
+            <a:ext cx="7682293" cy="5662878"/>
           </a:xfrm>
           <a:prstGeom prst="rect">
             <a:avLst/>
@@ -8420,6 +10100,13 @@
           <a:ln>
             <a:noFill/>
           </a:ln>
+          <a:effectLst>
+            <a:outerShdw blurRad="139700" dist="127000" dir="5400000" algn="t" rotWithShape="0">
+              <a:prstClr val="black">
+                <a:alpha val="15000"/>
+              </a:prstClr>
+            </a:outerShdw>
+          </a:effectLst>
         </p:spPr>
         <p:style>
           <a:lnRef idx="2">
@@ -8460,16 +10147,15 @@
           </p:cNvPicPr>
           <p:nvPr/>
         </p:nvPicPr>
-        <p:blipFill>
+        <p:blipFill rotWithShape="1">
           <a:blip r:embed="rId2"/>
-          <a:stretch>
-            <a:fillRect/>
-          </a:stretch>
+          <a:srcRect t="684" b="1"/>
+          <a:stretch/>
         </p:blipFill>
         <p:spPr>
           <a:xfrm>
-            <a:off x="611385" y="1238965"/>
-            <a:ext cx="2827265" cy="5502117"/>
+            <a:off x="4019175" y="1006764"/>
+            <a:ext cx="2599583" cy="5013205"/>
           </a:xfrm>
           <a:prstGeom prst="rect">
             <a:avLst/>
@@ -8498,8 +10184,8 @@
         </p:blipFill>
         <p:spPr>
           <a:xfrm>
-            <a:off x="5408359" y="735096"/>
-            <a:ext cx="5113463" cy="5387807"/>
+            <a:off x="6978194" y="1325880"/>
+            <a:ext cx="4239698" cy="4462840"/>
           </a:xfrm>
           <a:prstGeom prst="rect">
             <a:avLst/>
@@ -8519,17 +10205,9 @@
 </p:sld>
 </file>
 
-<file path=ppt/slides/slide6.xml><?xml version="1.0" encoding="utf-8"?>
+<file path=ppt/slides/slide9.xml><?xml version="1.0" encoding="utf-8"?>
 <p:sld xmlns:a="http://schemas.openxmlformats.org/drawingml/2006/main" xmlns:r="http://schemas.openxmlformats.org/officeDocument/2006/relationships" xmlns:p="http://schemas.openxmlformats.org/presentationml/2006/main">
   <p:cSld>
-    <p:bg>
-      <p:bgPr>
-        <a:solidFill>
-          <a:srgbClr val="000000"/>
-        </a:solidFill>
-        <a:effectLst/>
-      </p:bgPr>
-    </p:bg>
     <p:spTree>
       <p:nvGrpSpPr>
         <p:cNvPr id="1" name=""/>
@@ -8546,73 +10224,39 @@
       </p:grpSpPr>
       <p:sp>
         <p:nvSpPr>
-          <p:cNvPr id="10" name="Rectangle 9">
-            <a:extLst>
-              <a:ext uri="{FF2B5EF4-FFF2-40B4-BE49-F238E27FC236}">
-                <a16:creationId xmlns:a16="http://schemas.microsoft.com/office/drawing/2014/main" id="{71B2258F-86CA-4D4D-8270-BC05FCDEBFB3}"/>
-              </a:ext>
-              <a:ext uri="{C183D7F6-B498-43B3-948B-1728B52AA6E4}">
-                <adec:decorative xmlns:adec="http://schemas.microsoft.com/office/drawing/2017/decorative" val="1"/>
+          <p:cNvPr id="2" name="Titel 1">
+            <a:extLst>
+              <a:ext uri="{FF2B5EF4-FFF2-40B4-BE49-F238E27FC236}">
+                <a16:creationId xmlns:a16="http://schemas.microsoft.com/office/drawing/2014/main" id="{66DEF83C-9E9B-0645-ADF9-52667A84D89F}"/>
               </a:ext>
             </a:extLst>
           </p:cNvPr>
           <p:cNvSpPr>
-            <a:spLocks noGrp="1" noRot="1" noChangeAspect="1" noMove="1" noResize="1" noEditPoints="1" noAdjustHandles="1" noChangeArrowheads="1" noChangeShapeType="1" noTextEdit="1"/>
+            <a:spLocks noGrp="1"/>
           </p:cNvSpPr>
           <p:nvPr>
-            <p:extLst>
-              <p:ext uri="{386F3935-93C4-4BCD-93E2-E3B085C9AB24}">
-                <p16:designElem xmlns:p16="http://schemas.microsoft.com/office/powerpoint/2015/main" val="1"/>
-              </p:ext>
-            </p:extLst>
+            <p:ph type="title"/>
           </p:nvPr>
         </p:nvSpPr>
-        <p:spPr>
-          <a:xfrm>
-            <a:off x="0" y="0"/>
-            <a:ext cx="12192000" cy="6857999"/>
-          </a:xfrm>
-          <a:prstGeom prst="rect">
-            <a:avLst/>
-          </a:prstGeom>
-          <a:solidFill>
-            <a:srgbClr val="000000"/>
-          </a:solidFill>
-          <a:ln>
-            <a:noFill/>
-          </a:ln>
-        </p:spPr>
-        <p:style>
-          <a:lnRef idx="2">
-            <a:schemeClr val="accent1">
-              <a:shade val="50000"/>
-            </a:schemeClr>
-          </a:lnRef>
-          <a:fillRef idx="1">
-            <a:schemeClr val="accent1"/>
-          </a:fillRef>
-          <a:effectRef idx="0">
-            <a:schemeClr val="accent1"/>
-          </a:effectRef>
-          <a:fontRef idx="minor">
-            <a:schemeClr val="lt1"/>
-          </a:fontRef>
-        </p:style>
+        <p:spPr/>
         <p:txBody>
-          <a:bodyPr rtlCol="0" anchor="ctr"/>
+          <a:bodyPr/>
           <a:lstStyle/>
           <a:p>
-            <a:pPr algn="ctr"/>
-            <a:endParaRPr lang="en-US"/>
+            <a:r>
+              <a:rPr lang="de-AT" dirty="0"/>
+              <a:t>Implementierung</a:t>
+            </a:r>
+            <a:endParaRPr lang="de-DE" dirty="0"/>
           </a:p>
         </p:txBody>
       </p:sp>
       <p:pic>
         <p:nvPicPr>
-          <p:cNvPr id="5" name="Grafik 4" descr="Ein Bild, das Entwurf, Zeichnung, Clipart, Darstellung enthält.&#10;&#10;Automatisch generierte Beschreibung">
-            <a:extLst>
-              <a:ext uri="{FF2B5EF4-FFF2-40B4-BE49-F238E27FC236}">
-                <a16:creationId xmlns:a16="http://schemas.microsoft.com/office/drawing/2014/main" id="{DF55B904-3997-7331-CF04-6E9348515771}"/>
+          <p:cNvPr id="5" name="Grafik 4">
+            <a:extLst>
+              <a:ext uri="{FF2B5EF4-FFF2-40B4-BE49-F238E27FC236}">
+                <a16:creationId xmlns:a16="http://schemas.microsoft.com/office/drawing/2014/main" id="{CEA3FD51-4550-48A8-7002-8439F4DFBB70}"/>
               </a:ext>
             </a:extLst>
           </p:cNvPr>
@@ -8621,330 +10265,31 @@
           </p:cNvPicPr>
           <p:nvPr/>
         </p:nvPicPr>
-        <p:blipFill rotWithShape="1">
-          <a:blip r:embed="rId2">
-            <a:alphaModFix amt="50000"/>
-            <a:extLst>
-              <a:ext uri="{28A0092B-C50C-407E-A947-70E740481C1C}">
-                <a14:useLocalDpi xmlns:a14="http://schemas.microsoft.com/office/drawing/2010/main" val="0"/>
-              </a:ext>
-            </a:extLst>
-          </a:blip>
-          <a:srcRect t="21568" b="22182"/>
-          <a:stretch/>
+        <p:blipFill>
+          <a:blip r:embed="rId2"/>
+          <a:stretch>
+            <a:fillRect/>
+          </a:stretch>
         </p:blipFill>
         <p:spPr>
           <a:xfrm>
-            <a:off x="20" y="1"/>
-            <a:ext cx="12191980" cy="6857999"/>
+            <a:off x="973327" y="1690688"/>
+            <a:ext cx="2322323" cy="5022698"/>
           </a:xfrm>
           <a:prstGeom prst="rect">
             <a:avLst/>
           </a:prstGeom>
         </p:spPr>
       </p:pic>
-      <p:sp>
-        <p:nvSpPr>
-          <p:cNvPr id="2" name="Titel 1">
-            <a:extLst>
-              <a:ext uri="{FF2B5EF4-FFF2-40B4-BE49-F238E27FC236}">
-                <a16:creationId xmlns:a16="http://schemas.microsoft.com/office/drawing/2014/main" id="{486F8E60-515E-DD72-8C61-48A809BAEB8A}"/>
-              </a:ext>
-            </a:extLst>
-          </p:cNvPr>
-          <p:cNvSpPr>
-            <a:spLocks noGrp="1"/>
-          </p:cNvSpPr>
-          <p:nvPr>
-            <p:ph type="ctrTitle"/>
-          </p:nvPr>
-        </p:nvSpPr>
-        <p:spPr>
-          <a:xfrm>
-            <a:off x="1524000" y="1122362"/>
-            <a:ext cx="9144000" cy="2900518"/>
-          </a:xfrm>
-        </p:spPr>
-        <p:txBody>
-          <a:bodyPr>
-            <a:normAutofit/>
-          </a:bodyPr>
-          <a:lstStyle/>
-          <a:p>
-            <a:r>
-              <a:rPr lang="de-AT" sz="7200" b="1" dirty="0">
-                <a:solidFill>
-                  <a:srgbClr val="FFFFFF"/>
-                </a:solidFill>
-              </a:rPr>
-              <a:t>Live Demo</a:t>
-            </a:r>
-          </a:p>
-        </p:txBody>
-      </p:sp>
-      <p:sp>
-        <p:nvSpPr>
-          <p:cNvPr id="3" name="Untertitel 2">
-            <a:extLst>
-              <a:ext uri="{FF2B5EF4-FFF2-40B4-BE49-F238E27FC236}">
-                <a16:creationId xmlns:a16="http://schemas.microsoft.com/office/drawing/2014/main" id="{0E8967FC-619E-3B3C-E98A-C8D97714019C}"/>
-              </a:ext>
-            </a:extLst>
-          </p:cNvPr>
-          <p:cNvSpPr>
-            <a:spLocks noGrp="1"/>
-          </p:cNvSpPr>
-          <p:nvPr>
-            <p:ph type="subTitle" idx="1"/>
-          </p:nvPr>
-        </p:nvSpPr>
-        <p:spPr>
-          <a:xfrm>
-            <a:off x="1524000" y="4159404"/>
-            <a:ext cx="9144000" cy="1098395"/>
-          </a:xfrm>
-        </p:spPr>
-        <p:txBody>
-          <a:bodyPr>
-            <a:normAutofit/>
-          </a:bodyPr>
-          <a:lstStyle/>
-          <a:p>
-            <a:endParaRPr lang="de-AT">
-              <a:solidFill>
-                <a:srgbClr val="FFFFFF"/>
-              </a:solidFill>
-            </a:endParaRPr>
-          </a:p>
-        </p:txBody>
-      </p:sp>
     </p:spTree>
     <p:extLst>
       <p:ext uri="{BB962C8B-B14F-4D97-AF65-F5344CB8AC3E}">
-        <p14:creationId xmlns:p14="http://schemas.microsoft.com/office/powerpoint/2010/main" val="1876321446"/>
+        <p14:creationId xmlns:p14="http://schemas.microsoft.com/office/powerpoint/2010/main" val="3855325149"/>
       </p:ext>
     </p:extLst>
   </p:cSld>
   <p:clrMapOvr>
-    <a:overrideClrMapping bg1="dk1" tx1="lt1" bg2="dk2" tx2="lt2" accent1="accent1" accent2="accent2" accent3="accent3" accent4="accent4" accent5="accent5" accent6="accent6" hlink="hlink" folHlink="folHlink"/>
-  </p:clrMapOvr>
-</p:sld>
-</file>
-
-<file path=ppt/slides/slide7.xml><?xml version="1.0" encoding="utf-8"?>
-<p:sld xmlns:a="http://schemas.openxmlformats.org/drawingml/2006/main" xmlns:r="http://schemas.openxmlformats.org/officeDocument/2006/relationships" xmlns:p="http://schemas.openxmlformats.org/presentationml/2006/main">
-  <p:cSld>
-    <p:bg>
-      <p:bgPr>
-        <a:solidFill>
-          <a:srgbClr val="000000"/>
-        </a:solidFill>
-        <a:effectLst/>
-      </p:bgPr>
-    </p:bg>
-    <p:spTree>
-      <p:nvGrpSpPr>
-        <p:cNvPr id="1" name=""/>
-        <p:cNvGrpSpPr/>
-        <p:nvPr/>
-      </p:nvGrpSpPr>
-      <p:grpSpPr>
-        <a:xfrm>
-          <a:off x="0" y="0"/>
-          <a:ext cx="0" cy="0"/>
-          <a:chOff x="0" y="0"/>
-          <a:chExt cx="0" cy="0"/>
-        </a:xfrm>
-      </p:grpSpPr>
-      <p:sp>
-        <p:nvSpPr>
-          <p:cNvPr id="10" name="Rectangle 9">
-            <a:extLst>
-              <a:ext uri="{FF2B5EF4-FFF2-40B4-BE49-F238E27FC236}">
-                <a16:creationId xmlns:a16="http://schemas.microsoft.com/office/drawing/2014/main" id="{71B2258F-86CA-4D4D-8270-BC05FCDEBFB3}"/>
-              </a:ext>
-              <a:ext uri="{C183D7F6-B498-43B3-948B-1728B52AA6E4}">
-                <adec:decorative xmlns:adec="http://schemas.microsoft.com/office/drawing/2017/decorative" val="1"/>
-              </a:ext>
-            </a:extLst>
-          </p:cNvPr>
-          <p:cNvSpPr>
-            <a:spLocks noGrp="1" noRot="1" noChangeAspect="1" noMove="1" noResize="1" noEditPoints="1" noAdjustHandles="1" noChangeArrowheads="1" noChangeShapeType="1" noTextEdit="1"/>
-          </p:cNvSpPr>
-          <p:nvPr>
-            <p:extLst>
-              <p:ext uri="{386F3935-93C4-4BCD-93E2-E3B085C9AB24}">
-                <p16:designElem xmlns:p16="http://schemas.microsoft.com/office/powerpoint/2015/main" val="1"/>
-              </p:ext>
-            </p:extLst>
-          </p:nvPr>
-        </p:nvSpPr>
-        <p:spPr>
-          <a:xfrm>
-            <a:off x="0" y="0"/>
-            <a:ext cx="12192000" cy="6857999"/>
-          </a:xfrm>
-          <a:prstGeom prst="rect">
-            <a:avLst/>
-          </a:prstGeom>
-          <a:solidFill>
-            <a:srgbClr val="000000"/>
-          </a:solidFill>
-          <a:ln>
-            <a:noFill/>
-          </a:ln>
-        </p:spPr>
-        <p:style>
-          <a:lnRef idx="2">
-            <a:schemeClr val="accent1">
-              <a:shade val="50000"/>
-            </a:schemeClr>
-          </a:lnRef>
-          <a:fillRef idx="1">
-            <a:schemeClr val="accent1"/>
-          </a:fillRef>
-          <a:effectRef idx="0">
-            <a:schemeClr val="accent1"/>
-          </a:effectRef>
-          <a:fontRef idx="minor">
-            <a:schemeClr val="lt1"/>
-          </a:fontRef>
-        </p:style>
-        <p:txBody>
-          <a:bodyPr rtlCol="0" anchor="ctr"/>
-          <a:lstStyle/>
-          <a:p>
-            <a:pPr algn="ctr"/>
-            <a:endParaRPr lang="en-US"/>
-          </a:p>
-        </p:txBody>
-      </p:sp>
-      <p:pic>
-        <p:nvPicPr>
-          <p:cNvPr id="5" name="Grafik 4" descr="Ein Bild, das Entwurf, Zeichnung, Clipart, Darstellung enthält.&#10;&#10;Automatisch generierte Beschreibung">
-            <a:extLst>
-              <a:ext uri="{FF2B5EF4-FFF2-40B4-BE49-F238E27FC236}">
-                <a16:creationId xmlns:a16="http://schemas.microsoft.com/office/drawing/2014/main" id="{E5996C1B-D19D-CB93-953D-E0F13860FB4C}"/>
-              </a:ext>
-            </a:extLst>
-          </p:cNvPr>
-          <p:cNvPicPr>
-            <a:picLocks noChangeAspect="1"/>
-          </p:cNvPicPr>
-          <p:nvPr/>
-        </p:nvPicPr>
-        <p:blipFill rotWithShape="1">
-          <a:blip r:embed="rId2">
-            <a:alphaModFix amt="50000"/>
-            <a:extLst>
-              <a:ext uri="{28A0092B-C50C-407E-A947-70E740481C1C}">
-                <a14:useLocalDpi xmlns:a14="http://schemas.microsoft.com/office/drawing/2010/main" val="0"/>
-              </a:ext>
-            </a:extLst>
-          </a:blip>
-          <a:srcRect t="21568" b="22182"/>
-          <a:stretch/>
-        </p:blipFill>
-        <p:spPr>
-          <a:xfrm>
-            <a:off x="20" y="10"/>
-            <a:ext cx="12191980" cy="6857990"/>
-          </a:xfrm>
-          <a:prstGeom prst="rect">
-            <a:avLst/>
-          </a:prstGeom>
-        </p:spPr>
-      </p:pic>
-      <p:sp>
-        <p:nvSpPr>
-          <p:cNvPr id="2" name="Titel 1">
-            <a:extLst>
-              <a:ext uri="{FF2B5EF4-FFF2-40B4-BE49-F238E27FC236}">
-                <a16:creationId xmlns:a16="http://schemas.microsoft.com/office/drawing/2014/main" id="{CBFA93A0-BA12-6A64-0021-E04D7644D509}"/>
-              </a:ext>
-            </a:extLst>
-          </p:cNvPr>
-          <p:cNvSpPr>
-            <a:spLocks noGrp="1"/>
-          </p:cNvSpPr>
-          <p:nvPr>
-            <p:ph type="ctrTitle"/>
-          </p:nvPr>
-        </p:nvSpPr>
-        <p:spPr>
-          <a:xfrm>
-            <a:off x="1524000" y="1122362"/>
-            <a:ext cx="9144000" cy="2900518"/>
-          </a:xfrm>
-        </p:spPr>
-        <p:txBody>
-          <a:bodyPr>
-            <a:normAutofit/>
-          </a:bodyPr>
-          <a:lstStyle/>
-          <a:p>
-            <a:r>
-              <a:rPr lang="de-AT" sz="6600" b="1" dirty="0">
-                <a:ln w="22225">
-                  <a:solidFill>
-                    <a:schemeClr val="tx1"/>
-                  </a:solidFill>
-                  <a:miter lim="800000"/>
-                </a:ln>
-                <a:solidFill>
-                  <a:srgbClr val="FFFFFF"/>
-                </a:solidFill>
-              </a:rPr>
-              <a:t>VIELEN DANK FÜR EURE AUFMERKSAMKEIT</a:t>
-            </a:r>
-          </a:p>
-        </p:txBody>
-      </p:sp>
-      <p:sp>
-        <p:nvSpPr>
-          <p:cNvPr id="3" name="Untertitel 2">
-            <a:extLst>
-              <a:ext uri="{FF2B5EF4-FFF2-40B4-BE49-F238E27FC236}">
-                <a16:creationId xmlns:a16="http://schemas.microsoft.com/office/drawing/2014/main" id="{24ED2226-889D-6A68-BB41-1B7BAC6BA60A}"/>
-              </a:ext>
-            </a:extLst>
-          </p:cNvPr>
-          <p:cNvSpPr>
-            <a:spLocks noGrp="1"/>
-          </p:cNvSpPr>
-          <p:nvPr>
-            <p:ph type="subTitle" idx="1"/>
-          </p:nvPr>
-        </p:nvSpPr>
-        <p:spPr>
-          <a:xfrm>
-            <a:off x="1524000" y="4159404"/>
-            <a:ext cx="9144000" cy="1098395"/>
-          </a:xfrm>
-        </p:spPr>
-        <p:txBody>
-          <a:bodyPr>
-            <a:normAutofit/>
-          </a:bodyPr>
-          <a:lstStyle/>
-          <a:p>
-            <a:endParaRPr lang="de-AT">
-              <a:solidFill>
-                <a:srgbClr val="FFFFFF"/>
-              </a:solidFill>
-            </a:endParaRPr>
-          </a:p>
-        </p:txBody>
-      </p:sp>
-    </p:spTree>
-    <p:extLst>
-      <p:ext uri="{BB962C8B-B14F-4D97-AF65-F5344CB8AC3E}">
-        <p14:creationId xmlns:p14="http://schemas.microsoft.com/office/powerpoint/2010/main" val="3916215557"/>
-      </p:ext>
-    </p:extLst>
-  </p:cSld>
-  <p:clrMapOvr>
-    <a:overrideClrMapping bg1="dk1" tx1="lt1" bg2="dk2" tx2="lt2" accent1="accent1" accent2="accent2" accent3="accent3" accent4="accent4" accent5="accent5" accent6="accent6" hlink="hlink" folHlink="folHlink"/>
+    <a:masterClrMapping/>
   </p:clrMapOvr>
 </p:sld>
 </file>

</xml_diff>